<commit_message>
Practicum AI presentation (09.07.21).
</commit_message>
<xml_diff>
--- a/pai_getting_started.pptx
+++ b/pai_getting_started.pptx
@@ -5,32 +5,35 @@
     <p:sldMasterId id="2147483648" r:id="rId1"/>
   </p:sldMasterIdLst>
   <p:notesMasterIdLst>
-    <p:notesMasterId r:id="rId25"/>
+    <p:notesMasterId r:id="rId28"/>
   </p:notesMasterIdLst>
   <p:sldIdLst>
     <p:sldId id="257" r:id="rId2"/>
     <p:sldId id="295" r:id="rId3"/>
-    <p:sldId id="289" r:id="rId4"/>
-    <p:sldId id="278" r:id="rId5"/>
-    <p:sldId id="281" r:id="rId6"/>
-    <p:sldId id="275" r:id="rId7"/>
-    <p:sldId id="303" r:id="rId8"/>
+    <p:sldId id="278" r:id="rId4"/>
+    <p:sldId id="281" r:id="rId5"/>
+    <p:sldId id="275" r:id="rId6"/>
+    <p:sldId id="318" r:id="rId7"/>
+    <p:sldId id="317" r:id="rId8"/>
     <p:sldId id="300" r:id="rId9"/>
-    <p:sldId id="304" r:id="rId10"/>
-    <p:sldId id="315" r:id="rId11"/>
-    <p:sldId id="311" r:id="rId12"/>
-    <p:sldId id="292" r:id="rId13"/>
-    <p:sldId id="305" r:id="rId14"/>
-    <p:sldId id="306" r:id="rId15"/>
-    <p:sldId id="307" r:id="rId16"/>
-    <p:sldId id="308" r:id="rId17"/>
-    <p:sldId id="309" r:id="rId18"/>
-    <p:sldId id="310" r:id="rId19"/>
-    <p:sldId id="294" r:id="rId20"/>
-    <p:sldId id="316" r:id="rId21"/>
-    <p:sldId id="262" r:id="rId22"/>
-    <p:sldId id="301" r:id="rId23"/>
-    <p:sldId id="302" r:id="rId24"/>
+    <p:sldId id="320" r:id="rId10"/>
+    <p:sldId id="304" r:id="rId11"/>
+    <p:sldId id="289" r:id="rId12"/>
+    <p:sldId id="315" r:id="rId13"/>
+    <p:sldId id="311" r:id="rId14"/>
+    <p:sldId id="321" r:id="rId15"/>
+    <p:sldId id="292" r:id="rId16"/>
+    <p:sldId id="305" r:id="rId17"/>
+    <p:sldId id="306" r:id="rId18"/>
+    <p:sldId id="307" r:id="rId19"/>
+    <p:sldId id="308" r:id="rId20"/>
+    <p:sldId id="309" r:id="rId21"/>
+    <p:sldId id="310" r:id="rId22"/>
+    <p:sldId id="294" r:id="rId23"/>
+    <p:sldId id="316" r:id="rId24"/>
+    <p:sldId id="262" r:id="rId25"/>
+    <p:sldId id="301" r:id="rId26"/>
+    <p:sldId id="302" r:id="rId27"/>
   </p:sldIdLst>
   <p:sldSz cx="12192000" cy="6858000"/>
   <p:notesSz cx="6858000" cy="9144000"/>
@@ -230,7 +233,7 @@
           <a:p>
             <a:fld id="{FD93C9B2-20F6-4DB1-B471-224337D0AC79}" type="datetimeFigureOut">
               <a:rPr lang="en-US" smtClean="0"/>
-              <a:t>8/23/2021</a:t>
+              <a:t>9/7/2021</a:t>
             </a:fld>
             <a:endParaRPr lang="en-US"/>
           </a:p>
@@ -545,7 +548,7 @@
               <a:rPr lang="en-US" dirty="0">
                 <a:latin typeface="Palatino Linotype" panose="02040502050505030304" pitchFamily="18" charset="0"/>
               </a:rPr>
-              <a:t>Hello and welcome to an overview of the Practicum AI workshop series.  Discuss the program’s name..</a:t>
+              <a:t>Hello and welcome to an overview of the Practicum AI workshop series.  I’m Dan Maxwell and I’m an AI trainer in the Research Computing department.  </a:t>
             </a:r>
           </a:p>
           <a:p>
@@ -558,8 +561,25 @@
               <a:rPr lang="en-US" dirty="0">
                 <a:latin typeface="Palatino Linotype" panose="02040502050505030304" pitchFamily="18" charset="0"/>
               </a:rPr>
-              <a:t>Let’s get started with the overarching goal of this program…</a:t>
-            </a:r>
+              <a:t>Today’s learning experience will come in two parts.  In the first part, I will briefly introduce the field of AI as well as our Practicum AI curriculum, specifically the badges we plan to offer.  And then – in part two – we will consider AI from a </a:t>
+            </a:r>
+            <a:r>
+              <a:rPr lang="en-US" b="1" dirty="0">
+                <a:latin typeface="Palatino Linotype" panose="02040502050505030304" pitchFamily="18" charset="0"/>
+              </a:rPr>
+              <a:t>data</a:t>
+            </a:r>
+            <a:r>
+              <a:rPr lang="en-US" dirty="0">
+                <a:latin typeface="Palatino Linotype" panose="02040502050505030304" pitchFamily="18" charset="0"/>
+              </a:rPr>
+              <a:t> point-of-view.</a:t>
+            </a:r>
+          </a:p>
+          <a:p>
+            <a:endParaRPr lang="en-US" dirty="0">
+              <a:latin typeface="Palatino Linotype" panose="02040502050505030304" pitchFamily="18" charset="0"/>
+            </a:endParaRPr>
           </a:p>
           <a:p>
             <a:endParaRPr lang="en-US" dirty="0">
@@ -650,11 +670,8 @@
           <a:p>
             <a:r>
               <a:rPr lang="en-US" dirty="0"/>
-              <a:t>We have now arrived at our first hands-on activity.  For the next 10 minutes, I would like for you to stop and ask yourself these questions.  Grab a pen and a pad of paper or fire up your word processor and write out a response.</a:t>
-            </a:r>
-          </a:p>
-          <a:p>
-            <a:endParaRPr lang="en-US" dirty="0"/>
+              <a:t>… and here’s the list of workshops we plan to offer this semester.</a:t>
+            </a:r>
           </a:p>
         </p:txBody>
       </p:sp>
@@ -684,7 +701,7 @@
     </p:spTree>
     <p:extLst>
       <p:ext uri="{BB962C8B-B14F-4D97-AF65-F5344CB8AC3E}">
-        <p14:creationId xmlns:p14="http://schemas.microsoft.com/office/powerpoint/2010/main" val="2877151627"/>
+        <p14:creationId xmlns:p14="http://schemas.microsoft.com/office/powerpoint/2010/main" val="2275706137"/>
       </p:ext>
     </p:extLst>
   </p:cSld>
@@ -740,8 +757,29 @@
           <a:p>
             <a:r>
               <a:rPr lang="en-US" dirty="0"/>
-              <a:t>In 2006, a British entrepreneur named Clive Humby coined the phrase “Data is the new oil.”  Data powers A.I. systems, and it comes in a variety of formats.  Thus, data is a logical starting point for thinking about integrating AI into your research program.  What kinds of data are you presently working with?  Let’s take a look at some different types of data.</a:t>
-            </a:r>
+              <a:t>So, to summarize this section, we believe that your journey to AI mastery ought to start with your interests, not the technology.  All too often, however, this gets turned around.  We get caught up in technical details, without first having a clear idea of the questions to be answered or the problem at hand.</a:t>
+            </a:r>
+          </a:p>
+          <a:p>
+            <a:endParaRPr lang="en-US" dirty="0"/>
+          </a:p>
+          <a:p>
+            <a:r>
+              <a:rPr lang="en-US" dirty="0"/>
+              <a:t>The Practicum AI badges allow you to create a custom learning path that supports your goals.  </a:t>
+            </a:r>
+          </a:p>
+          <a:p>
+            <a:endParaRPr lang="en-US" dirty="0"/>
+          </a:p>
+          <a:p>
+            <a:r>
+              <a:rPr lang="en-US" dirty="0"/>
+              <a:t>And that brings us to our first interactive exercise…</a:t>
+            </a:r>
+          </a:p>
+          <a:p>
+            <a:endParaRPr lang="en-US" dirty="0"/>
           </a:p>
           <a:p>
             <a:endParaRPr lang="en-US" dirty="0"/>
@@ -777,7 +815,7 @@
     </p:spTree>
     <p:extLst>
       <p:ext uri="{BB962C8B-B14F-4D97-AF65-F5344CB8AC3E}">
-        <p14:creationId xmlns:p14="http://schemas.microsoft.com/office/powerpoint/2010/main" val="251584934"/>
+        <p14:creationId xmlns:p14="http://schemas.microsoft.com/office/powerpoint/2010/main" val="1690277211"/>
       </p:ext>
     </p:extLst>
   </p:cSld>
@@ -833,58 +871,11 @@
           <a:p>
             <a:r>
               <a:rPr lang="en-US" dirty="0"/>
-              <a:t>In in his book, </a:t>
-            </a:r>
-            <a:r>
-              <a:rPr lang="en-US" i="1" dirty="0"/>
-              <a:t>Data Architecture: A Primer for the Data Scientist, </a:t>
-            </a:r>
-            <a:r>
-              <a:rPr lang="en-US" i="0" dirty="0"/>
-              <a:t>Bill Inman makes a distinction between two foundational types of data – between structured data and its unstructured counterpart.  A</a:t>
-            </a:r>
-            <a:r>
-              <a:rPr lang="en-US" dirty="0"/>
-              <a:t>s he points out, most of the world’s data is unstructured.  So, what’s the difference between the two? </a:t>
+              <a:t>We have now arrived at our first hands-on activity.  For the next 5 minutes, stop and ask yourself these questions.  Grab a pen and a pad of paper or fire up your word processor and write out your responses.</a:t>
             </a:r>
           </a:p>
           <a:p>
             <a:endParaRPr lang="en-US" dirty="0"/>
-          </a:p>
-          <a:p>
-            <a:r>
-              <a:rPr lang="en-US" b="0" i="0" dirty="0">
-                <a:solidFill>
-                  <a:srgbClr val="333333"/>
-                </a:solidFill>
-                <a:effectLst/>
-                <a:latin typeface="Georgia" panose="02040502050405020303" pitchFamily="18" charset="0"/>
-              </a:rPr>
-              <a:t>Structured data is easy to search and organize because it is usually contained in rows and columns and its elements can be mapped into fixed, pre-defined fields.  </a:t>
-            </a:r>
-            <a:r>
-              <a:rPr lang="en-US" dirty="0"/>
-              <a:t>Structured data is of two types.  The first type is data which comes from a database management system of some sort – Oracle, SQLServer, etc…  The Epic healthcare system – used by UF Health – is a structured data source, though it also stores unstructured text data in the form of physician notes.  The second is repetitive data, consisting of structured records coming from a variety of non-database sources.  Some examples of repetitive data include sensor output, telephone call records, metered data, and so forth. </a:t>
-            </a:r>
-          </a:p>
-          <a:p>
-            <a:endParaRPr lang="en-US" dirty="0"/>
-          </a:p>
-          <a:p>
-            <a:r>
-              <a:rPr lang="en-US" b="0" i="0" dirty="0">
-                <a:solidFill>
-                  <a:srgbClr val="333333"/>
-                </a:solidFill>
-                <a:effectLst/>
-                <a:latin typeface="Georgia" panose="02040502050405020303" pitchFamily="18" charset="0"/>
-              </a:rPr>
-              <a:t>Unstructured data is data that cannot be contained in a row-column database and does not have an associated data model.  Each record is unique in terms of its structure and content.  Now t</a:t>
-            </a:r>
-            <a:r>
-              <a:rPr lang="en-US" dirty="0"/>
-              <a:t>here are two types of unstructured data – textual and non-textual.  Examples of textual data include emails, transcribed conversations, literary texts, and so on.  Non-textual data includes images, video, and audio recordings.</a:t>
-            </a:r>
           </a:p>
         </p:txBody>
       </p:sp>
@@ -914,7 +905,7 @@
     </p:spTree>
     <p:extLst>
       <p:ext uri="{BB962C8B-B14F-4D97-AF65-F5344CB8AC3E}">
-        <p14:creationId xmlns:p14="http://schemas.microsoft.com/office/powerpoint/2010/main" val="107510316"/>
+        <p14:creationId xmlns:p14="http://schemas.microsoft.com/office/powerpoint/2010/main" val="2877151627"/>
       </p:ext>
     </p:extLst>
   </p:cSld>
@@ -970,7 +961,7 @@
           <a:p>
             <a:r>
               <a:rPr lang="en-US" dirty="0"/>
-              <a:t>With our primary data sources identified, let’s organize everything in a table.  On the leftmost column, our data sources are listed, followed by a column of generic questions we might like to ask of our data, another column which lists the related AI task for each question, and finally a column of AI research methods and technologies.  This table, then, becomes a roadmap to guide your investigation of AI technologies appropriate for your research program.  The question and AI task columns are self-explanatory, but I’d like to take a few minutes to unpack the abbreviations in the Methods column.  Don’t worry about the vocabulary at this point as we will define these terms later.</a:t>
+              <a:t>Earlier, I mentioned that the focus of the second half of today’s workshop would be data.  Now that we’ve introduced the Practicum AI curriculum, let’s put on a different colored lens and consider AI from the perspective of your data.  In fact, the kind of data you have will determine the AI tools you’ll want to consider as you plan your AI learning journey.  </a:t>
             </a:r>
           </a:p>
           <a:p>
@@ -979,14 +970,8 @@
           <a:p>
             <a:r>
               <a:rPr lang="en-US" dirty="0"/>
-              <a:t>Let’s now consider each data source, the types of questions one can ask of each, and the associated AI methods. </a:t>
-            </a:r>
-          </a:p>
-          <a:p>
-            <a:endParaRPr lang="en-US" dirty="0"/>
-          </a:p>
-          <a:p>
-            <a:endParaRPr lang="en-US" dirty="0"/>
+              <a:t>For our entry-level and intermediate workshops, you do not need to provide your own data.  But as you transition to our advanced workshops, you may want to conduct an AI project – in which case, this half of today’s presentation is important and worth your time.</a:t>
+            </a:r>
           </a:p>
           <a:p>
             <a:endParaRPr lang="en-US" dirty="0"/>
@@ -1019,7 +1004,7 @@
     </p:spTree>
     <p:extLst>
       <p:ext uri="{BB962C8B-B14F-4D97-AF65-F5344CB8AC3E}">
-        <p14:creationId xmlns:p14="http://schemas.microsoft.com/office/powerpoint/2010/main" val="1003415448"/>
+        <p14:creationId xmlns:p14="http://schemas.microsoft.com/office/powerpoint/2010/main" val="251584934"/>
       </p:ext>
     </p:extLst>
   </p:cSld>
@@ -1073,67 +1058,10 @@
           <a:bodyPr/>
           <a:lstStyle/>
           <a:p>
-            <a:pPr marL="0" marR="0" lvl="0" indent="0" algn="l" defTabSz="914400" rtl="0" eaLnBrk="1" fontAlgn="auto" latinLnBrk="0" hangingPunct="1">
-              <a:lnSpc>
-                <a:spcPct val="100000"/>
-              </a:lnSpc>
-              <a:spcBef>
-                <a:spcPts val="0"/>
-              </a:spcBef>
-              <a:spcAft>
-                <a:spcPts val="0"/>
-              </a:spcAft>
-              <a:buClrTx/>
-              <a:buSzTx/>
-              <a:buFontTx/>
-              <a:buNone/>
-              <a:tabLst/>
-              <a:defRPr/>
-            </a:pPr>
             <a:r>
               <a:rPr lang="en-US" dirty="0"/>
-              <a:t>In the case of structured data – data derived from databases or repetitive data from sensors – the Nvidia RAPIDS development environment is your best starting point.  RAPIDS provides a set of useful libraries, with machine learning functions for almost any research task.  The RAPIDS cuDF library, for example, is equivalent to the popular Pandas library which provides support for dataframes and basic data management and cleaning.   </a:t>
-            </a:r>
-          </a:p>
-          <a:p>
-            <a:pPr marL="0" marR="0" lvl="0" indent="0" algn="l" defTabSz="914400" rtl="0" eaLnBrk="1" fontAlgn="auto" latinLnBrk="0" hangingPunct="1">
-              <a:lnSpc>
-                <a:spcPct val="100000"/>
-              </a:lnSpc>
-              <a:spcBef>
-                <a:spcPts val="0"/>
-              </a:spcBef>
-              <a:spcAft>
-                <a:spcPts val="0"/>
-              </a:spcAft>
-              <a:buClrTx/>
-              <a:buSzTx/>
-              <a:buFontTx/>
-              <a:buNone/>
-              <a:tabLst/>
-              <a:defRPr/>
-            </a:pPr>
-            <a:endParaRPr lang="en-US" dirty="0"/>
-          </a:p>
-          <a:p>
-            <a:pPr marL="0" marR="0" lvl="0" indent="0" algn="l" defTabSz="914400" rtl="0" eaLnBrk="1" fontAlgn="auto" latinLnBrk="0" hangingPunct="1">
-              <a:lnSpc>
-                <a:spcPct val="100000"/>
-              </a:lnSpc>
-              <a:spcBef>
-                <a:spcPts val="0"/>
-              </a:spcBef>
-              <a:spcAft>
-                <a:spcPts val="0"/>
-              </a:spcAft>
-              <a:buClrTx/>
-              <a:buSzTx/>
-              <a:buFontTx/>
-              <a:buNone/>
-              <a:tabLst/>
-              <a:defRPr/>
-            </a:pPr>
-            <a:endParaRPr lang="en-US" dirty="0"/>
+              <a:t>In 2006, a British entrepreneur named Clive Humby coined the phrase “Data is the new oil.”  Data powers A.I. systems, and it comes in a variety of formats.  Thus, data is a logical starting point for thinking about AI.  So, what kinds of data are you presently working with?  </a:t>
+            </a:r>
           </a:p>
           <a:p>
             <a:endParaRPr lang="en-US" dirty="0"/>
@@ -1166,7 +1094,7 @@
     </p:spTree>
     <p:extLst>
       <p:ext uri="{BB962C8B-B14F-4D97-AF65-F5344CB8AC3E}">
-        <p14:creationId xmlns:p14="http://schemas.microsoft.com/office/powerpoint/2010/main" val="268399345"/>
+        <p14:creationId xmlns:p14="http://schemas.microsoft.com/office/powerpoint/2010/main" val="2921774388"/>
       </p:ext>
     </p:extLst>
   </p:cSld>
@@ -1222,7 +1150,19 @@
           <a:p>
             <a:r>
               <a:rPr lang="en-US" dirty="0"/>
-              <a:t>With text data, transformers and recurrent neural networks are established deep learning technologies, appropriate for detection, classification, segmentation, recommendation, and creation tasks.  These will solve 99% of text problems, or at least get you started in the right direction.</a:t>
+              <a:t>In in his book, </a:t>
+            </a:r>
+            <a:r>
+              <a:rPr lang="en-US" i="1" dirty="0"/>
+              <a:t>Data Architecture: A Primer for the Data Scientist, </a:t>
+            </a:r>
+            <a:r>
+              <a:rPr lang="en-US" i="0" dirty="0"/>
+              <a:t>Bill Inman makes a distinction between two foundational types of data – between structured data and its unstructured counterpart.  A</a:t>
+            </a:r>
+            <a:r>
+              <a:rPr lang="en-US" dirty="0"/>
+              <a:t>s he points out, most of the world’s data is unstructured.  So, what’s the difference between the two? </a:t>
             </a:r>
           </a:p>
           <a:p>
@@ -1230,24 +1170,38 @@
           </a:p>
           <a:p>
             <a:r>
+              <a:rPr lang="en-US" b="0" i="0" dirty="0">
+                <a:solidFill>
+                  <a:srgbClr val="333333"/>
+                </a:solidFill>
+                <a:effectLst/>
+                <a:latin typeface="Georgia" panose="02040502050405020303" pitchFamily="18" charset="0"/>
+              </a:rPr>
+              <a:t>Structured data is easy to search and organize because it is usually contained in rows and columns and its elements can be mapped into fixed, pre-defined fields.  </a:t>
+            </a:r>
+            <a:r>
               <a:rPr lang="en-US" dirty="0"/>
-              <a:t>Some specific models you might want to consider are listed in green.  Google’s BERT is a solid choice for these kinds of tasks – a transformer that acts in the encoder phase.  For creation tasks, a good choice is GPT, a transformer that focuses on the decoder phase.  And of course, Generative Adversarial Networks or GANs are another choice.  Keep in mind, however, that text generating GANs are a unique animal, different and distinct from GANs used to generate images.</a:t>
+              <a:t>Structured data is of two types.  The first type is data which comes from a database management system – Oracle, SQLServer, etc…  The Epic healthcare system – used by UF Health – is a structured data source, though it also stores unstructured text data in the form of physician notes.  The second is repetitive data, consisting of structured records coming from a variety of non-database sources.  Some examples of repetitive data include sensor output, telephone call records, metered data, and so forth. </a:t>
             </a:r>
           </a:p>
           <a:p>
             <a:endParaRPr lang="en-US" dirty="0"/>
           </a:p>
           <a:p>
-            <a:endParaRPr lang="en-US" dirty="0"/>
-          </a:p>
-          <a:p>
-            <a:endParaRPr lang="en-US" dirty="0"/>
-          </a:p>
-          <a:p>
-            <a:endParaRPr lang="en-US" dirty="0"/>
-          </a:p>
-          <a:p>
-            <a:endParaRPr lang="en-US" dirty="0"/>
+            <a:r>
+              <a:rPr lang="en-US" b="0" i="0" dirty="0">
+                <a:solidFill>
+                  <a:srgbClr val="333333"/>
+                </a:solidFill>
+                <a:effectLst/>
+                <a:latin typeface="Georgia" panose="02040502050405020303" pitchFamily="18" charset="0"/>
+              </a:rPr>
+              <a:t>Unstructured data is data that cannot be contained in a row-column database and does not have an associated data model.  Each record is unique in terms of its structure and content.  Now t</a:t>
+            </a:r>
+            <a:r>
+              <a:rPr lang="en-US" dirty="0"/>
+              <a:t>here are two types of unstructured data – textual and non-textual.  Examples of textual data include emails, transcribed conversations, literary texts, and so on.  Non-textual data includes images, video, and audio recordings.</a:t>
+            </a:r>
           </a:p>
         </p:txBody>
       </p:sp>
@@ -1277,7 +1231,7 @@
     </p:spTree>
     <p:extLst>
       <p:ext uri="{BB962C8B-B14F-4D97-AF65-F5344CB8AC3E}">
-        <p14:creationId xmlns:p14="http://schemas.microsoft.com/office/powerpoint/2010/main" val="132608395"/>
+        <p14:creationId xmlns:p14="http://schemas.microsoft.com/office/powerpoint/2010/main" val="107510316"/>
       </p:ext>
     </p:extLst>
   </p:cSld>
@@ -1333,33 +1287,16 @@
           <a:p>
             <a:r>
               <a:rPr lang="en-US" dirty="0"/>
-              <a:t>Convolutional neural networks (CNNs) have been the bread and butter of the image world for some time now.  In short, CNNs do it all.  Specific models you might wish to consider are listed in green.  For detection, consider </a:t>
-            </a:r>
-            <a:r>
-              <a:rPr lang="en-US" b="1" dirty="0"/>
-              <a:t>single shot detection models </a:t>
-            </a:r>
+              <a:t>With our primary data sources identified, let’s organize everything in a table.  On the leftmost column, our data sources are listed, followed by a column of generic questions we might like to ask of our data, another column which lists the related AI task for each question, and finally a column of AI methods and technologies.  This table, then, becomes a roadmap to guide your AI learning.  The question and AI task columns are self-explanatory, but I’d like to take a few seconds to unpack the abbreviations in the Methods column.  Don’t worry about the vocabulary at this point as these terms will be defined in our workshops.  But let’s quickly run through the acronyms in the Methods column.  NLP – Natural Language Processing; RNN – Recurrent Neural Network;  CNN – Convolutional Neural Network; GAN – Generative Adversarial Network;  RAPIDS – Nvidia’s data science framework;  Transformer – A new kind of neural network.</a:t>
+            </a:r>
+          </a:p>
+          <a:p>
+            <a:endParaRPr lang="en-US" dirty="0"/>
+          </a:p>
+          <a:p>
             <a:r>
               <a:rPr lang="en-US" dirty="0"/>
-              <a:t>(SSDs) or YOLO (real-time object detection).  Faster-RCNN or EfficientDet are also options, depending on the computational resources available.  </a:t>
-            </a:r>
-          </a:p>
-          <a:p>
-            <a:endParaRPr lang="en-US" dirty="0"/>
-          </a:p>
-          <a:p>
-            <a:r>
-              <a:rPr lang="en-US" dirty="0"/>
-              <a:t>Classification is a typical CNN task, with ResNet and its variants being popular.  And finally – for segmentation tasks – Mask-RCNN or Unet ought to be considered.  More recently, the image research community has begun to embrace transformers, now that their performance is as good as or better than CNNs.  </a:t>
-            </a:r>
-          </a:p>
-          <a:p>
-            <a:endParaRPr lang="en-US" dirty="0"/>
-          </a:p>
-          <a:p>
-            <a:r>
-              <a:rPr lang="en-US" dirty="0"/>
-              <a:t>For image creation, GANs continue to be the research tool of choice, typically constructed with CNN components. Another recent development has been the merging of transformers and GANs, with TransGAN being a prominent example.</a:t>
+              <a:t>We will now consider each data source, the types of questions one can ask of each, and the associated AI methods. </a:t>
             </a:r>
           </a:p>
           <a:p>
@@ -1399,7 +1336,7 @@
     </p:spTree>
     <p:extLst>
       <p:ext uri="{BB962C8B-B14F-4D97-AF65-F5344CB8AC3E}">
-        <p14:creationId xmlns:p14="http://schemas.microsoft.com/office/powerpoint/2010/main" val="3841188136"/>
+        <p14:creationId xmlns:p14="http://schemas.microsoft.com/office/powerpoint/2010/main" val="1003415448"/>
       </p:ext>
     </p:extLst>
   </p:cSld>
@@ -1453,15 +1390,66 @@
           <a:bodyPr/>
           <a:lstStyle/>
           <a:p>
+            <a:pPr marL="0" marR="0" lvl="0" indent="0" algn="l" defTabSz="914400" rtl="0" eaLnBrk="1" fontAlgn="auto" latinLnBrk="0" hangingPunct="1">
+              <a:lnSpc>
+                <a:spcPct val="100000"/>
+              </a:lnSpc>
+              <a:spcBef>
+                <a:spcPts val="0"/>
+              </a:spcBef>
+              <a:spcAft>
+                <a:spcPts val="0"/>
+              </a:spcAft>
+              <a:buClrTx/>
+              <a:buSzTx/>
+              <a:buFontTx/>
+              <a:buNone/>
+              <a:tabLst/>
+              <a:defRPr/>
+            </a:pPr>
             <a:r>
               <a:rPr lang="en-US" dirty="0"/>
-              <a:t>Video data is unique, being a time series of images.  As with image data, convolutional neural networks have captured most of this market, though CNNs are frequently paired with RNNs as there is both temporal and spatial characteristics in each image frame.  With video, single and multi-object tracking is also possible.  Interestingly, there are now video GANs, which basically build frame by frame what it thinks the video should look like.  This is cutting-edge technology.</a:t>
-            </a:r>
-          </a:p>
-          <a:p>
+              <a:t>In the case of structured data – data derived from databases or repetitive data from sensors – the Nvidia RAPIDS development environment is your best starting point.  RAPIDS provides a set of useful libraries, with machine learning functions for almost any research task.  The RAPIDS cuDF library, for example, is equivalent to the popular Pandas library which supports dataframes as well as basic data management and cleaning.   </a:t>
+            </a:r>
+          </a:p>
+          <a:p>
+            <a:pPr marL="0" marR="0" lvl="0" indent="0" algn="l" defTabSz="914400" rtl="0" eaLnBrk="1" fontAlgn="auto" latinLnBrk="0" hangingPunct="1">
+              <a:lnSpc>
+                <a:spcPct val="100000"/>
+              </a:lnSpc>
+              <a:spcBef>
+                <a:spcPts val="0"/>
+              </a:spcBef>
+              <a:spcAft>
+                <a:spcPts val="0"/>
+              </a:spcAft>
+              <a:buClrTx/>
+              <a:buSzTx/>
+              <a:buFontTx/>
+              <a:buNone/>
+              <a:tabLst/>
+              <a:defRPr/>
+            </a:pPr>
             <a:endParaRPr lang="en-US" dirty="0"/>
           </a:p>
           <a:p>
+            <a:pPr marL="0" marR="0" lvl="0" indent="0" algn="l" defTabSz="914400" rtl="0" eaLnBrk="1" fontAlgn="auto" latinLnBrk="0" hangingPunct="1">
+              <a:lnSpc>
+                <a:spcPct val="100000"/>
+              </a:lnSpc>
+              <a:spcBef>
+                <a:spcPts val="0"/>
+              </a:spcBef>
+              <a:spcAft>
+                <a:spcPts val="0"/>
+              </a:spcAft>
+              <a:buClrTx/>
+              <a:buSzTx/>
+              <a:buFontTx/>
+              <a:buNone/>
+              <a:tabLst/>
+              <a:defRPr/>
+            </a:pPr>
             <a:endParaRPr lang="en-US" dirty="0"/>
           </a:p>
           <a:p>
@@ -1495,7 +1483,7 @@
     </p:spTree>
     <p:extLst>
       <p:ext uri="{BB962C8B-B14F-4D97-AF65-F5344CB8AC3E}">
-        <p14:creationId xmlns:p14="http://schemas.microsoft.com/office/powerpoint/2010/main" val="2566424567"/>
+        <p14:creationId xmlns:p14="http://schemas.microsoft.com/office/powerpoint/2010/main" val="268399345"/>
       </p:ext>
     </p:extLst>
   </p:cSld>
@@ -1551,8 +1539,20 @@
           <a:p>
             <a:r>
               <a:rPr lang="en-US" dirty="0"/>
-              <a:t>Audio is another interesting format.  Many audio methods are derived from a MEL spectrum representation, a 2D spectrogram of the recording.  Like video, audio is also a time series.  Transformers, CNNs, RNNs, and GANs can all be used with audio data.  Now that we have covered the various types of data and their associated methods, it’s time to do something practical.</a:t>
-            </a:r>
+              <a:t>With text data, transformers and recurrent neural networks are established deep learning technologies, appropriate for detection, classification, segmentation, recommendation, and creation tasks.  These will solve most text problems, or at least get you started in the right direction.  Generative Adversarial Networks or GANs are another choice.  However, keep in mind that text generating GANs are a unique animal, different and distinct from GANs used to generate images.</a:t>
+            </a:r>
+          </a:p>
+          <a:p>
+            <a:endParaRPr lang="en-US" dirty="0"/>
+          </a:p>
+          <a:p>
+            <a:r>
+              <a:rPr lang="en-US" dirty="0"/>
+              <a:t>Some specific model you might wish to consider are listed in blue.</a:t>
+            </a:r>
+          </a:p>
+          <a:p>
+            <a:endParaRPr lang="en-US" dirty="0"/>
           </a:p>
           <a:p>
             <a:endParaRPr lang="en-US" dirty="0"/>
@@ -1591,7 +1591,7 @@
     </p:spTree>
     <p:extLst>
       <p:ext uri="{BB962C8B-B14F-4D97-AF65-F5344CB8AC3E}">
-        <p14:creationId xmlns:p14="http://schemas.microsoft.com/office/powerpoint/2010/main" val="2786040527"/>
+        <p14:creationId xmlns:p14="http://schemas.microsoft.com/office/powerpoint/2010/main" val="132608395"/>
       </p:ext>
     </p:extLst>
   </p:cSld>
@@ -1647,15 +1647,33 @@
           <a:p>
             <a:r>
               <a:rPr lang="en-US" dirty="0"/>
-              <a:t>We have now arrived at our 2</a:t>
-            </a:r>
-            <a:r>
-              <a:rPr lang="en-US" baseline="30000" dirty="0"/>
-              <a:t>nd</a:t>
-            </a:r>
+              <a:t>Convolutional neural networks (CNNs) have been the bread and butter of the image world for some time now.  In short, CNNs do it all.  For image creation, GANs continue to be the tool of choice, typically constructed with CNN components.  Another recent development has been the merging of transformers and GANs, with TransGAN being a prominent example.</a:t>
+            </a:r>
+          </a:p>
+          <a:p>
+            <a:endParaRPr lang="en-US" dirty="0"/>
+          </a:p>
+          <a:p>
             <a:r>
               <a:rPr lang="en-US" dirty="0"/>
-              <a:t> hands-on activity.  For the next 5 minutes, I would like for you to describe the data you’re currently working with and possible AI methods to use on that data.  Grab a pen and a pad of paper or fire up your word processor and write out a response.</a:t>
+              <a:t>Again, specific models you might wish to consider are listed in blue.  I will not cover those right now. But my slides will be available as a .pdf.</a:t>
+            </a:r>
+          </a:p>
+          <a:p>
+            <a:endParaRPr lang="en-US" dirty="0"/>
+          </a:p>
+          <a:p>
+            <a:r>
+              <a:rPr lang="en-US" dirty="0"/>
+              <a:t>For detection, consider </a:t>
+            </a:r>
+            <a:r>
+              <a:rPr lang="en-US" b="1" dirty="0"/>
+              <a:t>single shot detection models </a:t>
+            </a:r>
+            <a:r>
+              <a:rPr lang="en-US" dirty="0"/>
+              <a:t>(SSDs) or YOLO (real-time object detection).  Faster-RCNN or EfficientDet are also options, depending on the computational resources available.  Classification is a typical CNN task, with ResNet and its variants being popular.  And finally – for segmentation tasks – Mask-RCNN or Unet ought to be considered.  </a:t>
             </a:r>
           </a:p>
           <a:p>
@@ -1689,7 +1707,7 @@
     </p:spTree>
     <p:extLst>
       <p:ext uri="{BB962C8B-B14F-4D97-AF65-F5344CB8AC3E}">
-        <p14:creationId xmlns:p14="http://schemas.microsoft.com/office/powerpoint/2010/main" val="4235018632"/>
+        <p14:creationId xmlns:p14="http://schemas.microsoft.com/office/powerpoint/2010/main" val="3841188136"/>
       </p:ext>
     </p:extLst>
   </p:cSld>
@@ -1745,7 +1763,7 @@
           <a:p>
             <a:r>
               <a:rPr lang="en-US" dirty="0"/>
-              <a:t>In a nutshell, my hope is that you will…  … once you complete this workshop series.</a:t>
+              <a:t>So, let’s start with the big picture.  The Practicum AI program is designed to help you think about and creatively apply AI to make the world a better place.</a:t>
             </a:r>
           </a:p>
           <a:p>
@@ -1754,7 +1772,7 @@
           <a:p>
             <a:r>
               <a:rPr lang="en-US" dirty="0"/>
-              <a:t>I view the AI opportunity as a creative challenge of the first order.  Note:  I did not say it was a technical challenge.  Yes, you will participate in a considerable number of technical activities in this workshop series.  But more importantly, the question is,  “What do you want to do?  What problems or research questions interest you?”  Once you answer that, everything else falls into place.  The best learning happens when you have a clear goal in mind.    </a:t>
+              <a:t>You might be surprised to learn that we view the AI opportunity as a creative challenge of the first order.  Of course, you will participate in a considerable number of technical activities in this workshop series.  But the more important question is,  “What do you want to do?  What problems or research questions interest you?”  Once you answer that, everything else falls into place.  The best learning happens when you have a clear goal in mind.    </a:t>
             </a:r>
           </a:p>
           <a:p>
@@ -1848,83 +1866,19 @@
           <a:bodyPr/>
           <a:lstStyle/>
           <a:p>
-            <a:pPr marL="0" marR="0" lvl="0" indent="0" algn="l" defTabSz="914400" rtl="0" eaLnBrk="1" fontAlgn="auto" latinLnBrk="0" hangingPunct="1">
-              <a:lnSpc>
-                <a:spcPct val="100000"/>
-              </a:lnSpc>
-              <a:spcBef>
-                <a:spcPts val="0"/>
-              </a:spcBef>
-              <a:spcAft>
-                <a:spcPts val="0"/>
-              </a:spcAft>
-              <a:buClrTx/>
-              <a:buSzTx/>
-              <a:buFontTx/>
-              <a:buNone/>
-              <a:tabLst/>
-              <a:defRPr/>
-            </a:pPr>
-            <a:r>
-              <a:rPr lang="en-US" dirty="0">
-                <a:solidFill>
-                  <a:schemeClr val="accent1">
-                    <a:lumMod val="75000"/>
-                  </a:schemeClr>
-                </a:solidFill>
-                <a:latin typeface="Palatino Linotype" panose="02040502050505030304" pitchFamily="18" charset="0"/>
-              </a:rPr>
-              <a:t>If you would like to participate in the Practicum AI Workshop series, please send your completed learning plan to us.  Applicants who commit to the full sequence and are interested in becoming Practicum AI Advisors will be given preference.  We have a </a:t>
-            </a:r>
-            <a:r>
-              <a:rPr lang="en-US" b="1" dirty="0">
-                <a:solidFill>
-                  <a:schemeClr val="accent1">
-                    <a:lumMod val="75000"/>
-                  </a:schemeClr>
-                </a:solidFill>
-                <a:latin typeface="Palatino Linotype" panose="02040502050505030304" pitchFamily="18" charset="0"/>
-              </a:rPr>
-              <a:t>limited</a:t>
-            </a:r>
-            <a:r>
-              <a:rPr lang="en-US" dirty="0">
-                <a:solidFill>
-                  <a:schemeClr val="accent1">
-                    <a:lumMod val="75000"/>
-                  </a:schemeClr>
-                </a:solidFill>
-                <a:latin typeface="Palatino Linotype" panose="02040502050505030304" pitchFamily="18" charset="0"/>
-              </a:rPr>
-              <a:t> number of seats – only 25 applicants in this initial cohort.  As the Practicum AI program is still in beta, we will be asking you for your candid feedback on the presentations and exercises.  Your evaluation is most important to us as we want to create a program which meets student needs.</a:t>
-            </a:r>
-          </a:p>
-          <a:p>
-            <a:pPr marL="0" marR="0" lvl="0" indent="0" algn="l" defTabSz="914400" rtl="0" eaLnBrk="1" fontAlgn="auto" latinLnBrk="0" hangingPunct="1">
-              <a:lnSpc>
-                <a:spcPct val="100000"/>
-              </a:lnSpc>
-              <a:spcBef>
-                <a:spcPts val="0"/>
-              </a:spcBef>
-              <a:spcAft>
-                <a:spcPts val="0"/>
-              </a:spcAft>
-              <a:buClrTx/>
-              <a:buSzTx/>
-              <a:buFontTx/>
-              <a:buNone/>
-              <a:tabLst/>
-              <a:defRPr/>
-            </a:pPr>
-            <a:endParaRPr lang="en-US" dirty="0">
-              <a:solidFill>
-                <a:schemeClr val="accent1">
-                  <a:lumMod val="75000"/>
-                </a:schemeClr>
-              </a:solidFill>
-              <a:latin typeface="Palatino Linotype" panose="02040502050505030304" pitchFamily="18" charset="0"/>
-            </a:endParaRPr>
+            <a:r>
+              <a:rPr lang="en-US" dirty="0"/>
+              <a:t>Video data is unique, being a time series of images.  As with image data, convolutional neural networks have captured most of this market, though CNNs are frequently paired with RNNs as there is both temporal and spatial characteristics in each image frame.  With video, single and multi-object tracking is also possible.  Interestingly, there are now video GANs, which basically build frame by frame what it thinks the video should look like.  This is cutting-edge technology.</a:t>
+            </a:r>
+          </a:p>
+          <a:p>
+            <a:endParaRPr lang="en-US" dirty="0"/>
+          </a:p>
+          <a:p>
+            <a:endParaRPr lang="en-US" dirty="0"/>
+          </a:p>
+          <a:p>
+            <a:endParaRPr lang="en-US" dirty="0"/>
           </a:p>
         </p:txBody>
       </p:sp>
@@ -1954,7 +1908,7 @@
     </p:spTree>
     <p:extLst>
       <p:ext uri="{BB962C8B-B14F-4D97-AF65-F5344CB8AC3E}">
-        <p14:creationId xmlns:p14="http://schemas.microsoft.com/office/powerpoint/2010/main" val="441042443"/>
+        <p14:creationId xmlns:p14="http://schemas.microsoft.com/office/powerpoint/2010/main" val="2566424567"/>
       </p:ext>
     </p:extLst>
   </p:cSld>
@@ -2010,8 +1964,17 @@
           <a:p>
             <a:r>
               <a:rPr lang="en-US" dirty="0"/>
-              <a:t>Okay – let’s quickly summarize what we covered in today’s workshop.</a:t>
-            </a:r>
+              <a:t>Audio is another interesting format.  Many audio methods are derived from a MEL spectrum representation, a 2D spectrogram of the recording.  Like video, audio is also a time series.  Transformers, CNNs, RNNs, and GANs can all be used with audio data.  Now that we have covered the various types of data and their associated methods, it’s time to do something practical.</a:t>
+            </a:r>
+          </a:p>
+          <a:p>
+            <a:endParaRPr lang="en-US" dirty="0"/>
+          </a:p>
+          <a:p>
+            <a:endParaRPr lang="en-US" dirty="0"/>
+          </a:p>
+          <a:p>
+            <a:endParaRPr lang="en-US" dirty="0"/>
           </a:p>
         </p:txBody>
       </p:sp>
@@ -2041,7 +2004,7 @@
     </p:spTree>
     <p:extLst>
       <p:ext uri="{BB962C8B-B14F-4D97-AF65-F5344CB8AC3E}">
-        <p14:creationId xmlns:p14="http://schemas.microsoft.com/office/powerpoint/2010/main" val="4007547773"/>
+        <p14:creationId xmlns:p14="http://schemas.microsoft.com/office/powerpoint/2010/main" val="2786040527"/>
       </p:ext>
     </p:extLst>
   </p:cSld>
@@ -2097,11 +2060,16 @@
           <a:p>
             <a:r>
               <a:rPr lang="en-US" dirty="0"/>
-              <a:t>And finally, do we have any questions?  For next week, you have a couple readings.  And I hope you will take time to make an entry in your AI journal and join the conversation on the Discussion Board.</a:t>
-            </a:r>
-          </a:p>
-          <a:p>
-            <a:endParaRPr lang="en-US" dirty="0"/>
+              <a:t>We have now arrived at our 2</a:t>
+            </a:r>
+            <a:r>
+              <a:rPr lang="en-US" baseline="30000" dirty="0"/>
+              <a:t>nd</a:t>
+            </a:r>
+            <a:r>
+              <a:rPr lang="en-US" dirty="0"/>
+              <a:t> hands-on activity.  For the next 5 minutes, I would like for you to describe the data you’re currently working with and possible AI methods to use on that data.  Grab a pen and a pad of paper or fire up your word processor and write out a response.</a:t>
+            </a:r>
           </a:p>
           <a:p>
             <a:endParaRPr lang="en-US" dirty="0"/>
@@ -2134,7 +2102,7 @@
     </p:spTree>
     <p:extLst>
       <p:ext uri="{BB962C8B-B14F-4D97-AF65-F5344CB8AC3E}">
-        <p14:creationId xmlns:p14="http://schemas.microsoft.com/office/powerpoint/2010/main" val="1236461964"/>
+        <p14:creationId xmlns:p14="http://schemas.microsoft.com/office/powerpoint/2010/main" val="4235018632"/>
       </p:ext>
     </p:extLst>
   </p:cSld>
@@ -2188,7 +2156,197 @@
           <a:bodyPr/>
           <a:lstStyle/>
           <a:p>
-            <a:endParaRPr lang="en-US" dirty="0"/>
+            <a:pPr marL="0" marR="0" lvl="0" indent="0" algn="l" defTabSz="914400" rtl="0" eaLnBrk="1" fontAlgn="auto" latinLnBrk="0" hangingPunct="1">
+              <a:lnSpc>
+                <a:spcPct val="100000"/>
+              </a:lnSpc>
+              <a:spcBef>
+                <a:spcPts val="0"/>
+              </a:spcBef>
+              <a:spcAft>
+                <a:spcPts val="0"/>
+              </a:spcAft>
+              <a:buClrTx/>
+              <a:buSzTx/>
+              <a:buFontTx/>
+              <a:buNone/>
+              <a:tabLst/>
+              <a:defRPr/>
+            </a:pPr>
+            <a:r>
+              <a:rPr lang="en-US" dirty="0">
+                <a:solidFill>
+                  <a:schemeClr val="accent1">
+                    <a:lumMod val="75000"/>
+                  </a:schemeClr>
+                </a:solidFill>
+                <a:latin typeface="Palatino Linotype" panose="02040502050505030304" pitchFamily="18" charset="0"/>
+              </a:rPr>
+              <a:t>If you would like to participate in the Practicum AI Workshop series, please fill out the Qualtrix form if you have not done so.  Applicants who commit to the full sequence and are interested in becoming Practicum AI Advisors will be given preference.  </a:t>
+            </a:r>
+          </a:p>
+          <a:p>
+            <a:pPr marL="0" marR="0" lvl="0" indent="0" algn="l" defTabSz="914400" rtl="0" eaLnBrk="1" fontAlgn="auto" latinLnBrk="0" hangingPunct="1">
+              <a:lnSpc>
+                <a:spcPct val="100000"/>
+              </a:lnSpc>
+              <a:spcBef>
+                <a:spcPts val="0"/>
+              </a:spcBef>
+              <a:spcAft>
+                <a:spcPts val="0"/>
+              </a:spcAft>
+              <a:buClrTx/>
+              <a:buSzTx/>
+              <a:buFontTx/>
+              <a:buNone/>
+              <a:tabLst/>
+              <a:defRPr/>
+            </a:pPr>
+            <a:endParaRPr lang="en-US" dirty="0">
+              <a:solidFill>
+                <a:schemeClr val="accent1">
+                  <a:lumMod val="75000"/>
+                </a:schemeClr>
+              </a:solidFill>
+              <a:latin typeface="Palatino Linotype" panose="02040502050505030304" pitchFamily="18" charset="0"/>
+            </a:endParaRPr>
+          </a:p>
+          <a:p>
+            <a:pPr marL="0" marR="0" lvl="0" indent="0" algn="l" defTabSz="914400" rtl="0" eaLnBrk="1" fontAlgn="auto" latinLnBrk="0" hangingPunct="1">
+              <a:lnSpc>
+                <a:spcPct val="100000"/>
+              </a:lnSpc>
+              <a:spcBef>
+                <a:spcPts val="0"/>
+              </a:spcBef>
+              <a:spcAft>
+                <a:spcPts val="0"/>
+              </a:spcAft>
+              <a:buClrTx/>
+              <a:buSzTx/>
+              <a:buFontTx/>
+              <a:buNone/>
+              <a:tabLst/>
+              <a:defRPr/>
+            </a:pPr>
+            <a:r>
+              <a:rPr lang="en-US" dirty="0">
+                <a:solidFill>
+                  <a:schemeClr val="accent1">
+                    <a:lumMod val="75000"/>
+                  </a:schemeClr>
+                </a:solidFill>
+                <a:latin typeface="Palatino Linotype" panose="02040502050505030304" pitchFamily="18" charset="0"/>
+              </a:rPr>
+              <a:t>Unfortunately, we have a </a:t>
+            </a:r>
+            <a:r>
+              <a:rPr lang="en-US" b="1" dirty="0">
+                <a:solidFill>
+                  <a:schemeClr val="accent1">
+                    <a:lumMod val="75000"/>
+                  </a:schemeClr>
+                </a:solidFill>
+                <a:latin typeface="Palatino Linotype" panose="02040502050505030304" pitchFamily="18" charset="0"/>
+              </a:rPr>
+              <a:t>limited</a:t>
+            </a:r>
+            <a:r>
+              <a:rPr lang="en-US" dirty="0">
+                <a:solidFill>
+                  <a:schemeClr val="accent1">
+                    <a:lumMod val="75000"/>
+                  </a:schemeClr>
+                </a:solidFill>
+                <a:latin typeface="Palatino Linotype" panose="02040502050505030304" pitchFamily="18" charset="0"/>
+              </a:rPr>
+              <a:t> number of seats – only 25 applicants in this initial cohort.  As the Practicum AI program is still in beta, we’re looking for participants willing to provide candid feedback on the presentations and exercises.</a:t>
+            </a:r>
+          </a:p>
+          <a:p>
+            <a:pPr marL="0" marR="0" lvl="0" indent="0" algn="l" defTabSz="914400" rtl="0" eaLnBrk="1" fontAlgn="auto" latinLnBrk="0" hangingPunct="1">
+              <a:lnSpc>
+                <a:spcPct val="100000"/>
+              </a:lnSpc>
+              <a:spcBef>
+                <a:spcPts val="0"/>
+              </a:spcBef>
+              <a:spcAft>
+                <a:spcPts val="0"/>
+              </a:spcAft>
+              <a:buClrTx/>
+              <a:buSzTx/>
+              <a:buFontTx/>
+              <a:buNone/>
+              <a:tabLst/>
+              <a:defRPr/>
+            </a:pPr>
+            <a:endParaRPr lang="en-US" dirty="0">
+              <a:solidFill>
+                <a:schemeClr val="accent1">
+                  <a:lumMod val="75000"/>
+                </a:schemeClr>
+              </a:solidFill>
+              <a:latin typeface="Palatino Linotype" panose="02040502050505030304" pitchFamily="18" charset="0"/>
+            </a:endParaRPr>
+          </a:p>
+          <a:p>
+            <a:pPr marL="0" marR="0" lvl="0" indent="0" algn="l" defTabSz="914400" rtl="0" eaLnBrk="1" fontAlgn="auto" latinLnBrk="0" hangingPunct="1">
+              <a:lnSpc>
+                <a:spcPct val="100000"/>
+              </a:lnSpc>
+              <a:spcBef>
+                <a:spcPts val="0"/>
+              </a:spcBef>
+              <a:spcAft>
+                <a:spcPts val="0"/>
+              </a:spcAft>
+              <a:buClrTx/>
+              <a:buSzTx/>
+              <a:buFontTx/>
+              <a:buNone/>
+              <a:tabLst/>
+              <a:defRPr/>
+            </a:pPr>
+            <a:r>
+              <a:rPr lang="en-US" dirty="0">
+                <a:solidFill>
+                  <a:schemeClr val="accent1">
+                    <a:lumMod val="75000"/>
+                  </a:schemeClr>
+                </a:solidFill>
+                <a:latin typeface="Palatino Linotype" panose="02040502050505030304" pitchFamily="18" charset="0"/>
+              </a:rPr>
+              <a:t>Your evaluation is most important to us as we want to create a program which meets student needs.</a:t>
+            </a:r>
+          </a:p>
+          <a:p>
+            <a:pPr marL="0" marR="0" lvl="0" indent="0" algn="l" defTabSz="914400" rtl="0" eaLnBrk="1" fontAlgn="auto" latinLnBrk="0" hangingPunct="1">
+              <a:lnSpc>
+                <a:spcPct val="100000"/>
+              </a:lnSpc>
+              <a:spcBef>
+                <a:spcPts val="0"/>
+              </a:spcBef>
+              <a:spcAft>
+                <a:spcPts val="0"/>
+              </a:spcAft>
+              <a:buClrTx/>
+              <a:buSzTx/>
+              <a:buFontTx/>
+              <a:buNone/>
+              <a:tabLst/>
+              <a:defRPr/>
+            </a:pPr>
+            <a:endParaRPr lang="en-US" dirty="0">
+              <a:solidFill>
+                <a:schemeClr val="accent1">
+                  <a:lumMod val="75000"/>
+                </a:schemeClr>
+              </a:solidFill>
+              <a:latin typeface="Palatino Linotype" panose="02040502050505030304" pitchFamily="18" charset="0"/>
+            </a:endParaRPr>
           </a:p>
         </p:txBody>
       </p:sp>
@@ -2210,6 +2368,270 @@
             <a:fld id="{3148858F-F1DB-4027-9C85-CCA6849540DD}" type="slidenum">
               <a:rPr lang="en-US" smtClean="0"/>
               <a:t>23</a:t>
+            </a:fld>
+            <a:endParaRPr lang="en-US"/>
+          </a:p>
+        </p:txBody>
+      </p:sp>
+    </p:spTree>
+    <p:extLst>
+      <p:ext uri="{BB962C8B-B14F-4D97-AF65-F5344CB8AC3E}">
+        <p14:creationId xmlns:p14="http://schemas.microsoft.com/office/powerpoint/2010/main" val="441042443"/>
+      </p:ext>
+    </p:extLst>
+  </p:cSld>
+  <p:clrMapOvr>
+    <a:masterClrMapping/>
+  </p:clrMapOvr>
+</p:notes>
+</file>
+
+<file path=ppt/notesSlides/notesSlide24.xml><?xml version="1.0" encoding="utf-8"?>
+<p:notes xmlns:a="http://schemas.openxmlformats.org/drawingml/2006/main" xmlns:r="http://schemas.openxmlformats.org/officeDocument/2006/relationships" xmlns:p="http://schemas.openxmlformats.org/presentationml/2006/main">
+  <p:cSld>
+    <p:spTree>
+      <p:nvGrpSpPr>
+        <p:cNvPr id="1" name=""/>
+        <p:cNvGrpSpPr/>
+        <p:nvPr/>
+      </p:nvGrpSpPr>
+      <p:grpSpPr>
+        <a:xfrm>
+          <a:off x="0" y="0"/>
+          <a:ext cx="0" cy="0"/>
+          <a:chOff x="0" y="0"/>
+          <a:chExt cx="0" cy="0"/>
+        </a:xfrm>
+      </p:grpSpPr>
+      <p:sp>
+        <p:nvSpPr>
+          <p:cNvPr id="2" name="Slide Image Placeholder 1"/>
+          <p:cNvSpPr>
+            <a:spLocks noGrp="1" noRot="1" noChangeAspect="1"/>
+          </p:cNvSpPr>
+          <p:nvPr>
+            <p:ph type="sldImg"/>
+          </p:nvPr>
+        </p:nvSpPr>
+        <p:spPr/>
+      </p:sp>
+      <p:sp>
+        <p:nvSpPr>
+          <p:cNvPr id="3" name="Notes Placeholder 2"/>
+          <p:cNvSpPr>
+            <a:spLocks noGrp="1"/>
+          </p:cNvSpPr>
+          <p:nvPr>
+            <p:ph type="body" idx="1"/>
+          </p:nvPr>
+        </p:nvSpPr>
+        <p:spPr/>
+        <p:txBody>
+          <a:bodyPr/>
+          <a:lstStyle/>
+          <a:p>
+            <a:r>
+              <a:rPr lang="en-US" dirty="0"/>
+              <a:t>Okay – let’s quickly summarize what we covered in today’s workshop.</a:t>
+            </a:r>
+          </a:p>
+        </p:txBody>
+      </p:sp>
+      <p:sp>
+        <p:nvSpPr>
+          <p:cNvPr id="4" name="Slide Number Placeholder 3"/>
+          <p:cNvSpPr>
+            <a:spLocks noGrp="1"/>
+          </p:cNvSpPr>
+          <p:nvPr>
+            <p:ph type="sldNum" sz="quarter" idx="5"/>
+          </p:nvPr>
+        </p:nvSpPr>
+        <p:spPr/>
+        <p:txBody>
+          <a:bodyPr/>
+          <a:lstStyle/>
+          <a:p>
+            <a:fld id="{3148858F-F1DB-4027-9C85-CCA6849540DD}" type="slidenum">
+              <a:rPr lang="en-US" smtClean="0"/>
+              <a:t>24</a:t>
+            </a:fld>
+            <a:endParaRPr lang="en-US"/>
+          </a:p>
+        </p:txBody>
+      </p:sp>
+    </p:spTree>
+    <p:extLst>
+      <p:ext uri="{BB962C8B-B14F-4D97-AF65-F5344CB8AC3E}">
+        <p14:creationId xmlns:p14="http://schemas.microsoft.com/office/powerpoint/2010/main" val="4007547773"/>
+      </p:ext>
+    </p:extLst>
+  </p:cSld>
+  <p:clrMapOvr>
+    <a:masterClrMapping/>
+  </p:clrMapOvr>
+</p:notes>
+</file>
+
+<file path=ppt/notesSlides/notesSlide25.xml><?xml version="1.0" encoding="utf-8"?>
+<p:notes xmlns:a="http://schemas.openxmlformats.org/drawingml/2006/main" xmlns:r="http://schemas.openxmlformats.org/officeDocument/2006/relationships" xmlns:p="http://schemas.openxmlformats.org/presentationml/2006/main">
+  <p:cSld>
+    <p:spTree>
+      <p:nvGrpSpPr>
+        <p:cNvPr id="1" name=""/>
+        <p:cNvGrpSpPr/>
+        <p:nvPr/>
+      </p:nvGrpSpPr>
+      <p:grpSpPr>
+        <a:xfrm>
+          <a:off x="0" y="0"/>
+          <a:ext cx="0" cy="0"/>
+          <a:chOff x="0" y="0"/>
+          <a:chExt cx="0" cy="0"/>
+        </a:xfrm>
+      </p:grpSpPr>
+      <p:sp>
+        <p:nvSpPr>
+          <p:cNvPr id="2" name="Slide Image Placeholder 1"/>
+          <p:cNvSpPr>
+            <a:spLocks noGrp="1" noRot="1" noChangeAspect="1"/>
+          </p:cNvSpPr>
+          <p:nvPr>
+            <p:ph type="sldImg"/>
+          </p:nvPr>
+        </p:nvSpPr>
+        <p:spPr/>
+      </p:sp>
+      <p:sp>
+        <p:nvSpPr>
+          <p:cNvPr id="3" name="Notes Placeholder 2"/>
+          <p:cNvSpPr>
+            <a:spLocks noGrp="1"/>
+          </p:cNvSpPr>
+          <p:nvPr>
+            <p:ph type="body" idx="1"/>
+          </p:nvPr>
+        </p:nvSpPr>
+        <p:spPr/>
+        <p:txBody>
+          <a:bodyPr/>
+          <a:lstStyle/>
+          <a:p>
+            <a:r>
+              <a:rPr lang="en-US" dirty="0"/>
+              <a:t>And finally, do we have any questions?  For next week, you have a couple readings.  And I hope you will take time to make an entry in your AI journal and join the conversation on the Discussion Board.</a:t>
+            </a:r>
+          </a:p>
+          <a:p>
+            <a:endParaRPr lang="en-US" dirty="0"/>
+          </a:p>
+          <a:p>
+            <a:endParaRPr lang="en-US" dirty="0"/>
+          </a:p>
+        </p:txBody>
+      </p:sp>
+      <p:sp>
+        <p:nvSpPr>
+          <p:cNvPr id="4" name="Slide Number Placeholder 3"/>
+          <p:cNvSpPr>
+            <a:spLocks noGrp="1"/>
+          </p:cNvSpPr>
+          <p:nvPr>
+            <p:ph type="sldNum" sz="quarter" idx="5"/>
+          </p:nvPr>
+        </p:nvSpPr>
+        <p:spPr/>
+        <p:txBody>
+          <a:bodyPr/>
+          <a:lstStyle/>
+          <a:p>
+            <a:fld id="{3148858F-F1DB-4027-9C85-CCA6849540DD}" type="slidenum">
+              <a:rPr lang="en-US" smtClean="0"/>
+              <a:t>25</a:t>
+            </a:fld>
+            <a:endParaRPr lang="en-US"/>
+          </a:p>
+        </p:txBody>
+      </p:sp>
+    </p:spTree>
+    <p:extLst>
+      <p:ext uri="{BB962C8B-B14F-4D97-AF65-F5344CB8AC3E}">
+        <p14:creationId xmlns:p14="http://schemas.microsoft.com/office/powerpoint/2010/main" val="1236461964"/>
+      </p:ext>
+    </p:extLst>
+  </p:cSld>
+  <p:clrMapOvr>
+    <a:masterClrMapping/>
+  </p:clrMapOvr>
+</p:notes>
+</file>
+
+<file path=ppt/notesSlides/notesSlide26.xml><?xml version="1.0" encoding="utf-8"?>
+<p:notes xmlns:a="http://schemas.openxmlformats.org/drawingml/2006/main" xmlns:r="http://schemas.openxmlformats.org/officeDocument/2006/relationships" xmlns:p="http://schemas.openxmlformats.org/presentationml/2006/main">
+  <p:cSld>
+    <p:spTree>
+      <p:nvGrpSpPr>
+        <p:cNvPr id="1" name=""/>
+        <p:cNvGrpSpPr/>
+        <p:nvPr/>
+      </p:nvGrpSpPr>
+      <p:grpSpPr>
+        <a:xfrm>
+          <a:off x="0" y="0"/>
+          <a:ext cx="0" cy="0"/>
+          <a:chOff x="0" y="0"/>
+          <a:chExt cx="0" cy="0"/>
+        </a:xfrm>
+      </p:grpSpPr>
+      <p:sp>
+        <p:nvSpPr>
+          <p:cNvPr id="2" name="Slide Image Placeholder 1"/>
+          <p:cNvSpPr>
+            <a:spLocks noGrp="1" noRot="1" noChangeAspect="1"/>
+          </p:cNvSpPr>
+          <p:nvPr>
+            <p:ph type="sldImg"/>
+          </p:nvPr>
+        </p:nvSpPr>
+        <p:spPr/>
+      </p:sp>
+      <p:sp>
+        <p:nvSpPr>
+          <p:cNvPr id="3" name="Notes Placeholder 2"/>
+          <p:cNvSpPr>
+            <a:spLocks noGrp="1"/>
+          </p:cNvSpPr>
+          <p:nvPr>
+            <p:ph type="body" idx="1"/>
+          </p:nvPr>
+        </p:nvSpPr>
+        <p:spPr/>
+        <p:txBody>
+          <a:bodyPr/>
+          <a:lstStyle/>
+          <a:p>
+            <a:endParaRPr lang="en-US" dirty="0"/>
+          </a:p>
+        </p:txBody>
+      </p:sp>
+      <p:sp>
+        <p:nvSpPr>
+          <p:cNvPr id="4" name="Slide Number Placeholder 3"/>
+          <p:cNvSpPr>
+            <a:spLocks noGrp="1"/>
+          </p:cNvSpPr>
+          <p:nvPr>
+            <p:ph type="sldNum" sz="quarter" idx="5"/>
+          </p:nvPr>
+        </p:nvSpPr>
+        <p:spPr/>
+        <p:txBody>
+          <a:bodyPr/>
+          <a:lstStyle/>
+          <a:p>
+            <a:fld id="{3148858F-F1DB-4027-9C85-CCA6849540DD}" type="slidenum">
+              <a:rPr lang="en-US" smtClean="0"/>
+              <a:t>26</a:t>
             </a:fld>
             <a:endParaRPr lang="en-US"/>
           </a:p>
@@ -2273,33 +2695,248 @@
           <a:lstStyle/>
           <a:p>
             <a:r>
-              <a:rPr lang="en-US" dirty="0"/>
-              <a:t>Unlike most technical learning experiences, our starting point is your interests, not the technology.  </a:t>
-            </a:r>
-          </a:p>
-          <a:p>
-            <a:endParaRPr lang="en-US" dirty="0"/>
-          </a:p>
-          <a:p>
-            <a:r>
-              <a:rPr lang="en-US" dirty="0"/>
-              <a:t>All too often, this gets turned around.  We start with the technology, without first having a clear idea of the research questions to be answered.  I first noticed this phenomenon when I worked at Rockwell in the 1990s.  At Rockwell, the technology came first, everything else was secondary.  We all believed that object-oriented programming would revolutionize the world, that the emerging internet and related technologies would usher in an age of never-ending profits.  For Rockwell, that never happened.  We should have started with our customers instead.</a:t>
-            </a:r>
-          </a:p>
-          <a:p>
-            <a:endParaRPr lang="en-US" dirty="0"/>
-          </a:p>
-          <a:p>
-            <a:r>
-              <a:rPr lang="en-US" dirty="0"/>
-              <a:t>But research alone is not enough, we also need something a bit more concrete.  Let’s start with some basic definitions…</a:t>
-            </a:r>
-          </a:p>
-          <a:p>
-            <a:endParaRPr lang="en-US" dirty="0"/>
-          </a:p>
-          <a:p>
-            <a:endParaRPr lang="en-US" dirty="0"/>
+              <a:rPr lang="en-US" sz="1200" b="0" i="0" kern="1200" dirty="0">
+                <a:solidFill>
+                  <a:schemeClr val="tx1"/>
+                </a:solidFill>
+                <a:effectLst/>
+                <a:latin typeface="+mn-lt"/>
+                <a:ea typeface="+mn-ea"/>
+                <a:cs typeface="+mn-cs"/>
+              </a:rPr>
+              <a:t>The field of AI is expansive…</a:t>
+            </a:r>
+          </a:p>
+          <a:p>
+            <a:endParaRPr lang="en-US" sz="1200" b="0" i="0" kern="1200" dirty="0">
+              <a:solidFill>
+                <a:schemeClr val="tx1"/>
+              </a:solidFill>
+              <a:effectLst/>
+              <a:latin typeface="+mn-lt"/>
+              <a:ea typeface="+mn-ea"/>
+              <a:cs typeface="+mn-cs"/>
+            </a:endParaRPr>
+          </a:p>
+          <a:p>
+            <a:r>
+              <a:rPr lang="en-US" sz="1200" b="0" i="0" kern="1200" dirty="0">
+                <a:solidFill>
+                  <a:schemeClr val="tx1"/>
+                </a:solidFill>
+                <a:effectLst/>
+                <a:latin typeface="+mn-lt"/>
+                <a:ea typeface="+mn-ea"/>
+                <a:cs typeface="+mn-cs"/>
+              </a:rPr>
+              <a:t>Often, the terms AI, Machine Learning, and Deep Learning are used interchangeably.  </a:t>
+            </a:r>
+          </a:p>
+          <a:p>
+            <a:endParaRPr lang="en-US" sz="1200" b="0" i="0" kern="1200" dirty="0">
+              <a:solidFill>
+                <a:schemeClr val="tx1"/>
+              </a:solidFill>
+              <a:effectLst/>
+              <a:latin typeface="+mn-lt"/>
+              <a:ea typeface="+mn-ea"/>
+              <a:cs typeface="+mn-cs"/>
+            </a:endParaRPr>
+          </a:p>
+          <a:p>
+            <a:r>
+              <a:rPr lang="en-US" sz="1200" b="0" i="0" kern="1200" dirty="0">
+                <a:solidFill>
+                  <a:schemeClr val="tx1"/>
+                </a:solidFill>
+                <a:effectLst/>
+                <a:latin typeface="+mn-lt"/>
+                <a:ea typeface="+mn-ea"/>
+                <a:cs typeface="+mn-cs"/>
+              </a:rPr>
+              <a:t>But as pictured here, they are distinct domains, with AI encompassing the other two.  Indeed, AI has a long and distinguished history.  In fact, a lot of interesting AI research happened in the 1950s.  </a:t>
+            </a:r>
+          </a:p>
+          <a:p>
+            <a:endParaRPr lang="en-US" sz="1200" b="0" i="0" kern="1200" dirty="0">
+              <a:solidFill>
+                <a:schemeClr val="tx1"/>
+              </a:solidFill>
+              <a:effectLst/>
+              <a:latin typeface="+mn-lt"/>
+              <a:ea typeface="+mn-ea"/>
+              <a:cs typeface="+mn-cs"/>
+            </a:endParaRPr>
+          </a:p>
+          <a:p>
+            <a:pPr marL="0" marR="0" lvl="0" indent="0" algn="l" defTabSz="914400" rtl="0" eaLnBrk="1" fontAlgn="auto" latinLnBrk="0" hangingPunct="1">
+              <a:lnSpc>
+                <a:spcPct val="100000"/>
+              </a:lnSpc>
+              <a:spcBef>
+                <a:spcPts val="0"/>
+              </a:spcBef>
+              <a:spcAft>
+                <a:spcPts val="0"/>
+              </a:spcAft>
+              <a:buClrTx/>
+              <a:buSzTx/>
+              <a:buFontTx/>
+              <a:buNone/>
+              <a:tabLst/>
+              <a:defRPr/>
+            </a:pPr>
+            <a:r>
+              <a:rPr lang="en-US" b="0" i="0" dirty="0">
+                <a:solidFill>
+                  <a:srgbClr val="202122"/>
+                </a:solidFill>
+                <a:effectLst/>
+                <a:latin typeface="Arial" panose="020B0604020202020204" pitchFamily="34" charset="0"/>
+              </a:rPr>
+              <a:t>Leading AI textbooks define the field of Artificial Intelligence as the study of "</a:t>
+            </a:r>
+            <a:r>
+              <a:rPr lang="en-US" b="0" i="0" u="none" strike="noStrike" dirty="0">
+                <a:solidFill>
+                  <a:srgbClr val="0645AD"/>
+                </a:solidFill>
+                <a:effectLst/>
+                <a:latin typeface="Arial" panose="020B0604020202020204" pitchFamily="34" charset="0"/>
+                <a:hlinkClick r:id="rId3" tooltip="Intelligent agent"/>
+              </a:rPr>
+              <a:t>intelligent agents</a:t>
+            </a:r>
+            <a:r>
+              <a:rPr lang="en-US" b="0" i="0" dirty="0">
+                <a:solidFill>
+                  <a:srgbClr val="202122"/>
+                </a:solidFill>
+                <a:effectLst/>
+                <a:latin typeface="Arial" panose="020B0604020202020204" pitchFamily="34" charset="0"/>
+              </a:rPr>
+              <a:t>": any system that perceives its environment and takes actions that maximize its chance of achieving its goals.  Such systems are capable of performing tasks humans are good at; </a:t>
+            </a:r>
+            <a:r>
+              <a:rPr lang="en-US" sz="1200" b="0" i="0" kern="1200" dirty="0">
+                <a:solidFill>
+                  <a:schemeClr val="tx1"/>
+                </a:solidFill>
+                <a:effectLst/>
+                <a:latin typeface="+mn-lt"/>
+                <a:ea typeface="+mn-ea"/>
+                <a:cs typeface="+mn-cs"/>
+              </a:rPr>
+              <a:t>for example, recognizing objects, making sense of speech, and decision making in a constrained environment.</a:t>
+            </a:r>
+          </a:p>
+          <a:p>
+            <a:endParaRPr lang="en-US" sz="1200" b="0" i="0" kern="1200" dirty="0">
+              <a:solidFill>
+                <a:schemeClr val="tx1"/>
+              </a:solidFill>
+              <a:effectLst/>
+              <a:latin typeface="+mn-lt"/>
+              <a:ea typeface="+mn-ea"/>
+              <a:cs typeface="+mn-cs"/>
+            </a:endParaRPr>
+          </a:p>
+          <a:p>
+            <a:r>
+              <a:rPr lang="en-US" sz="1200" b="0" i="0" kern="1200" dirty="0">
+                <a:solidFill>
+                  <a:schemeClr val="tx1"/>
+                </a:solidFill>
+                <a:effectLst/>
+                <a:latin typeface="+mn-lt"/>
+                <a:ea typeface="+mn-ea"/>
+                <a:cs typeface="+mn-cs"/>
+              </a:rPr>
+              <a:t>Machine learning is defined as the subfield of AI that applies statistical methods to enable computer systems to learn from data to achieve an end goal.  </a:t>
+            </a:r>
+          </a:p>
+          <a:p>
+            <a:endParaRPr lang="en-US" sz="1200" b="0" i="0" kern="1200" dirty="0">
+              <a:solidFill>
+                <a:schemeClr val="tx1"/>
+              </a:solidFill>
+              <a:effectLst/>
+              <a:latin typeface="+mn-lt"/>
+              <a:ea typeface="+mn-ea"/>
+              <a:cs typeface="+mn-cs"/>
+            </a:endParaRPr>
+          </a:p>
+          <a:p>
+            <a:r>
+              <a:rPr lang="en-US" sz="1200" b="0" i="0" kern="1200" dirty="0">
+                <a:solidFill>
+                  <a:schemeClr val="tx1"/>
+                </a:solidFill>
+                <a:effectLst/>
+                <a:latin typeface="+mn-lt"/>
+                <a:ea typeface="+mn-ea"/>
+                <a:cs typeface="+mn-cs"/>
+              </a:rPr>
+              <a:t>And finally, deep learning is a subfield of machine learning which focuses on neural networks.  A neural network is a special type of learning algorithm, inspired by billions of interconnected neurons in the human brain.</a:t>
+            </a:r>
+          </a:p>
+          <a:p>
+            <a:endParaRPr lang="en-US" sz="1200" b="0" i="0" kern="1200" dirty="0">
+              <a:solidFill>
+                <a:schemeClr val="tx1"/>
+              </a:solidFill>
+              <a:effectLst/>
+              <a:latin typeface="+mn-lt"/>
+              <a:ea typeface="+mn-ea"/>
+              <a:cs typeface="+mn-cs"/>
+            </a:endParaRPr>
+          </a:p>
+          <a:p>
+            <a:r>
+              <a:rPr lang="en-US" sz="1200" b="0" i="0" kern="1200" dirty="0">
+                <a:solidFill>
+                  <a:schemeClr val="tx1"/>
+                </a:solidFill>
+                <a:effectLst/>
+                <a:latin typeface="+mn-lt"/>
+                <a:ea typeface="+mn-ea"/>
+                <a:cs typeface="+mn-cs"/>
+              </a:rPr>
+              <a:t>Let’s consider a couple definitions…</a:t>
+            </a:r>
+          </a:p>
+          <a:p>
+            <a:endParaRPr lang="en-US" sz="1200" b="0" i="0" kern="1200" dirty="0">
+              <a:solidFill>
+                <a:schemeClr val="tx1"/>
+              </a:solidFill>
+              <a:effectLst/>
+              <a:latin typeface="+mn-lt"/>
+              <a:ea typeface="+mn-ea"/>
+              <a:cs typeface="+mn-cs"/>
+            </a:endParaRPr>
+          </a:p>
+          <a:p>
+            <a:endParaRPr lang="en-US" sz="1200" b="0" i="0" kern="1200" dirty="0">
+              <a:solidFill>
+                <a:schemeClr val="tx1"/>
+              </a:solidFill>
+              <a:effectLst/>
+              <a:latin typeface="+mn-lt"/>
+              <a:ea typeface="+mn-ea"/>
+              <a:cs typeface="+mn-cs"/>
+            </a:endParaRPr>
+          </a:p>
+          <a:p>
+            <a:endParaRPr lang="en-US" sz="1200" b="0" i="0" kern="1200" dirty="0">
+              <a:solidFill>
+                <a:schemeClr val="tx1"/>
+              </a:solidFill>
+              <a:effectLst/>
+              <a:latin typeface="+mn-lt"/>
+              <a:ea typeface="+mn-ea"/>
+              <a:cs typeface="+mn-cs"/>
+            </a:endParaRPr>
           </a:p>
           <a:p>
             <a:endParaRPr lang="en-US" dirty="0"/>
@@ -2332,7 +2969,7 @@
     </p:spTree>
     <p:extLst>
       <p:ext uri="{BB962C8B-B14F-4D97-AF65-F5344CB8AC3E}">
-        <p14:creationId xmlns:p14="http://schemas.microsoft.com/office/powerpoint/2010/main" val="1690277211"/>
+        <p14:creationId xmlns:p14="http://schemas.microsoft.com/office/powerpoint/2010/main" val="7792111"/>
       </p:ext>
     </p:extLst>
   </p:cSld>
@@ -2396,7 +3033,31 @@
                 <a:ea typeface="+mn-ea"/>
                 <a:cs typeface="+mn-cs"/>
               </a:rPr>
-              <a:t>Often, I hear individuals use the terms AI, Machine Learning, and Deep Learning interchangeably.  </a:t>
+              <a:t>… and here’s a definition of machine learning coined by Arthur Samuel in 1959.  This is concise and one of my personal favorites.  However, I also like this second definition: </a:t>
+            </a:r>
+            <a:r>
+              <a:rPr lang="en-US" sz="1200" b="0" i="1" kern="1200" dirty="0">
+                <a:solidFill>
+                  <a:schemeClr val="tx1"/>
+                </a:solidFill>
+                <a:effectLst/>
+                <a:latin typeface="+mn-lt"/>
+                <a:ea typeface="+mn-ea"/>
+                <a:cs typeface="+mn-cs"/>
+              </a:rPr>
+              <a:t>Machine learning is the science (and art) of programming computers so they can learn from data</a:t>
+            </a:r>
+            <a:r>
+              <a:rPr lang="en-US" sz="1200" b="0" i="0" kern="1200" dirty="0">
+                <a:solidFill>
+                  <a:schemeClr val="tx1"/>
+                </a:solidFill>
+                <a:effectLst/>
+                <a:latin typeface="+mn-lt"/>
+                <a:ea typeface="+mn-ea"/>
+                <a:cs typeface="+mn-cs"/>
+              </a:rPr>
+              <a:t>.  </a:t>
             </a:r>
           </a:p>
           <a:p>
@@ -2421,7 +3082,31 @@
                 <a:ea typeface="+mn-ea"/>
                 <a:cs typeface="+mn-cs"/>
               </a:rPr>
-              <a:t>But as pictured here, they are distinct domains, with AI encompassing the other two.  Interestingly, AI has a long and distinguished history.  In fact, a lot of interesting AI research happened in the 1950s.  You can learn about that early work in chapter 2 of our textbook.</a:t>
+              <a:t>Now, the key word in that second definition is </a:t>
+            </a:r>
+            <a:r>
+              <a:rPr lang="en-US" sz="1200" b="1" i="0" kern="1200" dirty="0">
+                <a:solidFill>
+                  <a:schemeClr val="tx1"/>
+                </a:solidFill>
+                <a:effectLst/>
+                <a:latin typeface="+mn-lt"/>
+                <a:ea typeface="+mn-ea"/>
+                <a:cs typeface="+mn-cs"/>
+              </a:rPr>
+              <a:t>data</a:t>
+            </a:r>
+            <a:r>
+              <a:rPr lang="en-US" sz="1200" b="0" i="0" kern="1200" dirty="0">
+                <a:solidFill>
+                  <a:schemeClr val="tx1"/>
+                </a:solidFill>
+                <a:effectLst/>
+                <a:latin typeface="+mn-lt"/>
+                <a:ea typeface="+mn-ea"/>
+                <a:cs typeface="+mn-cs"/>
+              </a:rPr>
+              <a:t>.  In fact, deep learning is not possible without data.  In the second half of today’s presentation, we will talk about the various types of data and the AI techniques used on them.  But first, let’s dive into the details of our Practicum AI workshop program.</a:t>
             </a:r>
           </a:p>
           <a:p>
@@ -2435,120 +3120,6 @@
               <a:cs typeface="+mn-cs"/>
             </a:endParaRPr>
           </a:p>
-          <a:p>
-            <a:r>
-              <a:rPr lang="en-US" sz="1200" b="0" i="0" kern="1200" dirty="0">
-                <a:solidFill>
-                  <a:schemeClr val="tx1"/>
-                </a:solidFill>
-                <a:effectLst/>
-                <a:latin typeface="+mn-lt"/>
-                <a:ea typeface="+mn-ea"/>
-                <a:cs typeface="+mn-cs"/>
-              </a:rPr>
-              <a:t>Artificial intelligence (AI) is the overarching discipline that concerns itself with the development of computer systems capable of performing tasks that humans are good at; for example, recognizing objects, making sense of speech, and decision making in a constrained environment.</a:t>
-            </a:r>
-          </a:p>
-          <a:p>
-            <a:endParaRPr lang="en-US" sz="1200" b="0" i="0" kern="1200" dirty="0">
-              <a:solidFill>
-                <a:schemeClr val="tx1"/>
-              </a:solidFill>
-              <a:effectLst/>
-              <a:latin typeface="+mn-lt"/>
-              <a:ea typeface="+mn-ea"/>
-              <a:cs typeface="+mn-cs"/>
-            </a:endParaRPr>
-          </a:p>
-          <a:p>
-            <a:r>
-              <a:rPr lang="en-US" sz="1200" b="0" i="0" kern="1200" dirty="0">
-                <a:solidFill>
-                  <a:schemeClr val="tx1"/>
-                </a:solidFill>
-                <a:effectLst/>
-                <a:latin typeface="+mn-lt"/>
-                <a:ea typeface="+mn-ea"/>
-                <a:cs typeface="+mn-cs"/>
-              </a:rPr>
-              <a:t>Machine learning is defined as the field of AI that applies statistical methods to enable computer systems to learn from data to achieve an end goal.  </a:t>
-            </a:r>
-          </a:p>
-          <a:p>
-            <a:endParaRPr lang="en-US" sz="1200" b="0" i="0" kern="1200" dirty="0">
-              <a:solidFill>
-                <a:schemeClr val="tx1"/>
-              </a:solidFill>
-              <a:effectLst/>
-              <a:latin typeface="+mn-lt"/>
-              <a:ea typeface="+mn-ea"/>
-              <a:cs typeface="+mn-cs"/>
-            </a:endParaRPr>
-          </a:p>
-          <a:p>
-            <a:r>
-              <a:rPr lang="en-US" sz="1200" b="0" i="0" kern="1200" dirty="0">
-                <a:solidFill>
-                  <a:schemeClr val="tx1"/>
-                </a:solidFill>
-                <a:effectLst/>
-                <a:latin typeface="+mn-lt"/>
-                <a:ea typeface="+mn-ea"/>
-                <a:cs typeface="+mn-cs"/>
-              </a:rPr>
-              <a:t>Deep learning is a field of machine learning which focuses on neural networks.  A neural network is a special type of learning algorithm, inspired by billions of interconnected neurons in the human brain.</a:t>
-            </a:r>
-          </a:p>
-          <a:p>
-            <a:endParaRPr lang="en-US" sz="1200" b="0" i="0" kern="1200" dirty="0">
-              <a:solidFill>
-                <a:schemeClr val="tx1"/>
-              </a:solidFill>
-              <a:effectLst/>
-              <a:latin typeface="+mn-lt"/>
-              <a:ea typeface="+mn-ea"/>
-              <a:cs typeface="+mn-cs"/>
-            </a:endParaRPr>
-          </a:p>
-          <a:p>
-            <a:r>
-              <a:rPr lang="en-US" sz="1200" b="0" i="0" kern="1200" dirty="0">
-                <a:solidFill>
-                  <a:schemeClr val="tx1"/>
-                </a:solidFill>
-                <a:effectLst/>
-                <a:latin typeface="+mn-lt"/>
-                <a:ea typeface="+mn-ea"/>
-                <a:cs typeface="+mn-cs"/>
-              </a:rPr>
-              <a:t>In the past, AI has experienced multiple “winters.”  The early 1990’s was one such period where funding dried up and interest waned.  Whether the individual who created this graphic intended it or not, the period under the garbage can is one of those slumps.  The problem is one of over-promising and under-delivering.</a:t>
-            </a:r>
-          </a:p>
-          <a:p>
-            <a:endParaRPr lang="en-US" sz="1200" b="0" i="0" kern="1200" dirty="0">
-              <a:solidFill>
-                <a:schemeClr val="tx1"/>
-              </a:solidFill>
-              <a:effectLst/>
-              <a:latin typeface="+mn-lt"/>
-              <a:ea typeface="+mn-ea"/>
-              <a:cs typeface="+mn-cs"/>
-            </a:endParaRPr>
-          </a:p>
-          <a:p>
-            <a:endParaRPr lang="en-US" sz="1200" b="0" i="0" kern="1200" dirty="0">
-              <a:solidFill>
-                <a:schemeClr val="tx1"/>
-              </a:solidFill>
-              <a:effectLst/>
-              <a:latin typeface="+mn-lt"/>
-              <a:ea typeface="+mn-ea"/>
-              <a:cs typeface="+mn-cs"/>
-            </a:endParaRPr>
-          </a:p>
-          <a:p>
-            <a:endParaRPr lang="en-US" dirty="0"/>
-          </a:p>
         </p:txBody>
       </p:sp>
       <p:sp>
@@ -2577,7 +3148,7 @@
     </p:spTree>
     <p:extLst>
       <p:ext uri="{BB962C8B-B14F-4D97-AF65-F5344CB8AC3E}">
-        <p14:creationId xmlns:p14="http://schemas.microsoft.com/office/powerpoint/2010/main" val="7792111"/>
+        <p14:creationId xmlns:p14="http://schemas.microsoft.com/office/powerpoint/2010/main" val="658380389"/>
       </p:ext>
     </p:extLst>
   </p:cSld>
@@ -2631,126 +3202,139 @@
           <a:bodyPr/>
           <a:lstStyle/>
           <a:p>
-            <a:r>
-              <a:rPr lang="en-US" sz="1200" b="0" i="0" kern="1200" dirty="0">
-                <a:solidFill>
-                  <a:schemeClr val="tx1"/>
-                </a:solidFill>
-                <a:effectLst/>
-                <a:latin typeface="+mn-lt"/>
-                <a:ea typeface="+mn-ea"/>
-                <a:cs typeface="+mn-cs"/>
-              </a:rPr>
-              <a:t>… and here’s a definition of machine learning coined by Arthur Samuel in 1959.  This is concise and one of my personal favorites.  However, I also like this second definition: </a:t>
-            </a:r>
-            <a:r>
-              <a:rPr lang="en-US" sz="1200" b="0" i="1" kern="1200" dirty="0">
-                <a:solidFill>
-                  <a:schemeClr val="tx1"/>
-                </a:solidFill>
-                <a:effectLst/>
-                <a:latin typeface="+mn-lt"/>
-                <a:ea typeface="+mn-ea"/>
-                <a:cs typeface="+mn-cs"/>
-              </a:rPr>
-              <a:t>Machine learning is the science (and art) of programming computers so they can learn from data</a:t>
-            </a:r>
-            <a:r>
-              <a:rPr lang="en-US" sz="1200" b="0" i="0" kern="1200" dirty="0">
-                <a:solidFill>
-                  <a:schemeClr val="tx1"/>
-                </a:solidFill>
-                <a:effectLst/>
-                <a:latin typeface="+mn-lt"/>
-                <a:ea typeface="+mn-ea"/>
-                <a:cs typeface="+mn-cs"/>
-              </a:rPr>
-              <a:t>.  </a:t>
-            </a:r>
-          </a:p>
-          <a:p>
-            <a:endParaRPr lang="en-US" sz="1200" b="0" i="0" kern="1200" dirty="0">
-              <a:solidFill>
-                <a:schemeClr val="tx1"/>
-              </a:solidFill>
-              <a:effectLst/>
-              <a:latin typeface="+mn-lt"/>
-              <a:ea typeface="+mn-ea"/>
-              <a:cs typeface="+mn-cs"/>
-            </a:endParaRPr>
-          </a:p>
-          <a:p>
-            <a:r>
-              <a:rPr lang="en-US" sz="1200" b="0" i="0" kern="1200" dirty="0">
-                <a:solidFill>
-                  <a:schemeClr val="tx1"/>
-                </a:solidFill>
-                <a:effectLst/>
-                <a:latin typeface="+mn-lt"/>
-                <a:ea typeface="+mn-ea"/>
-                <a:cs typeface="+mn-cs"/>
-              </a:rPr>
-              <a:t>Now, the key word in that second definition is </a:t>
-            </a:r>
-            <a:r>
-              <a:rPr lang="en-US" sz="1200" b="1" i="0" kern="1200" dirty="0">
-                <a:solidFill>
-                  <a:schemeClr val="tx1"/>
-                </a:solidFill>
-                <a:effectLst/>
-                <a:latin typeface="+mn-lt"/>
-                <a:ea typeface="+mn-ea"/>
-                <a:cs typeface="+mn-cs"/>
-              </a:rPr>
-              <a:t>data</a:t>
-            </a:r>
-            <a:r>
-              <a:rPr lang="en-US" sz="1200" b="0" i="0" kern="1200" dirty="0">
-                <a:solidFill>
-                  <a:schemeClr val="tx1"/>
-                </a:solidFill>
-                <a:effectLst/>
-                <a:latin typeface="+mn-lt"/>
-                <a:ea typeface="+mn-ea"/>
-                <a:cs typeface="+mn-cs"/>
-              </a:rPr>
-              <a:t>.  In fact, deep learning is not possible without data.  The age of </a:t>
-            </a:r>
-            <a:r>
-              <a:rPr lang="en-US" sz="1200" b="1" i="0" kern="1200" dirty="0">
-                <a:solidFill>
-                  <a:schemeClr val="tx1"/>
-                </a:solidFill>
-                <a:effectLst/>
-                <a:latin typeface="+mn-lt"/>
-                <a:ea typeface="+mn-ea"/>
-                <a:cs typeface="+mn-cs"/>
-              </a:rPr>
-              <a:t>big data</a:t>
-            </a:r>
-            <a:r>
-              <a:rPr lang="en-US" sz="1200" b="0" i="0" kern="1200" dirty="0">
-                <a:solidFill>
-                  <a:schemeClr val="tx1"/>
-                </a:solidFill>
-                <a:effectLst/>
-                <a:latin typeface="+mn-lt"/>
-                <a:ea typeface="+mn-ea"/>
-                <a:cs typeface="+mn-cs"/>
-              </a:rPr>
-              <a:t> is upon us…</a:t>
-            </a:r>
-          </a:p>
-          <a:p>
-            <a:endParaRPr lang="en-US" sz="1200" b="0" i="0" kern="1200" dirty="0">
-              <a:solidFill>
-                <a:schemeClr val="tx1"/>
-              </a:solidFill>
-              <a:effectLst/>
-              <a:latin typeface="+mn-lt"/>
-              <a:ea typeface="+mn-ea"/>
-              <a:cs typeface="+mn-cs"/>
-            </a:endParaRPr>
+            <a:pPr marL="0" marR="0" lvl="0" indent="0" algn="l" defTabSz="914400" rtl="0" eaLnBrk="1" fontAlgn="auto" latinLnBrk="0" hangingPunct="1">
+              <a:lnSpc>
+                <a:spcPct val="100000"/>
+              </a:lnSpc>
+              <a:spcBef>
+                <a:spcPts val="0"/>
+              </a:spcBef>
+              <a:spcAft>
+                <a:spcPts val="0"/>
+              </a:spcAft>
+              <a:buClrTx/>
+              <a:buSzTx/>
+              <a:buFontTx/>
+              <a:buNone/>
+              <a:tabLst/>
+              <a:defRPr/>
+            </a:pPr>
+            <a:r>
+              <a:rPr lang="en-US" dirty="0"/>
+              <a:t>Let’s start with a quick statement of the Practicum AI approach to learning.  </a:t>
+            </a:r>
+          </a:p>
+          <a:p>
+            <a:pPr marL="0" marR="0" lvl="0" indent="0" algn="l" defTabSz="914400" rtl="0" eaLnBrk="1" fontAlgn="auto" latinLnBrk="0" hangingPunct="1">
+              <a:lnSpc>
+                <a:spcPct val="100000"/>
+              </a:lnSpc>
+              <a:spcBef>
+                <a:spcPts val="0"/>
+              </a:spcBef>
+              <a:spcAft>
+                <a:spcPts val="0"/>
+              </a:spcAft>
+              <a:buClrTx/>
+              <a:buSzTx/>
+              <a:buFontTx/>
+              <a:buNone/>
+              <a:tabLst/>
+              <a:defRPr/>
+            </a:pPr>
+            <a:endParaRPr lang="en-US" dirty="0"/>
+          </a:p>
+          <a:p>
+            <a:pPr marL="0" marR="0" lvl="0" indent="0" algn="l" defTabSz="914400" rtl="0" eaLnBrk="1" fontAlgn="auto" latinLnBrk="0" hangingPunct="1">
+              <a:lnSpc>
+                <a:spcPct val="100000"/>
+              </a:lnSpc>
+              <a:spcBef>
+                <a:spcPts val="0"/>
+              </a:spcBef>
+              <a:spcAft>
+                <a:spcPts val="0"/>
+              </a:spcAft>
+              <a:buClrTx/>
+              <a:buSzTx/>
+              <a:buFontTx/>
+              <a:buNone/>
+              <a:tabLst/>
+              <a:defRPr/>
+            </a:pPr>
+            <a:r>
+              <a:rPr lang="en-US" dirty="0"/>
+              <a:t>The three elements highlighted in blue are distinguishing features of Practicum AI.  First, AI content is presented in a visual way rather than mathematically.  As they say, “A picture is worth a thousand words.”  Or in this case, a thousand mathematical symbols.  Second, narrative (or story-driven) forms of instruction are used, especially at the advanced levels where case-studies are prominently featured.  And finally, abundant hands-on coding exercises develop student programming skills.</a:t>
+            </a:r>
+          </a:p>
+          <a:p>
+            <a:pPr marL="0" marR="0" lvl="0" indent="0" algn="l" defTabSz="914400" rtl="0" eaLnBrk="1" fontAlgn="auto" latinLnBrk="0" hangingPunct="1">
+              <a:lnSpc>
+                <a:spcPct val="100000"/>
+              </a:lnSpc>
+              <a:spcBef>
+                <a:spcPts val="0"/>
+              </a:spcBef>
+              <a:spcAft>
+                <a:spcPts val="0"/>
+              </a:spcAft>
+              <a:buClrTx/>
+              <a:buSzTx/>
+              <a:buFontTx/>
+              <a:buNone/>
+              <a:tabLst/>
+              <a:defRPr/>
+            </a:pPr>
+            <a:endParaRPr lang="en-US" dirty="0"/>
+          </a:p>
+          <a:p>
+            <a:pPr marL="0" marR="0" lvl="0" indent="0" algn="l" defTabSz="914400" rtl="0" eaLnBrk="1" fontAlgn="auto" latinLnBrk="0" hangingPunct="1">
+              <a:lnSpc>
+                <a:spcPct val="100000"/>
+              </a:lnSpc>
+              <a:spcBef>
+                <a:spcPts val="0"/>
+              </a:spcBef>
+              <a:spcAft>
+                <a:spcPts val="0"/>
+              </a:spcAft>
+              <a:buClrTx/>
+              <a:buSzTx/>
+              <a:buFontTx/>
+              <a:buNone/>
+              <a:tabLst/>
+              <a:defRPr/>
+            </a:pPr>
+            <a:r>
+              <a:rPr lang="en-US" dirty="0"/>
+              <a:t>Dual-Coding theory supports visual / narrative learning formats</a:t>
+            </a:r>
+          </a:p>
+          <a:p>
+            <a:pPr marL="0" marR="0" lvl="0" indent="0" algn="l" defTabSz="914400" rtl="0" eaLnBrk="1" fontAlgn="auto" latinLnBrk="0" hangingPunct="1">
+              <a:lnSpc>
+                <a:spcPct val="100000"/>
+              </a:lnSpc>
+              <a:spcBef>
+                <a:spcPts val="0"/>
+              </a:spcBef>
+              <a:spcAft>
+                <a:spcPts val="0"/>
+              </a:spcAft>
+              <a:buClrTx/>
+              <a:buSzTx/>
+              <a:buFontTx/>
+              <a:buNone/>
+              <a:tabLst/>
+              <a:defRPr/>
+            </a:pPr>
+            <a:endParaRPr lang="en-US" dirty="0"/>
+          </a:p>
+          <a:p>
+            <a:r>
+              <a:rPr lang="en-US" dirty="0"/>
+              <a:t>Four levels of hands-on coding.  Level 1: student retypes example code.  Level 2: student modifies and/or extends example code.  Level 3: student writes code from scratch, given an algorithm.  Level 4: student solves a problem by defining an algorithm and then writing the code to instantiate it.</a:t>
+            </a:r>
           </a:p>
         </p:txBody>
       </p:sp>
@@ -2780,7 +3364,7 @@
     </p:spTree>
     <p:extLst>
       <p:ext uri="{BB962C8B-B14F-4D97-AF65-F5344CB8AC3E}">
-        <p14:creationId xmlns:p14="http://schemas.microsoft.com/office/powerpoint/2010/main" val="658380389"/>
+        <p14:creationId xmlns:p14="http://schemas.microsoft.com/office/powerpoint/2010/main" val="3145646012"/>
       </p:ext>
     </p:extLst>
   </p:cSld>
@@ -2836,7 +3420,23 @@
           <a:p>
             <a:r>
               <a:rPr lang="en-US" dirty="0"/>
-              <a:t>Visual – use example of Calculus chain-rule and StatQuest video.</a:t>
+              <a:t>Our target student audience is beginners who have little-to-no technical background.  That is, our program will benefit those who are curious about AI but have little-to-no knowledge of the field.  And lastly, the Practicum AI workshops are designed for those who take a </a:t>
+            </a:r>
+            <a:r>
+              <a:rPr lang="en-US" b="1" dirty="0"/>
+              <a:t>tinker and play </a:t>
+            </a:r>
+            <a:r>
+              <a:rPr lang="en-US" dirty="0"/>
+              <a:t>approach to learning.  This final point is important as these workshops feature extensive </a:t>
+            </a:r>
+            <a:r>
+              <a:rPr lang="en-US" b="1" dirty="0"/>
+              <a:t>hands-on</a:t>
+            </a:r>
+            <a:r>
+              <a:rPr lang="en-US" dirty="0"/>
+              <a:t> coding exercises.</a:t>
             </a:r>
           </a:p>
           <a:p>
@@ -2845,7 +3445,15 @@
           <a:p>
             <a:r>
               <a:rPr lang="en-US" dirty="0"/>
-              <a:t>Four levels of step-wise learning.  Level 1: student retypes example code.  Level 2: student modifies and/or extends example code.  Level 3: student writes code from scratch, given an algorithm.  Level 4: student solves a problem by defining an algorithm and then writing the code to instantiate it.</a:t>
+              <a:t>Again – this program is </a:t>
+            </a:r>
+            <a:r>
+              <a:rPr lang="en-US" b="1" dirty="0"/>
+              <a:t>not designed </a:t>
+            </a:r>
+            <a:r>
+              <a:rPr lang="en-US" dirty="0"/>
+              <a:t>for a highly technical audience.  If you already have a strong technical background or multiple years of programming experience, we encourage you to take the advanced AI workshops offered by Nvidia’s Deep Learning Institute.  Please contact us for details. </a:t>
             </a:r>
           </a:p>
         </p:txBody>
@@ -2876,7 +3484,7 @@
     </p:spTree>
     <p:extLst>
       <p:ext uri="{BB962C8B-B14F-4D97-AF65-F5344CB8AC3E}">
-        <p14:creationId xmlns:p14="http://schemas.microsoft.com/office/powerpoint/2010/main" val="3145646012"/>
+        <p14:creationId xmlns:p14="http://schemas.microsoft.com/office/powerpoint/2010/main" val="2078421308"/>
       </p:ext>
     </p:extLst>
   </p:cSld>
@@ -2932,7 +3540,33 @@
           <a:p>
             <a:r>
               <a:rPr lang="en-US" dirty="0"/>
-              <a:t>So, what kind of student will excel in the Practicum AI program?  Is this you?</a:t>
+              <a:t>Okay – let’s make the message of the last slide visual.  If you are someone who can appreciate the ingenuity and resourcefulness of whoever created the contraption pictured here – and you want to do something similar with AI – then you’re the kind of student we’re looking for.  We’re not seeking mathematical prodigies or technical whiz kids.  However, we are looking for individuals who color outside the lines. </a:t>
+            </a:r>
+          </a:p>
+          <a:p>
+            <a:endParaRPr lang="en-US" dirty="0"/>
+          </a:p>
+          <a:p>
+            <a:r>
+              <a:rPr lang="en-US" dirty="0"/>
+              <a:t>The anthropologist Levi Straus had a name for these kinds of people, calling them </a:t>
+            </a:r>
+            <a:r>
+              <a:rPr lang="en-US" b="1" dirty="0"/>
+              <a:t>Bricoleurs</a:t>
+            </a:r>
+            <a:r>
+              <a:rPr lang="en-US" dirty="0"/>
+              <a:t>.  A bricoleur is a playful tinkerer who uses whatever is at hand to solve an immediate problem.  A bricoleur enjoys mashing things up, taking ideas from one domain and using them in another.  And most importantly, a bricoleur is not boxed in by disciplinary norms.  Or, as we used to say on the farm, “I’m a jack of all trades, master of none.”</a:t>
+            </a:r>
+          </a:p>
+          <a:p>
+            <a:endParaRPr lang="en-US" dirty="0"/>
+          </a:p>
+          <a:p>
+            <a:r>
+              <a:rPr lang="en-US" dirty="0"/>
+              <a:t>Is this you?  If so, you should enjoy these learning experiences.</a:t>
             </a:r>
           </a:p>
         </p:txBody>
@@ -2963,7 +3597,7 @@
     </p:spTree>
     <p:extLst>
       <p:ext uri="{BB962C8B-B14F-4D97-AF65-F5344CB8AC3E}">
-        <p14:creationId xmlns:p14="http://schemas.microsoft.com/office/powerpoint/2010/main" val="2078421308"/>
+        <p14:creationId xmlns:p14="http://schemas.microsoft.com/office/powerpoint/2010/main" val="1960499872"/>
       </p:ext>
     </p:extLst>
   </p:cSld>
@@ -3019,7 +3653,25 @@
           <a:p>
             <a:r>
               <a:rPr lang="en-US" dirty="0"/>
-              <a:t>… and this is an overview of the Practicum AI badge program.  Blue boxes are foundational learning experiences.  Yellow are intermediate, and green is advanced.  As pictured here, students seeking the Video badge will first have to achieve the Image badge.   The Introduction to Python, RAPIDS, Data Ethics, Deep Learning Foundations, and Research Roadmap workshops are available now or close to being finished, with rollouts planned later this year.  The badging program, as presently conceived, is flexible and we envision additional badges being added over time.  In fact, we have already submitted a funding proposal to create a series of workshops leading to a FAIR Data badge.</a:t>
+              <a:t>… and this is an overview of the Practicum AI badge program.  Blue boxes are foundational learning experiences.  Purple is intermediate.  Yellow is advanced and green is a specialty.  The hexagons are badges students can earn, after completing the requisite workshops in the series.  </a:t>
+            </a:r>
+          </a:p>
+          <a:p>
+            <a:endParaRPr lang="en-US" dirty="0"/>
+          </a:p>
+          <a:p>
+            <a:r>
+              <a:rPr lang="en-US" dirty="0"/>
+              <a:t>The GitHub, Data Ethics, Introduction to Python, Deep Learning Foundations constitute the core sequence of the Practicum AI workshop program.  Our plan this semester is to offer most of the workshops enclosed in the light grey box, including a some of the intermediate workshops – one for Convolutional Neural Networks, Natural Language Processing, Recurrent Neural Networks, Transformers, and Transfer Learning.  The last two workshops – Transformers and Transfer Learning – are  still in-development and may or may not be offered.</a:t>
+            </a:r>
+          </a:p>
+          <a:p>
+            <a:endParaRPr lang="en-US" dirty="0"/>
+          </a:p>
+          <a:p>
+            <a:r>
+              <a:rPr lang="en-US" dirty="0"/>
+              <a:t>And a final note:  the Practicum AI badging program, as presently conceived, is flexible and we envision additional badges being added over time.  In fact, we recently received funding to create a series of workshops leading to a FAIR Data badge.</a:t>
             </a:r>
           </a:p>
         </p:txBody>
@@ -3104,6 +3756,12 @@
           <a:bodyPr/>
           <a:lstStyle/>
           <a:p>
+            <a:r>
+              <a:rPr lang="en-US" dirty="0"/>
+              <a:t>In our introductory and intermediate workshops, learning is hands-on (lots of coding), visual, and story based.  As pictured here, that shifts slightly in the advanced workshops which will feature real-world case-studies and project learning.  In fact, we’d like to make projects the centerpiece of the badging process, used by students to demonstrate competency in that area.</a:t>
+            </a:r>
+          </a:p>
+          <a:p>
             <a:endParaRPr lang="en-US" dirty="0"/>
           </a:p>
         </p:txBody>
@@ -3134,7 +3792,7 @@
     </p:spTree>
     <p:extLst>
       <p:ext uri="{BB962C8B-B14F-4D97-AF65-F5344CB8AC3E}">
-        <p14:creationId xmlns:p14="http://schemas.microsoft.com/office/powerpoint/2010/main" val="2275706137"/>
+        <p14:creationId xmlns:p14="http://schemas.microsoft.com/office/powerpoint/2010/main" val="4175595246"/>
       </p:ext>
     </p:extLst>
   </p:cSld>
@@ -3291,7 +3949,7 @@
           <a:p>
             <a:fld id="{C3F78080-8D0A-4BE8-A5B4-CB115102D524}" type="datetimeFigureOut">
               <a:rPr lang="en-US" smtClean="0"/>
-              <a:t>8/23/2021</a:t>
+              <a:t>9/7/2021</a:t>
             </a:fld>
             <a:endParaRPr lang="en-US"/>
           </a:p>
@@ -3489,7 +4147,7 @@
           <a:p>
             <a:fld id="{C3F78080-8D0A-4BE8-A5B4-CB115102D524}" type="datetimeFigureOut">
               <a:rPr lang="en-US" smtClean="0"/>
-              <a:t>8/23/2021</a:t>
+              <a:t>9/7/2021</a:t>
             </a:fld>
             <a:endParaRPr lang="en-US"/>
           </a:p>
@@ -3697,7 +4355,7 @@
           <a:p>
             <a:fld id="{C3F78080-8D0A-4BE8-A5B4-CB115102D524}" type="datetimeFigureOut">
               <a:rPr lang="en-US" smtClean="0"/>
-              <a:t>8/23/2021</a:t>
+              <a:t>9/7/2021</a:t>
             </a:fld>
             <a:endParaRPr lang="en-US"/>
           </a:p>
@@ -3895,7 +4553,7 @@
           <a:p>
             <a:fld id="{C3F78080-8D0A-4BE8-A5B4-CB115102D524}" type="datetimeFigureOut">
               <a:rPr lang="en-US" smtClean="0"/>
-              <a:t>8/23/2021</a:t>
+              <a:t>9/7/2021</a:t>
             </a:fld>
             <a:endParaRPr lang="en-US"/>
           </a:p>
@@ -4170,7 +4828,7 @@
           <a:p>
             <a:fld id="{C3F78080-8D0A-4BE8-A5B4-CB115102D524}" type="datetimeFigureOut">
               <a:rPr lang="en-US" smtClean="0"/>
-              <a:t>8/23/2021</a:t>
+              <a:t>9/7/2021</a:t>
             </a:fld>
             <a:endParaRPr lang="en-US"/>
           </a:p>
@@ -4435,7 +5093,7 @@
           <a:p>
             <a:fld id="{C3F78080-8D0A-4BE8-A5B4-CB115102D524}" type="datetimeFigureOut">
               <a:rPr lang="en-US" smtClean="0"/>
-              <a:t>8/23/2021</a:t>
+              <a:t>9/7/2021</a:t>
             </a:fld>
             <a:endParaRPr lang="en-US"/>
           </a:p>
@@ -4847,7 +5505,7 @@
           <a:p>
             <a:fld id="{C3F78080-8D0A-4BE8-A5B4-CB115102D524}" type="datetimeFigureOut">
               <a:rPr lang="en-US" smtClean="0"/>
-              <a:t>8/23/2021</a:t>
+              <a:t>9/7/2021</a:t>
             </a:fld>
             <a:endParaRPr lang="en-US"/>
           </a:p>
@@ -4988,7 +5646,7 @@
           <a:p>
             <a:fld id="{C3F78080-8D0A-4BE8-A5B4-CB115102D524}" type="datetimeFigureOut">
               <a:rPr lang="en-US" smtClean="0"/>
-              <a:t>8/23/2021</a:t>
+              <a:t>9/7/2021</a:t>
             </a:fld>
             <a:endParaRPr lang="en-US"/>
           </a:p>
@@ -5101,7 +5759,7 @@
           <a:p>
             <a:fld id="{C3F78080-8D0A-4BE8-A5B4-CB115102D524}" type="datetimeFigureOut">
               <a:rPr lang="en-US" smtClean="0"/>
-              <a:t>8/23/2021</a:t>
+              <a:t>9/7/2021</a:t>
             </a:fld>
             <a:endParaRPr lang="en-US"/>
           </a:p>
@@ -5412,7 +6070,7 @@
           <a:p>
             <a:fld id="{C3F78080-8D0A-4BE8-A5B4-CB115102D524}" type="datetimeFigureOut">
               <a:rPr lang="en-US" smtClean="0"/>
-              <a:t>8/23/2021</a:t>
+              <a:t>9/7/2021</a:t>
             </a:fld>
             <a:endParaRPr lang="en-US"/>
           </a:p>
@@ -5700,7 +6358,7 @@
           <a:p>
             <a:fld id="{C3F78080-8D0A-4BE8-A5B4-CB115102D524}" type="datetimeFigureOut">
               <a:rPr lang="en-US" smtClean="0"/>
-              <a:t>8/23/2021</a:t>
+              <a:t>9/7/2021</a:t>
             </a:fld>
             <a:endParaRPr lang="en-US"/>
           </a:p>
@@ -5941,7 +6599,7 @@
           <a:p>
             <a:fld id="{C3F78080-8D0A-4BE8-A5B4-CB115102D524}" type="datetimeFigureOut">
               <a:rPr lang="en-US" smtClean="0"/>
-              <a:t>8/23/2021</a:t>
+              <a:t>9/7/2021</a:t>
             </a:fld>
             <a:endParaRPr lang="en-US"/>
           </a:p>
@@ -6442,12 +7100,12 @@
   </p:clrMapOvr>
   <mc:AlternateContent xmlns:mc="http://schemas.openxmlformats.org/markup-compatibility/2006" xmlns:p14="http://schemas.microsoft.com/office/powerpoint/2010/main">
     <mc:Choice Requires="p14">
-      <p:transition spd="slow" p14:dur="3400">
-        <p14:reveal/>
+      <p:transition spd="med" p14:dur="700">
+        <p:fade/>
       </p:transition>
     </mc:Choice>
     <mc:Fallback xmlns="">
-      <p:transition spd="slow">
+      <p:transition spd="med">
         <p:fade/>
       </p:transition>
     </mc:Fallback>
@@ -6472,6 +7130,199 @@
           <a:chExt cx="0" cy="0"/>
         </a:xfrm>
       </p:grpSpPr>
+      <p:pic>
+        <p:nvPicPr>
+          <p:cNvPr id="8" name="Picture 7">
+            <a:extLst>
+              <a:ext uri="{FF2B5EF4-FFF2-40B4-BE49-F238E27FC236}">
+                <a16:creationId xmlns:a16="http://schemas.microsoft.com/office/drawing/2014/main" id="{58AF309B-2972-4842-8C51-01D5BDA533F8}"/>
+              </a:ext>
+            </a:extLst>
+          </p:cNvPr>
+          <p:cNvPicPr>
+            <a:picLocks noChangeAspect="1"/>
+          </p:cNvPicPr>
+          <p:nvPr/>
+        </p:nvPicPr>
+        <p:blipFill>
+          <a:blip r:embed="rId3"/>
+          <a:stretch>
+            <a:fillRect/>
+          </a:stretch>
+        </p:blipFill>
+        <p:spPr>
+          <a:xfrm>
+            <a:off x="2527604" y="1778793"/>
+            <a:ext cx="7136791" cy="3300413"/>
+          </a:xfrm>
+          <a:prstGeom prst="rect">
+            <a:avLst/>
+          </a:prstGeom>
+        </p:spPr>
+      </p:pic>
+    </p:spTree>
+    <p:extLst>
+      <p:ext uri="{BB962C8B-B14F-4D97-AF65-F5344CB8AC3E}">
+        <p14:creationId xmlns:p14="http://schemas.microsoft.com/office/powerpoint/2010/main" val="302038558"/>
+      </p:ext>
+    </p:extLst>
+  </p:cSld>
+  <p:clrMapOvr>
+    <a:masterClrMapping/>
+  </p:clrMapOvr>
+  <mc:AlternateContent xmlns:mc="http://schemas.openxmlformats.org/markup-compatibility/2006" xmlns:p14="http://schemas.microsoft.com/office/powerpoint/2010/main">
+    <mc:Choice Requires="p14">
+      <p:transition spd="med" p14:dur="700">
+        <p:fade/>
+      </p:transition>
+    </mc:Choice>
+    <mc:Fallback xmlns="">
+      <p:transition spd="med">
+        <p:fade/>
+      </p:transition>
+    </mc:Fallback>
+  </mc:AlternateContent>
+</p:sld>
+</file>
+
+<file path=ppt/slides/slide11.xml><?xml version="1.0" encoding="utf-8"?>
+<p:sld xmlns:a="http://schemas.openxmlformats.org/drawingml/2006/main" xmlns:r="http://schemas.openxmlformats.org/officeDocument/2006/relationships" xmlns:p="http://schemas.openxmlformats.org/presentationml/2006/main">
+  <p:cSld>
+    <p:spTree>
+      <p:nvGrpSpPr>
+        <p:cNvPr id="1" name=""/>
+        <p:cNvGrpSpPr/>
+        <p:nvPr/>
+      </p:nvGrpSpPr>
+      <p:grpSpPr>
+        <a:xfrm>
+          <a:off x="0" y="0"/>
+          <a:ext cx="0" cy="0"/>
+          <a:chOff x="0" y="0"/>
+          <a:chExt cx="0" cy="0"/>
+        </a:xfrm>
+      </p:grpSpPr>
+      <p:sp>
+        <p:nvSpPr>
+          <p:cNvPr id="5" name="Content Placeholder 4">
+            <a:extLst>
+              <a:ext uri="{FF2B5EF4-FFF2-40B4-BE49-F238E27FC236}">
+                <a16:creationId xmlns:a16="http://schemas.microsoft.com/office/drawing/2014/main" id="{7C82B2FA-DB39-467C-9DC1-245874DCBCF1}"/>
+              </a:ext>
+            </a:extLst>
+          </p:cNvPr>
+          <p:cNvSpPr>
+            <a:spLocks noGrp="1"/>
+          </p:cNvSpPr>
+          <p:nvPr>
+            <p:ph idx="1"/>
+          </p:nvPr>
+        </p:nvSpPr>
+        <p:spPr>
+          <a:xfrm>
+            <a:off x="1" y="1386840"/>
+            <a:ext cx="12192000" cy="4790124"/>
+          </a:xfrm>
+        </p:spPr>
+        <p:txBody>
+          <a:bodyPr>
+            <a:normAutofit/>
+          </a:bodyPr>
+          <a:lstStyle/>
+          <a:p>
+            <a:pPr marL="0" indent="0">
+              <a:buNone/>
+            </a:pPr>
+            <a:endParaRPr lang="en-US" dirty="0">
+              <a:latin typeface="Palatino Linotype" panose="02040502050505030304" pitchFamily="18" charset="0"/>
+            </a:endParaRPr>
+          </a:p>
+          <a:p>
+            <a:pPr marL="0" indent="0">
+              <a:buNone/>
+            </a:pPr>
+            <a:endParaRPr lang="en-US" dirty="0">
+              <a:latin typeface="Palatino Linotype" panose="02040502050505030304" pitchFamily="18" charset="0"/>
+            </a:endParaRPr>
+          </a:p>
+          <a:p>
+            <a:pPr marL="0" indent="0">
+              <a:buNone/>
+            </a:pPr>
+            <a:endParaRPr lang="en-US" dirty="0">
+              <a:latin typeface="Palatino Linotype" panose="02040502050505030304" pitchFamily="18" charset="0"/>
+            </a:endParaRPr>
+          </a:p>
+          <a:p>
+            <a:pPr marL="0" indent="0" algn="ctr">
+              <a:buNone/>
+            </a:pPr>
+            <a:r>
+              <a:rPr lang="en-US" sz="4000" dirty="0">
+                <a:latin typeface="Palatino Linotype" panose="02040502050505030304" pitchFamily="18" charset="0"/>
+              </a:rPr>
+              <a:t>Start with your </a:t>
+            </a:r>
+            <a:r>
+              <a:rPr lang="en-US" sz="4000" dirty="0">
+                <a:solidFill>
+                  <a:srgbClr val="80BE63"/>
+                </a:solidFill>
+                <a:latin typeface="Palatino Linotype" panose="02040502050505030304" pitchFamily="18" charset="0"/>
+              </a:rPr>
+              <a:t>Interests, </a:t>
+            </a:r>
+            <a:r>
+              <a:rPr lang="en-US" sz="4000" dirty="0">
+                <a:latin typeface="Palatino Linotype" panose="02040502050505030304" pitchFamily="18" charset="0"/>
+              </a:rPr>
+              <a:t>not the Technology</a:t>
+            </a:r>
+          </a:p>
+        </p:txBody>
+      </p:sp>
+    </p:spTree>
+    <p:extLst>
+      <p:ext uri="{BB962C8B-B14F-4D97-AF65-F5344CB8AC3E}">
+        <p14:creationId xmlns:p14="http://schemas.microsoft.com/office/powerpoint/2010/main" val="1397534281"/>
+      </p:ext>
+    </p:extLst>
+  </p:cSld>
+  <p:clrMapOvr>
+    <a:masterClrMapping/>
+  </p:clrMapOvr>
+  <mc:AlternateContent xmlns:mc="http://schemas.openxmlformats.org/markup-compatibility/2006" xmlns:p14="http://schemas.microsoft.com/office/powerpoint/2010/main">
+    <mc:Choice Requires="p14">
+      <p:transition spd="med" p14:dur="700">
+        <p:fade/>
+      </p:transition>
+    </mc:Choice>
+    <mc:Fallback xmlns="">
+      <p:transition spd="med">
+        <p:fade/>
+      </p:transition>
+    </mc:Fallback>
+  </mc:AlternateContent>
+</p:sld>
+</file>
+
+<file path=ppt/slides/slide12.xml><?xml version="1.0" encoding="utf-8"?>
+<p:sld xmlns:a="http://schemas.openxmlformats.org/drawingml/2006/main" xmlns:r="http://schemas.openxmlformats.org/officeDocument/2006/relationships" xmlns:p="http://schemas.openxmlformats.org/presentationml/2006/main">
+  <p:cSld>
+    <p:spTree>
+      <p:nvGrpSpPr>
+        <p:cNvPr id="1" name=""/>
+        <p:cNvGrpSpPr/>
+        <p:nvPr/>
+      </p:nvGrpSpPr>
+      <p:grpSpPr>
+        <a:xfrm>
+          <a:off x="0" y="0"/>
+          <a:ext cx="0" cy="0"/>
+          <a:chOff x="0" y="0"/>
+          <a:chExt cx="0" cy="0"/>
+        </a:xfrm>
+      </p:grpSpPr>
       <p:sp>
         <p:nvSpPr>
           <p:cNvPr id="5" name="Content Placeholder 4">
@@ -6640,6 +7491,18 @@
         <p:blipFill>
           <a:blip r:embed="rId3">
             <a:extLst>
+              <a:ext uri="{BEBA8EAE-BF5A-486C-A8C5-ECC9F3942E4B}">
+                <a14:imgProps xmlns:a14="http://schemas.microsoft.com/office/drawing/2010/main">
+                  <a14:imgLayer r:embed="rId4">
+                    <a14:imgEffect>
+                      <a14:colorTemperature colorTemp="11200"/>
+                    </a14:imgEffect>
+                    <a14:imgEffect>
+                      <a14:saturation sat="60000"/>
+                    </a14:imgEffect>
+                  </a14:imgLayer>
+                </a14:imgProps>
+              </a:ext>
               <a:ext uri="{28A0092B-C50C-407E-A947-70E740481C1C}">
                 <a14:useLocalDpi xmlns:a14="http://schemas.microsoft.com/office/drawing/2010/main" val="0"/>
               </a:ext>
@@ -6671,12 +7534,12 @@
   </p:clrMapOvr>
   <mc:AlternateContent xmlns:mc="http://schemas.openxmlformats.org/markup-compatibility/2006" xmlns:p14="http://schemas.microsoft.com/office/powerpoint/2010/main">
     <mc:Choice Requires="p14">
-      <p:transition spd="slow" p14:dur="3400">
-        <p14:reveal/>
+      <p:transition spd="med" p14:dur="700">
+        <p:fade/>
       </p:transition>
     </mc:Choice>
     <mc:Fallback xmlns="">
-      <p:transition spd="slow">
+      <p:transition spd="med">
         <p:fade/>
       </p:transition>
     </mc:Fallback>
@@ -6684,7 +7547,7 @@
 </p:sld>
 </file>
 
-<file path=ppt/slides/slide11.xml><?xml version="1.0" encoding="utf-8"?>
+<file path=ppt/slides/slide13.xml><?xml version="1.0" encoding="utf-8"?>
 <p:sld xmlns:a="http://schemas.openxmlformats.org/drawingml/2006/main" xmlns:r="http://schemas.openxmlformats.org/officeDocument/2006/relationships" xmlns:p="http://schemas.openxmlformats.org/presentationml/2006/main">
   <p:cSld>
     <p:spTree>
@@ -6765,6 +7628,53 @@
           </a:p>
         </p:txBody>
       </p:sp>
+      <p:pic>
+        <p:nvPicPr>
+          <p:cNvPr id="1026" name="Picture 2" descr="242 Rose Colored Glasses Stock Photos, Pictures &amp;amp; Royalty-Free Images -  iStock">
+            <a:extLst>
+              <a:ext uri="{FF2B5EF4-FFF2-40B4-BE49-F238E27FC236}">
+                <a16:creationId xmlns:a16="http://schemas.microsoft.com/office/drawing/2014/main" id="{9D8E608E-50C9-414F-A607-972BDFF482A4}"/>
+              </a:ext>
+            </a:extLst>
+          </p:cNvPr>
+          <p:cNvPicPr>
+            <a:picLocks noChangeAspect="1" noChangeArrowheads="1"/>
+          </p:cNvPicPr>
+          <p:nvPr/>
+        </p:nvPicPr>
+        <p:blipFill>
+          <a:blip r:embed="rId3">
+            <a:extLst>
+              <a:ext uri="{28A0092B-C50C-407E-A947-70E740481C1C}">
+                <a14:useLocalDpi xmlns:a14="http://schemas.microsoft.com/office/drawing/2010/main" val="0"/>
+              </a:ext>
+            </a:extLst>
+          </a:blip>
+          <a:srcRect/>
+          <a:stretch>
+            <a:fillRect/>
+          </a:stretch>
+        </p:blipFill>
+        <p:spPr bwMode="auto">
+          <a:xfrm>
+            <a:off x="3181350" y="1743075"/>
+            <a:ext cx="5829300" cy="3371850"/>
+          </a:xfrm>
+          <a:prstGeom prst="rect">
+            <a:avLst/>
+          </a:prstGeom>
+          <a:noFill/>
+          <a:extLst>
+            <a:ext uri="{909E8E84-426E-40DD-AFC4-6F175D3DCCD1}">
+              <a14:hiddenFill xmlns:a14="http://schemas.microsoft.com/office/drawing/2010/main">
+                <a:solidFill>
+                  <a:srgbClr val="FFFFFF"/>
+                </a:solidFill>
+              </a14:hiddenFill>
+            </a:ext>
+          </a:extLst>
+        </p:spPr>
+      </p:pic>
     </p:spTree>
     <p:extLst>
       <p:ext uri="{BB962C8B-B14F-4D97-AF65-F5344CB8AC3E}">
@@ -6777,12 +7687,12 @@
   </p:clrMapOvr>
   <mc:AlternateContent xmlns:mc="http://schemas.openxmlformats.org/markup-compatibility/2006" xmlns:p14="http://schemas.microsoft.com/office/powerpoint/2010/main">
     <mc:Choice Requires="p14">
-      <p:transition spd="slow" p14:dur="3400">
-        <p14:reveal/>
+      <p:transition spd="med" p14:dur="700">
+        <p:fade/>
       </p:transition>
     </mc:Choice>
     <mc:Fallback xmlns="">
-      <p:transition spd="slow">
+      <p:transition spd="med">
         <p:fade/>
       </p:transition>
     </mc:Fallback>
@@ -6790,7 +7700,113 @@
 </p:sld>
 </file>
 
-<file path=ppt/slides/slide12.xml><?xml version="1.0" encoding="utf-8"?>
+<file path=ppt/slides/slide14.xml><?xml version="1.0" encoding="utf-8"?>
+<p:sld xmlns:a="http://schemas.openxmlformats.org/drawingml/2006/main" xmlns:r="http://schemas.openxmlformats.org/officeDocument/2006/relationships" xmlns:p="http://schemas.openxmlformats.org/presentationml/2006/main">
+  <p:cSld>
+    <p:spTree>
+      <p:nvGrpSpPr>
+        <p:cNvPr id="1" name=""/>
+        <p:cNvGrpSpPr/>
+        <p:nvPr/>
+      </p:nvGrpSpPr>
+      <p:grpSpPr>
+        <a:xfrm>
+          <a:off x="0" y="0"/>
+          <a:ext cx="0" cy="0"/>
+          <a:chOff x="0" y="0"/>
+          <a:chExt cx="0" cy="0"/>
+        </a:xfrm>
+      </p:grpSpPr>
+      <p:sp>
+        <p:nvSpPr>
+          <p:cNvPr id="5" name="Content Placeholder 4">
+            <a:extLst>
+              <a:ext uri="{FF2B5EF4-FFF2-40B4-BE49-F238E27FC236}">
+                <a16:creationId xmlns:a16="http://schemas.microsoft.com/office/drawing/2014/main" id="{7C82B2FA-DB39-467C-9DC1-245874DCBCF1}"/>
+              </a:ext>
+            </a:extLst>
+          </p:cNvPr>
+          <p:cNvSpPr>
+            <a:spLocks noGrp="1"/>
+          </p:cNvSpPr>
+          <p:nvPr>
+            <p:ph idx="1"/>
+          </p:nvPr>
+        </p:nvSpPr>
+        <p:spPr>
+          <a:xfrm>
+            <a:off x="1" y="1386840"/>
+            <a:ext cx="12192000" cy="4790124"/>
+          </a:xfrm>
+        </p:spPr>
+        <p:txBody>
+          <a:bodyPr>
+            <a:normAutofit/>
+          </a:bodyPr>
+          <a:lstStyle/>
+          <a:p>
+            <a:pPr marL="0" indent="0">
+              <a:buNone/>
+            </a:pPr>
+            <a:endParaRPr lang="en-US" dirty="0">
+              <a:latin typeface="Palatino Linotype" panose="02040502050505030304" pitchFamily="18" charset="0"/>
+            </a:endParaRPr>
+          </a:p>
+          <a:p>
+            <a:pPr marL="0" indent="0">
+              <a:buNone/>
+            </a:pPr>
+            <a:endParaRPr lang="en-US" dirty="0">
+              <a:latin typeface="Palatino Linotype" panose="02040502050505030304" pitchFamily="18" charset="0"/>
+            </a:endParaRPr>
+          </a:p>
+          <a:p>
+            <a:pPr marL="0" indent="0">
+              <a:buNone/>
+            </a:pPr>
+            <a:endParaRPr lang="en-US" dirty="0">
+              <a:latin typeface="Palatino Linotype" panose="02040502050505030304" pitchFamily="18" charset="0"/>
+            </a:endParaRPr>
+          </a:p>
+          <a:p>
+            <a:pPr marL="0" indent="0" algn="ctr">
+              <a:buNone/>
+            </a:pPr>
+            <a:r>
+              <a:rPr lang="en-US" sz="4000" dirty="0">
+                <a:latin typeface="Palatino Linotype" panose="02040502050505030304" pitchFamily="18" charset="0"/>
+              </a:rPr>
+              <a:t>Data is the New Oil</a:t>
+            </a:r>
+          </a:p>
+        </p:txBody>
+      </p:sp>
+    </p:spTree>
+    <p:extLst>
+      <p:ext uri="{BB962C8B-B14F-4D97-AF65-F5344CB8AC3E}">
+        <p14:creationId xmlns:p14="http://schemas.microsoft.com/office/powerpoint/2010/main" val="3868452156"/>
+      </p:ext>
+    </p:extLst>
+  </p:cSld>
+  <p:clrMapOvr>
+    <a:masterClrMapping/>
+  </p:clrMapOvr>
+  <mc:AlternateContent xmlns:mc="http://schemas.openxmlformats.org/markup-compatibility/2006" xmlns:p14="http://schemas.microsoft.com/office/powerpoint/2010/main">
+    <mc:Choice Requires="p14">
+      <p:transition spd="med" p14:dur="700">
+        <p:fade/>
+      </p:transition>
+    </mc:Choice>
+    <mc:Fallback xmlns="">
+      <p:transition spd="med">
+        <p:fade/>
+      </p:transition>
+    </mc:Fallback>
+  </mc:AlternateContent>
+</p:sld>
+</file>
+
+<file path=ppt/slides/slide15.xml><?xml version="1.0" encoding="utf-8"?>
 <p:sld xmlns:a="http://schemas.openxmlformats.org/drawingml/2006/main" xmlns:r="http://schemas.openxmlformats.org/officeDocument/2006/relationships" xmlns:p="http://schemas.openxmlformats.org/presentationml/2006/main">
   <p:cSld>
     <p:spTree>
@@ -6885,12 +7901,12 @@
   </p:clrMapOvr>
   <mc:AlternateContent xmlns:mc="http://schemas.openxmlformats.org/markup-compatibility/2006" xmlns:p14="http://schemas.microsoft.com/office/powerpoint/2010/main">
     <mc:Choice Requires="p14">
-      <p:transition spd="slow" p14:dur="3400">
-        <p14:reveal/>
+      <p:transition spd="med" p14:dur="700">
+        <p:fade/>
       </p:transition>
     </mc:Choice>
     <mc:Fallback xmlns="">
-      <p:transition spd="slow">
+      <p:transition spd="med">
         <p:fade/>
       </p:transition>
     </mc:Fallback>
@@ -6898,7 +7914,7 @@
 </p:sld>
 </file>
 
-<file path=ppt/slides/slide13.xml><?xml version="1.0" encoding="utf-8"?>
+<file path=ppt/slides/slide16.xml><?xml version="1.0" encoding="utf-8"?>
 <p:sld xmlns:a="http://schemas.openxmlformats.org/drawingml/2006/main" xmlns:r="http://schemas.openxmlformats.org/officeDocument/2006/relationships" xmlns:p="http://schemas.openxmlformats.org/presentationml/2006/main">
   <p:cSld>
     <p:spTree>
@@ -6957,12 +7973,12 @@
   </p:clrMapOvr>
   <mc:AlternateContent xmlns:mc="http://schemas.openxmlformats.org/markup-compatibility/2006" xmlns:p14="http://schemas.microsoft.com/office/powerpoint/2010/main">
     <mc:Choice Requires="p14">
-      <p:transition spd="slow" p14:dur="3400">
-        <p14:reveal/>
+      <p:transition spd="med" p14:dur="700">
+        <p:fade/>
       </p:transition>
     </mc:Choice>
     <mc:Fallback xmlns="">
-      <p:transition spd="slow">
+      <p:transition spd="med">
         <p:fade/>
       </p:transition>
     </mc:Fallback>
@@ -6970,7 +7986,7 @@
 </p:sld>
 </file>
 
-<file path=ppt/slides/slide14.xml><?xml version="1.0" encoding="utf-8"?>
+<file path=ppt/slides/slide17.xml><?xml version="1.0" encoding="utf-8"?>
 <p:sld xmlns:a="http://schemas.openxmlformats.org/drawingml/2006/main" xmlns:r="http://schemas.openxmlformats.org/officeDocument/2006/relationships" xmlns:p="http://schemas.openxmlformats.org/presentationml/2006/main">
   <p:cSld>
     <p:spTree>
@@ -7029,12 +8045,12 @@
   </p:clrMapOvr>
   <mc:AlternateContent xmlns:mc="http://schemas.openxmlformats.org/markup-compatibility/2006" xmlns:p14="http://schemas.microsoft.com/office/powerpoint/2010/main">
     <mc:Choice Requires="p14">
-      <p:transition spd="slow" p14:dur="3400">
-        <p14:reveal/>
+      <p:transition spd="med" p14:dur="700">
+        <p:fade/>
       </p:transition>
     </mc:Choice>
     <mc:Fallback xmlns="">
-      <p:transition spd="slow">
+      <p:transition spd="med">
         <p:fade/>
       </p:transition>
     </mc:Fallback>
@@ -7042,7 +8058,7 @@
 </p:sld>
 </file>
 
-<file path=ppt/slides/slide15.xml><?xml version="1.0" encoding="utf-8"?>
+<file path=ppt/slides/slide18.xml><?xml version="1.0" encoding="utf-8"?>
 <p:sld xmlns:a="http://schemas.openxmlformats.org/drawingml/2006/main" xmlns:r="http://schemas.openxmlformats.org/officeDocument/2006/relationships" xmlns:p="http://schemas.openxmlformats.org/presentationml/2006/main">
   <p:cSld>
     <p:spTree>
@@ -7176,12 +8192,12 @@
   </p:clrMapOvr>
   <mc:AlternateContent xmlns:mc="http://schemas.openxmlformats.org/markup-compatibility/2006" xmlns:p14="http://schemas.microsoft.com/office/powerpoint/2010/main">
     <mc:Choice Requires="p14">
-      <p:transition spd="slow" p14:dur="3400">
-        <p14:reveal/>
+      <p:transition spd="med" p14:dur="700">
+        <p:fade/>
       </p:transition>
     </mc:Choice>
     <mc:Fallback xmlns="">
-      <p:transition spd="slow">
+      <p:transition spd="med">
         <p:fade/>
       </p:transition>
     </mc:Fallback>
@@ -7189,7 +8205,7 @@
 </p:sld>
 </file>
 
-<file path=ppt/slides/slide16.xml><?xml version="1.0" encoding="utf-8"?>
+<file path=ppt/slides/slide19.xml><?xml version="1.0" encoding="utf-8"?>
 <p:sld xmlns:a="http://schemas.openxmlformats.org/drawingml/2006/main" xmlns:r="http://schemas.openxmlformats.org/officeDocument/2006/relationships" xmlns:p="http://schemas.openxmlformats.org/presentationml/2006/main">
   <p:cSld>
     <p:spTree>
@@ -7441,12 +8457,12 @@
   </p:clrMapOvr>
   <mc:AlternateContent xmlns:mc="http://schemas.openxmlformats.org/markup-compatibility/2006" xmlns:p14="http://schemas.microsoft.com/office/powerpoint/2010/main">
     <mc:Choice Requires="p14">
-      <p:transition spd="slow" p14:dur="3400">
-        <p14:reveal/>
+      <p:transition spd="med" p14:dur="700">
+        <p:fade/>
       </p:transition>
     </mc:Choice>
     <mc:Fallback xmlns="">
-      <p:transition spd="slow">
+      <p:transition spd="med">
         <p:fade/>
       </p:transition>
     </mc:Fallback>
@@ -7454,7 +8470,157 @@
 </p:sld>
 </file>
 
-<file path=ppt/slides/slide17.xml><?xml version="1.0" encoding="utf-8"?>
+<file path=ppt/slides/slide2.xml><?xml version="1.0" encoding="utf-8"?>
+<p:sld xmlns:a="http://schemas.openxmlformats.org/drawingml/2006/main" xmlns:r="http://schemas.openxmlformats.org/officeDocument/2006/relationships" xmlns:p="http://schemas.openxmlformats.org/presentationml/2006/main">
+  <p:cSld>
+    <p:spTree>
+      <p:nvGrpSpPr>
+        <p:cNvPr id="1" name=""/>
+        <p:cNvGrpSpPr/>
+        <p:nvPr/>
+      </p:nvGrpSpPr>
+      <p:grpSpPr>
+        <a:xfrm>
+          <a:off x="0" y="0"/>
+          <a:ext cx="0" cy="0"/>
+          <a:chOff x="0" y="0"/>
+          <a:chExt cx="0" cy="0"/>
+        </a:xfrm>
+      </p:grpSpPr>
+      <p:sp>
+        <p:nvSpPr>
+          <p:cNvPr id="5" name="Content Placeholder 4">
+            <a:extLst>
+              <a:ext uri="{FF2B5EF4-FFF2-40B4-BE49-F238E27FC236}">
+                <a16:creationId xmlns:a16="http://schemas.microsoft.com/office/drawing/2014/main" id="{7C82B2FA-DB39-467C-9DC1-245874DCBCF1}"/>
+              </a:ext>
+            </a:extLst>
+          </p:cNvPr>
+          <p:cNvSpPr>
+            <a:spLocks noGrp="1"/>
+          </p:cNvSpPr>
+          <p:nvPr>
+            <p:ph idx="1"/>
+          </p:nvPr>
+        </p:nvSpPr>
+        <p:spPr>
+          <a:xfrm>
+            <a:off x="618697" y="1508760"/>
+            <a:ext cx="10576561" cy="4790124"/>
+          </a:xfrm>
+        </p:spPr>
+        <p:txBody>
+          <a:bodyPr>
+            <a:normAutofit/>
+          </a:bodyPr>
+          <a:lstStyle/>
+          <a:p>
+            <a:pPr marL="0" indent="0">
+              <a:buNone/>
+            </a:pPr>
+            <a:endParaRPr lang="en-US" dirty="0">
+              <a:latin typeface="Palatino Linotype" panose="02040502050505030304" pitchFamily="18" charset="0"/>
+            </a:endParaRPr>
+          </a:p>
+          <a:p>
+            <a:pPr marL="0" indent="0">
+              <a:buNone/>
+            </a:pPr>
+            <a:endParaRPr lang="en-US" dirty="0">
+              <a:latin typeface="Palatino Linotype" panose="02040502050505030304" pitchFamily="18" charset="0"/>
+            </a:endParaRPr>
+          </a:p>
+          <a:p>
+            <a:pPr marL="0" indent="0" algn="ctr">
+              <a:buNone/>
+            </a:pPr>
+            <a:r>
+              <a:rPr lang="en-US" sz="4400" dirty="0">
+                <a:latin typeface="Palatino Linotype" panose="02040502050505030304" pitchFamily="18" charset="0"/>
+              </a:rPr>
+              <a:t>Think about and </a:t>
+            </a:r>
+            <a:r>
+              <a:rPr lang="en-US" sz="4400" dirty="0">
+                <a:solidFill>
+                  <a:schemeClr val="accent5">
+                    <a:lumMod val="75000"/>
+                  </a:schemeClr>
+                </a:solidFill>
+                <a:latin typeface="Palatino Linotype" panose="02040502050505030304" pitchFamily="18" charset="0"/>
+              </a:rPr>
+              <a:t>creatively</a:t>
+            </a:r>
+            <a:r>
+              <a:rPr lang="en-US" sz="4400" dirty="0">
+                <a:latin typeface="Palatino Linotype" panose="02040502050505030304" pitchFamily="18" charset="0"/>
+              </a:rPr>
+              <a:t> apply AI to make the world a better place</a:t>
+            </a:r>
+          </a:p>
+        </p:txBody>
+      </p:sp>
+      <p:sp>
+        <p:nvSpPr>
+          <p:cNvPr id="4" name="Title 1">
+            <a:extLst>
+              <a:ext uri="{FF2B5EF4-FFF2-40B4-BE49-F238E27FC236}">
+                <a16:creationId xmlns:a16="http://schemas.microsoft.com/office/drawing/2014/main" id="{A9A9A585-179C-45FC-BE33-30F5057F2269}"/>
+              </a:ext>
+            </a:extLst>
+          </p:cNvPr>
+          <p:cNvSpPr>
+            <a:spLocks noGrp="1"/>
+          </p:cNvSpPr>
+          <p:nvPr>
+            <p:ph type="title"/>
+          </p:nvPr>
+        </p:nvSpPr>
+        <p:spPr>
+          <a:xfrm>
+            <a:off x="618697" y="365127"/>
+            <a:ext cx="10735103" cy="827416"/>
+          </a:xfrm>
+        </p:spPr>
+        <p:txBody>
+          <a:bodyPr>
+            <a:normAutofit/>
+          </a:bodyPr>
+          <a:lstStyle/>
+          <a:p>
+            <a:endParaRPr lang="en-US" sz="3600" dirty="0">
+              <a:latin typeface="Palatino Linotype" panose="02040502050505030304" pitchFamily="18" charset="0"/>
+              <a:cs typeface="Segoe UI Light" panose="020B0502040204020203" pitchFamily="34" charset="0"/>
+            </a:endParaRPr>
+          </a:p>
+        </p:txBody>
+      </p:sp>
+    </p:spTree>
+    <p:extLst>
+      <p:ext uri="{BB962C8B-B14F-4D97-AF65-F5344CB8AC3E}">
+        <p14:creationId xmlns:p14="http://schemas.microsoft.com/office/powerpoint/2010/main" val="2443628232"/>
+      </p:ext>
+    </p:extLst>
+  </p:cSld>
+  <p:clrMapOvr>
+    <a:masterClrMapping/>
+  </p:clrMapOvr>
+  <mc:AlternateContent xmlns:mc="http://schemas.openxmlformats.org/markup-compatibility/2006" xmlns:p14="http://schemas.microsoft.com/office/powerpoint/2010/main">
+    <mc:Choice Requires="p14">
+      <p:transition spd="med" p14:dur="700">
+        <p:fade/>
+      </p:transition>
+    </mc:Choice>
+    <mc:Fallback xmlns="">
+      <p:transition spd="med">
+        <p:fade/>
+      </p:transition>
+    </mc:Fallback>
+  </mc:AlternateContent>
+</p:sld>
+</file>
+
+<file path=ppt/slides/slide20.xml><?xml version="1.0" encoding="utf-8"?>
 <p:sld xmlns:a="http://schemas.openxmlformats.org/drawingml/2006/main" xmlns:r="http://schemas.openxmlformats.org/officeDocument/2006/relationships" xmlns:p="http://schemas.openxmlformats.org/presentationml/2006/main">
   <p:cSld>
     <p:spTree>
@@ -7513,12 +8679,12 @@
   </p:clrMapOvr>
   <mc:AlternateContent xmlns:mc="http://schemas.openxmlformats.org/markup-compatibility/2006" xmlns:p14="http://schemas.microsoft.com/office/powerpoint/2010/main">
     <mc:Choice Requires="p14">
-      <p:transition spd="slow" p14:dur="3400">
-        <p14:reveal/>
+      <p:transition spd="med" p14:dur="700">
+        <p:fade/>
       </p:transition>
     </mc:Choice>
     <mc:Fallback xmlns="">
-      <p:transition spd="slow">
+      <p:transition spd="med">
         <p:fade/>
       </p:transition>
     </mc:Fallback>
@@ -7526,7 +8692,7 @@
 </p:sld>
 </file>
 
-<file path=ppt/slides/slide18.xml><?xml version="1.0" encoding="utf-8"?>
+<file path=ppt/slides/slide21.xml><?xml version="1.0" encoding="utf-8"?>
 <p:sld xmlns:a="http://schemas.openxmlformats.org/drawingml/2006/main" xmlns:r="http://schemas.openxmlformats.org/officeDocument/2006/relationships" xmlns:p="http://schemas.openxmlformats.org/presentationml/2006/main">
   <p:cSld>
     <p:spTree>
@@ -7585,12 +8751,12 @@
   </p:clrMapOvr>
   <mc:AlternateContent xmlns:mc="http://schemas.openxmlformats.org/markup-compatibility/2006" xmlns:p14="http://schemas.microsoft.com/office/powerpoint/2010/main">
     <mc:Choice Requires="p14">
-      <p:transition spd="slow" p14:dur="3400">
-        <p14:reveal/>
+      <p:transition spd="med" p14:dur="700">
+        <p:fade/>
       </p:transition>
     </mc:Choice>
     <mc:Fallback xmlns="">
-      <p:transition spd="slow">
+      <p:transition spd="med">
         <p:fade/>
       </p:transition>
     </mc:Fallback>
@@ -7598,7 +8764,7 @@
 </p:sld>
 </file>
 
-<file path=ppt/slides/slide19.xml><?xml version="1.0" encoding="utf-8"?>
+<file path=ppt/slides/slide22.xml><?xml version="1.0" encoding="utf-8"?>
 <p:sld xmlns:a="http://schemas.openxmlformats.org/drawingml/2006/main" xmlns:r="http://schemas.openxmlformats.org/officeDocument/2006/relationships" xmlns:p="http://schemas.openxmlformats.org/presentationml/2006/main">
   <p:cSld>
     <p:spTree>
@@ -7780,6 +8946,15 @@
         <p:blipFill>
           <a:blip r:embed="rId3">
             <a:extLst>
+              <a:ext uri="{BEBA8EAE-BF5A-486C-A8C5-ECC9F3942E4B}">
+                <a14:imgProps xmlns:a14="http://schemas.microsoft.com/office/drawing/2010/main">
+                  <a14:imgLayer r:embed="rId4">
+                    <a14:imgEffect>
+                      <a14:saturation sat="60000"/>
+                    </a14:imgEffect>
+                  </a14:imgLayer>
+                </a14:imgProps>
+              </a:ext>
               <a:ext uri="{28A0092B-C50C-407E-A947-70E740481C1C}">
                 <a14:useLocalDpi xmlns:a14="http://schemas.microsoft.com/office/drawing/2010/main" val="0"/>
               </a:ext>
@@ -7811,12 +8986,12 @@
   </p:clrMapOvr>
   <mc:AlternateContent xmlns:mc="http://schemas.openxmlformats.org/markup-compatibility/2006" xmlns:p14="http://schemas.microsoft.com/office/powerpoint/2010/main">
     <mc:Choice Requires="p14">
-      <p:transition spd="slow" p14:dur="3400">
-        <p14:reveal/>
+      <p:transition spd="med" p14:dur="700">
+        <p:fade/>
       </p:transition>
     </mc:Choice>
     <mc:Fallback xmlns="">
-      <p:transition spd="slow">
+      <p:transition spd="med">
         <p:fade/>
       </p:transition>
     </mc:Fallback>
@@ -7824,170 +8999,7 @@
 </p:sld>
 </file>
 
-<file path=ppt/slides/slide2.xml><?xml version="1.0" encoding="utf-8"?>
-<p:sld xmlns:a="http://schemas.openxmlformats.org/drawingml/2006/main" xmlns:r="http://schemas.openxmlformats.org/officeDocument/2006/relationships" xmlns:p="http://schemas.openxmlformats.org/presentationml/2006/main">
-  <p:cSld>
-    <p:spTree>
-      <p:nvGrpSpPr>
-        <p:cNvPr id="1" name=""/>
-        <p:cNvGrpSpPr/>
-        <p:nvPr/>
-      </p:nvGrpSpPr>
-      <p:grpSpPr>
-        <a:xfrm>
-          <a:off x="0" y="0"/>
-          <a:ext cx="0" cy="0"/>
-          <a:chOff x="0" y="0"/>
-          <a:chExt cx="0" cy="0"/>
-        </a:xfrm>
-      </p:grpSpPr>
-      <p:sp>
-        <p:nvSpPr>
-          <p:cNvPr id="5" name="Content Placeholder 4">
-            <a:extLst>
-              <a:ext uri="{FF2B5EF4-FFF2-40B4-BE49-F238E27FC236}">
-                <a16:creationId xmlns:a16="http://schemas.microsoft.com/office/drawing/2014/main" id="{7C82B2FA-DB39-467C-9DC1-245874DCBCF1}"/>
-              </a:ext>
-            </a:extLst>
-          </p:cNvPr>
-          <p:cNvSpPr>
-            <a:spLocks noGrp="1"/>
-          </p:cNvSpPr>
-          <p:nvPr>
-            <p:ph idx="1"/>
-          </p:nvPr>
-        </p:nvSpPr>
-        <p:spPr>
-          <a:xfrm>
-            <a:off x="618697" y="1508760"/>
-            <a:ext cx="10576561" cy="4790124"/>
-          </a:xfrm>
-        </p:spPr>
-        <p:txBody>
-          <a:bodyPr>
-            <a:normAutofit/>
-          </a:bodyPr>
-          <a:lstStyle/>
-          <a:p>
-            <a:pPr marL="0" indent="0">
-              <a:buNone/>
-            </a:pPr>
-            <a:endParaRPr lang="en-US" dirty="0">
-              <a:latin typeface="Palatino Linotype" panose="02040502050505030304" pitchFamily="18" charset="0"/>
-            </a:endParaRPr>
-          </a:p>
-          <a:p>
-            <a:pPr marL="0" indent="0">
-              <a:buNone/>
-            </a:pPr>
-            <a:endParaRPr lang="en-US" dirty="0">
-              <a:latin typeface="Palatino Linotype" panose="02040502050505030304" pitchFamily="18" charset="0"/>
-            </a:endParaRPr>
-          </a:p>
-          <a:p>
-            <a:pPr marL="0" indent="0" algn="ctr">
-              <a:buNone/>
-            </a:pPr>
-            <a:r>
-              <a:rPr lang="en-US" sz="4400" dirty="0">
-                <a:latin typeface="Palatino Linotype" panose="02040502050505030304" pitchFamily="18" charset="0"/>
-              </a:rPr>
-              <a:t>Creatively </a:t>
-            </a:r>
-            <a:r>
-              <a:rPr lang="en-US" sz="4400" dirty="0">
-                <a:solidFill>
-                  <a:srgbClr val="80BE63"/>
-                </a:solidFill>
-                <a:latin typeface="Palatino Linotype" panose="02040502050505030304" pitchFamily="18" charset="0"/>
-              </a:rPr>
-              <a:t>reimagine</a:t>
-            </a:r>
-            <a:r>
-              <a:rPr lang="en-US" sz="4400" dirty="0">
-                <a:solidFill>
-                  <a:srgbClr val="FF33CC"/>
-                </a:solidFill>
-                <a:latin typeface="Palatino Linotype" panose="02040502050505030304" pitchFamily="18" charset="0"/>
-              </a:rPr>
-              <a:t> </a:t>
-            </a:r>
-            <a:r>
-              <a:rPr lang="en-US" sz="4400" dirty="0">
-                <a:latin typeface="Palatino Linotype" panose="02040502050505030304" pitchFamily="18" charset="0"/>
-              </a:rPr>
-              <a:t>your future in the light of AI</a:t>
-            </a:r>
-            <a:endParaRPr lang="en-US" sz="4400" dirty="0">
-              <a:solidFill>
-                <a:srgbClr val="FF33CC"/>
-              </a:solidFill>
-              <a:latin typeface="Palatino Linotype" panose="02040502050505030304" pitchFamily="18" charset="0"/>
-            </a:endParaRPr>
-          </a:p>
-        </p:txBody>
-      </p:sp>
-      <p:sp>
-        <p:nvSpPr>
-          <p:cNvPr id="4" name="Title 1">
-            <a:extLst>
-              <a:ext uri="{FF2B5EF4-FFF2-40B4-BE49-F238E27FC236}">
-                <a16:creationId xmlns:a16="http://schemas.microsoft.com/office/drawing/2014/main" id="{A9A9A585-179C-45FC-BE33-30F5057F2269}"/>
-              </a:ext>
-            </a:extLst>
-          </p:cNvPr>
-          <p:cNvSpPr>
-            <a:spLocks noGrp="1"/>
-          </p:cNvSpPr>
-          <p:nvPr>
-            <p:ph type="title"/>
-          </p:nvPr>
-        </p:nvSpPr>
-        <p:spPr>
-          <a:xfrm>
-            <a:off x="618697" y="365127"/>
-            <a:ext cx="10735103" cy="827416"/>
-          </a:xfrm>
-        </p:spPr>
-        <p:txBody>
-          <a:bodyPr>
-            <a:normAutofit/>
-          </a:bodyPr>
-          <a:lstStyle/>
-          <a:p>
-            <a:endParaRPr lang="en-US" sz="3600" dirty="0">
-              <a:latin typeface="Palatino Linotype" panose="02040502050505030304" pitchFamily="18" charset="0"/>
-              <a:cs typeface="Segoe UI Light" panose="020B0502040204020203" pitchFamily="34" charset="0"/>
-            </a:endParaRPr>
-          </a:p>
-        </p:txBody>
-      </p:sp>
-    </p:spTree>
-    <p:extLst>
-      <p:ext uri="{BB962C8B-B14F-4D97-AF65-F5344CB8AC3E}">
-        <p14:creationId xmlns:p14="http://schemas.microsoft.com/office/powerpoint/2010/main" val="2443628232"/>
-      </p:ext>
-    </p:extLst>
-  </p:cSld>
-  <p:clrMapOvr>
-    <a:masterClrMapping/>
-  </p:clrMapOvr>
-  <mc:AlternateContent xmlns:mc="http://schemas.openxmlformats.org/markup-compatibility/2006" xmlns:p14="http://schemas.microsoft.com/office/powerpoint/2010/main">
-    <mc:Choice Requires="p14">
-      <p:transition spd="slow" p14:dur="3400">
-        <p14:reveal/>
-      </p:transition>
-    </mc:Choice>
-    <mc:Fallback xmlns="">
-      <p:transition spd="slow">
-        <p:fade/>
-      </p:transition>
-    </mc:Fallback>
-  </mc:AlternateContent>
-</p:sld>
-</file>
-
-<file path=ppt/slides/slide20.xml><?xml version="1.0" encoding="utf-8"?>
+<file path=ppt/slides/slide23.xml><?xml version="1.0" encoding="utf-8"?>
 <p:sld xmlns:a="http://schemas.openxmlformats.org/drawingml/2006/main" xmlns:r="http://schemas.openxmlformats.org/officeDocument/2006/relationships" xmlns:p="http://schemas.openxmlformats.org/presentationml/2006/main">
   <p:cSld>
     <p:spTree>
@@ -8102,12 +9114,12 @@
   </p:clrMapOvr>
   <mc:AlternateContent xmlns:mc="http://schemas.openxmlformats.org/markup-compatibility/2006" xmlns:p14="http://schemas.microsoft.com/office/powerpoint/2010/main">
     <mc:Choice Requires="p14">
-      <p:transition spd="slow" p14:dur="3400">
-        <p14:reveal/>
+      <p:transition spd="med" p14:dur="700">
+        <p:fade/>
       </p:transition>
     </mc:Choice>
     <mc:Fallback xmlns="">
-      <p:transition spd="slow">
+      <p:transition spd="med">
         <p:fade/>
       </p:transition>
     </mc:Fallback>
@@ -8115,7 +9127,7 @@
 </p:sld>
 </file>
 
-<file path=ppt/slides/slide21.xml><?xml version="1.0" encoding="utf-8"?>
+<file path=ppt/slides/slide24.xml><?xml version="1.0" encoding="utf-8"?>
 <p:sld xmlns:a="http://schemas.openxmlformats.org/drawingml/2006/main" xmlns:r="http://schemas.openxmlformats.org/officeDocument/2006/relationships" xmlns:p="http://schemas.openxmlformats.org/presentationml/2006/main">
   <p:cSld>
     <p:spTree>
@@ -8405,7 +9417,7 @@
               <a:rPr lang="en-US" sz="2400" dirty="0">
                 <a:latin typeface="Palatino Linotype" panose="02040502050505030304" pitchFamily="18" charset="0"/>
               </a:rPr>
-              <a:t> Learning Plan</a:t>
+              <a:t> Application</a:t>
             </a:r>
           </a:p>
           <a:p>
@@ -8464,7 +9476,7 @@
 </p:sld>
 </file>
 
-<file path=ppt/slides/slide22.xml><?xml version="1.0" encoding="utf-8"?>
+<file path=ppt/slides/slide25.xml><?xml version="1.0" encoding="utf-8"?>
 <p:sld xmlns:a="http://schemas.openxmlformats.org/drawingml/2006/main" xmlns:r="http://schemas.openxmlformats.org/officeDocument/2006/relationships" xmlns:p="http://schemas.openxmlformats.org/presentationml/2006/main">
   <p:cSld>
     <p:spTree>
@@ -8590,7 +9602,7 @@
 </p:sld>
 </file>
 
-<file path=ppt/slides/slide23.xml><?xml version="1.0" encoding="utf-8"?>
+<file path=ppt/slides/slide26.xml><?xml version="1.0" encoding="utf-8"?>
 <p:sld xmlns:a="http://schemas.openxmlformats.org/drawingml/2006/main" xmlns:r="http://schemas.openxmlformats.org/officeDocument/2006/relationships" xmlns:p="http://schemas.openxmlformats.org/presentationml/2006/main">
   <p:cSld>
     <p:spTree>
@@ -8889,10 +9901,10 @@
       </p:grpSpPr>
       <p:sp>
         <p:nvSpPr>
-          <p:cNvPr id="5" name="Content Placeholder 4">
+          <p:cNvPr id="2" name="Title 1">
             <a:extLst>
               <a:ext uri="{FF2B5EF4-FFF2-40B4-BE49-F238E27FC236}">
-                <a16:creationId xmlns:a16="http://schemas.microsoft.com/office/drawing/2014/main" id="{7C82B2FA-DB39-467C-9DC1-245874DCBCF1}"/>
+                <a16:creationId xmlns:a16="http://schemas.microsoft.com/office/drawing/2014/main" id="{8306FF31-301F-43F0-8202-A782726E446A}"/>
               </a:ext>
             </a:extLst>
           </p:cNvPr>
@@ -8900,13 +9912,13 @@
             <a:spLocks noGrp="1"/>
           </p:cNvSpPr>
           <p:nvPr>
-            <p:ph idx="1"/>
+            <p:ph type="title"/>
           </p:nvPr>
         </p:nvSpPr>
         <p:spPr>
           <a:xfrm>
-            <a:off x="1" y="1386840"/>
-            <a:ext cx="12192000" cy="4790124"/>
+            <a:off x="618697" y="365127"/>
+            <a:ext cx="10735103" cy="827416"/>
           </a:xfrm>
         </p:spPr>
         <p:txBody>
@@ -8915,61 +9927,56 @@
           </a:bodyPr>
           <a:lstStyle/>
           <a:p>
-            <a:pPr marL="0" indent="0">
-              <a:buNone/>
-            </a:pPr>
-            <a:endParaRPr lang="en-US" dirty="0">
-              <a:latin typeface="Palatino Linotype" panose="02040502050505030304" pitchFamily="18" charset="0"/>
-            </a:endParaRPr>
-          </a:p>
-          <a:p>
-            <a:pPr marL="0" indent="0">
-              <a:buNone/>
-            </a:pPr>
-            <a:endParaRPr lang="en-US" dirty="0">
-              <a:latin typeface="Palatino Linotype" panose="02040502050505030304" pitchFamily="18" charset="0"/>
-            </a:endParaRPr>
-          </a:p>
-          <a:p>
-            <a:pPr marL="0" indent="0">
-              <a:buNone/>
-            </a:pPr>
-            <a:endParaRPr lang="en-US" dirty="0">
-              <a:latin typeface="Palatino Linotype" panose="02040502050505030304" pitchFamily="18" charset="0"/>
-            </a:endParaRPr>
-          </a:p>
-          <a:p>
-            <a:pPr marL="0" indent="0" algn="ctr">
-              <a:buNone/>
-            </a:pPr>
-            <a:r>
-              <a:rPr lang="en-US" sz="4000" dirty="0">
+            <a:pPr algn="ctr"/>
+            <a:r>
+              <a:rPr lang="en-US" sz="3600" dirty="0">
                 <a:latin typeface="Palatino Linotype" panose="02040502050505030304" pitchFamily="18" charset="0"/>
+                <a:cs typeface="Segoe UI Light" panose="020B0502040204020203" pitchFamily="34" charset="0"/>
               </a:rPr>
-              <a:t>Start with your </a:t>
-            </a:r>
-            <a:r>
-              <a:rPr lang="en-US" sz="4000" dirty="0">
-                <a:solidFill>
-                  <a:srgbClr val="80BE63"/>
-                </a:solidFill>
-                <a:latin typeface="Palatino Linotype" panose="02040502050505030304" pitchFamily="18" charset="0"/>
-              </a:rPr>
-              <a:t>Interests, </a:t>
-            </a:r>
-            <a:r>
-              <a:rPr lang="en-US" sz="4000" dirty="0">
-                <a:latin typeface="Palatino Linotype" panose="02040502050505030304" pitchFamily="18" charset="0"/>
-              </a:rPr>
-              <a:t>Not the Technology</a:t>
-            </a:r>
-          </a:p>
-        </p:txBody>
-      </p:sp>
+              <a:t>AI is Expansive</a:t>
+            </a:r>
+          </a:p>
+        </p:txBody>
+      </p:sp>
+      <p:pic>
+        <p:nvPicPr>
+          <p:cNvPr id="7" name="Content Placeholder 6" descr="A picture containing graphical user interface&#10;&#10;Description automatically generated">
+            <a:extLst>
+              <a:ext uri="{FF2B5EF4-FFF2-40B4-BE49-F238E27FC236}">
+                <a16:creationId xmlns:a16="http://schemas.microsoft.com/office/drawing/2014/main" id="{A240B604-1258-4FAC-BA47-26EE475A1318}"/>
+              </a:ext>
+            </a:extLst>
+          </p:cNvPr>
+          <p:cNvPicPr>
+            <a:picLocks noGrp="1" noChangeAspect="1"/>
+          </p:cNvPicPr>
+          <p:nvPr>
+            <p:ph idx="1"/>
+          </p:nvPr>
+        </p:nvPicPr>
+        <p:blipFill>
+          <a:blip r:embed="rId3">
+            <a:extLst>
+              <a:ext uri="{28A0092B-C50C-407E-A947-70E740481C1C}">
+                <a14:useLocalDpi xmlns:a14="http://schemas.microsoft.com/office/drawing/2010/main" val="0"/>
+              </a:ext>
+            </a:extLst>
+          </a:blip>
+          <a:stretch>
+            <a:fillRect/>
+          </a:stretch>
+        </p:blipFill>
+        <p:spPr>
+          <a:xfrm>
+            <a:off x="2079380" y="1825625"/>
+            <a:ext cx="8033239" cy="4351338"/>
+          </a:xfrm>
+        </p:spPr>
+      </p:pic>
     </p:spTree>
     <p:extLst>
       <p:ext uri="{BB962C8B-B14F-4D97-AF65-F5344CB8AC3E}">
-        <p14:creationId xmlns:p14="http://schemas.microsoft.com/office/powerpoint/2010/main" val="1397534281"/>
+        <p14:creationId xmlns:p14="http://schemas.microsoft.com/office/powerpoint/2010/main" val="1291068763"/>
       </p:ext>
     </p:extLst>
   </p:cSld>
@@ -8978,12 +9985,12 @@
   </p:clrMapOvr>
   <mc:AlternateContent xmlns:mc="http://schemas.openxmlformats.org/markup-compatibility/2006" xmlns:p14="http://schemas.microsoft.com/office/powerpoint/2010/main">
     <mc:Choice Requires="p14">
-      <p:transition spd="slow" p14:dur="3400">
-        <p14:reveal/>
+      <p:transition spd="med" p14:dur="700">
+        <p:fade/>
       </p:transition>
     </mc:Choice>
     <mc:Fallback xmlns="">
-      <p:transition spd="slow">
+      <p:transition spd="med">
         <p:fade/>
       </p:transition>
     </mc:Fallback>
@@ -9037,55 +10044,101 @@
           <a:lstStyle/>
           <a:p>
             <a:pPr algn="ctr"/>
-            <a:r>
-              <a:rPr lang="en-US" sz="3600" dirty="0">
-                <a:latin typeface="Palatino Linotype" panose="02040502050505030304" pitchFamily="18" charset="0"/>
-                <a:cs typeface="Segoe UI Light" panose="020B0502040204020203" pitchFamily="34" charset="0"/>
-              </a:rPr>
-              <a:t>AI is Expansive</a:t>
-            </a:r>
-          </a:p>
-        </p:txBody>
-      </p:sp>
-      <p:pic>
-        <p:nvPicPr>
-          <p:cNvPr id="7" name="Content Placeholder 6" descr="A picture containing graphical user interface&#10;&#10;Description automatically generated">
+            <a:endParaRPr lang="en-US" sz="3600" dirty="0">
+              <a:latin typeface="Palatino Linotype" panose="02040502050505030304" pitchFamily="18" charset="0"/>
+              <a:cs typeface="Segoe UI Light" panose="020B0502040204020203" pitchFamily="34" charset="0"/>
+            </a:endParaRPr>
+          </a:p>
+        </p:txBody>
+      </p:sp>
+      <p:sp>
+        <p:nvSpPr>
+          <p:cNvPr id="4" name="Content Placeholder 3">
             <a:extLst>
               <a:ext uri="{FF2B5EF4-FFF2-40B4-BE49-F238E27FC236}">
-                <a16:creationId xmlns:a16="http://schemas.microsoft.com/office/drawing/2014/main" id="{A240B604-1258-4FAC-BA47-26EE475A1318}"/>
+                <a16:creationId xmlns:a16="http://schemas.microsoft.com/office/drawing/2014/main" id="{4E4AB757-90A1-4A72-AC15-A8FE775EA8EA}"/>
               </a:ext>
             </a:extLst>
           </p:cNvPr>
-          <p:cNvPicPr>
-            <a:picLocks noGrp="1" noChangeAspect="1"/>
-          </p:cNvPicPr>
+          <p:cNvSpPr>
+            <a:spLocks noGrp="1"/>
+          </p:cNvSpPr>
           <p:nvPr>
             <p:ph idx="1"/>
           </p:nvPr>
-        </p:nvPicPr>
-        <p:blipFill>
-          <a:blip r:embed="rId3">
-            <a:extLst>
-              <a:ext uri="{28A0092B-C50C-407E-A947-70E740481C1C}">
-                <a14:useLocalDpi xmlns:a14="http://schemas.microsoft.com/office/drawing/2010/main" val="0"/>
-              </a:ext>
-            </a:extLst>
-          </a:blip>
-          <a:stretch>
-            <a:fillRect/>
-          </a:stretch>
-        </p:blipFill>
+        </p:nvSpPr>
         <p:spPr>
           <a:xfrm>
-            <a:off x="2079380" y="1825625"/>
-            <a:ext cx="8033239" cy="4351338"/>
+            <a:off x="838200" y="1490346"/>
+            <a:ext cx="10515600" cy="4351338"/>
           </a:xfrm>
         </p:spPr>
-      </p:pic>
+        <p:txBody>
+          <a:bodyPr/>
+          <a:lstStyle/>
+          <a:p>
+            <a:pPr marL="0" indent="0">
+              <a:buNone/>
+            </a:pPr>
+            <a:endParaRPr lang="en-US" dirty="0"/>
+          </a:p>
+          <a:p>
+            <a:pPr marL="0" indent="0">
+              <a:buNone/>
+            </a:pPr>
+            <a:r>
+              <a:rPr lang="en-US" sz="2800" dirty="0">
+                <a:latin typeface="Palatino Linotype" panose="02040502050505030304" pitchFamily="18" charset="0"/>
+              </a:rPr>
+              <a:t>Machine learning is the field of study that gives computers the ability to learn without being explicitly programmed.</a:t>
+            </a:r>
+          </a:p>
+          <a:p>
+            <a:pPr marL="0" indent="0">
+              <a:buNone/>
+            </a:pPr>
+            <a:r>
+              <a:rPr lang="en-US" sz="2800" dirty="0">
+                <a:latin typeface="Palatino Linotype" panose="02040502050505030304" pitchFamily="18" charset="0"/>
+              </a:rPr>
+              <a:t>						-- Arthur Samuel (1959)</a:t>
+            </a:r>
+          </a:p>
+          <a:p>
+            <a:pPr marL="0" indent="0">
+              <a:buFont typeface="Arial" panose="020B0604020202020204" pitchFamily="34" charset="0"/>
+              <a:buNone/>
+            </a:pPr>
+            <a:endParaRPr lang="en-US" dirty="0">
+              <a:latin typeface="Palatino Linotype" panose="02040502050505030304" pitchFamily="18" charset="0"/>
+            </a:endParaRPr>
+          </a:p>
+          <a:p>
+            <a:pPr marL="0" indent="0">
+              <a:buFont typeface="Arial" panose="020B0604020202020204" pitchFamily="34" charset="0"/>
+              <a:buNone/>
+            </a:pPr>
+            <a:r>
+              <a:rPr lang="en-US" dirty="0">
+                <a:latin typeface="Palatino Linotype" panose="02040502050505030304" pitchFamily="18" charset="0"/>
+              </a:rPr>
+              <a:t>Machine learning is the science and art of programming computers so they can learn from data.</a:t>
+            </a:r>
+          </a:p>
+          <a:p>
+            <a:pPr marL="0" indent="0" algn="ctr">
+              <a:buNone/>
+            </a:pPr>
+            <a:endParaRPr lang="en-US" dirty="0">
+              <a:latin typeface="+mj-lt"/>
+            </a:endParaRPr>
+          </a:p>
+        </p:txBody>
+      </p:sp>
     </p:spTree>
     <p:extLst>
       <p:ext uri="{BB962C8B-B14F-4D97-AF65-F5344CB8AC3E}">
-        <p14:creationId xmlns:p14="http://schemas.microsoft.com/office/powerpoint/2010/main" val="1291068763"/>
+        <p14:creationId xmlns:p14="http://schemas.microsoft.com/office/powerpoint/2010/main" val="888845023"/>
       </p:ext>
     </p:extLst>
   </p:cSld>
@@ -9094,12 +10147,12 @@
   </p:clrMapOvr>
   <mc:AlternateContent xmlns:mc="http://schemas.openxmlformats.org/markup-compatibility/2006" xmlns:p14="http://schemas.microsoft.com/office/powerpoint/2010/main">
     <mc:Choice Requires="p14">
-      <p:transition spd="slow" p14:dur="3400">
-        <p14:reveal/>
+      <p:transition spd="med" p14:dur="700">
+        <p:fade/>
       </p:transition>
     </mc:Choice>
     <mc:Fallback xmlns="">
-      <p:transition spd="slow">
+      <p:transition spd="med">
         <p:fade/>
       </p:transition>
     </mc:Fallback>
@@ -9129,7 +10182,7 @@
           <p:cNvPr id="2" name="Title 1">
             <a:extLst>
               <a:ext uri="{FF2B5EF4-FFF2-40B4-BE49-F238E27FC236}">
-                <a16:creationId xmlns:a16="http://schemas.microsoft.com/office/drawing/2014/main" id="{8306FF31-301F-43F0-8202-A782726E446A}"/>
+                <a16:creationId xmlns:a16="http://schemas.microsoft.com/office/drawing/2014/main" id="{28FF21C3-8FBB-4756-BF7C-FFD2E5CC2B06}"/>
               </a:ext>
             </a:extLst>
           </p:cNvPr>
@@ -9142,8 +10195,8 @@
         </p:nvSpPr>
         <p:spPr>
           <a:xfrm>
-            <a:off x="618697" y="365127"/>
-            <a:ext cx="10735103" cy="827416"/>
+            <a:off x="511791" y="440190"/>
+            <a:ext cx="11061510" cy="815404"/>
           </a:xfrm>
         </p:spPr>
         <p:txBody>
@@ -9153,19 +10206,28 @@
           <a:lstStyle/>
           <a:p>
             <a:pPr algn="ctr"/>
-            <a:endParaRPr lang="en-US" sz="3600" dirty="0">
-              <a:latin typeface="Palatino Linotype" panose="02040502050505030304" pitchFamily="18" charset="0"/>
-              <a:cs typeface="Segoe UI Light" panose="020B0502040204020203" pitchFamily="34" charset="0"/>
-            </a:endParaRPr>
-          </a:p>
-        </p:txBody>
-      </p:sp>
-      <p:sp>
-        <p:nvSpPr>
-          <p:cNvPr id="4" name="Content Placeholder 3">
+            <a:r>
+              <a:rPr lang="en-US" sz="4000" dirty="0">
+                <a:solidFill>
+                  <a:schemeClr val="tx1">
+                    <a:lumMod val="75000"/>
+                    <a:lumOff val="25000"/>
+                  </a:schemeClr>
+                </a:solidFill>
+                <a:latin typeface="Palatino Linotype" panose="02040502050505030304" pitchFamily="18" charset="0"/>
+                <a:cs typeface="Segoe UI Light" panose="020B0502040204020203" pitchFamily="34" charset="0"/>
+              </a:rPr>
+              <a:t>Unique Instructional Features</a:t>
+            </a:r>
+          </a:p>
+        </p:txBody>
+      </p:sp>
+      <p:sp>
+        <p:nvSpPr>
+          <p:cNvPr id="12" name="Content Placeholder 11">
             <a:extLst>
               <a:ext uri="{FF2B5EF4-FFF2-40B4-BE49-F238E27FC236}">
-                <a16:creationId xmlns:a16="http://schemas.microsoft.com/office/drawing/2014/main" id="{4E4AB757-90A1-4A72-AC15-A8FE775EA8EA}"/>
+                <a16:creationId xmlns:a16="http://schemas.microsoft.com/office/drawing/2014/main" id="{BBE625DF-4A5E-4AA2-BC23-690FAE22DDF7}"/>
               </a:ext>
             </a:extLst>
           </p:cNvPr>
@@ -9178,68 +10240,89 @@
         </p:nvSpPr>
         <p:spPr>
           <a:xfrm>
-            <a:off x="838200" y="1490346"/>
-            <a:ext cx="10515600" cy="4351338"/>
+            <a:off x="511791" y="1833939"/>
+            <a:ext cx="11061510" cy="4583871"/>
           </a:xfrm>
         </p:spPr>
         <p:txBody>
-          <a:bodyPr/>
-          <a:lstStyle/>
-          <a:p>
-            <a:pPr marL="0" indent="0">
+          <a:bodyPr>
+            <a:normAutofit/>
+          </a:bodyPr>
+          <a:lstStyle/>
+          <a:p>
+            <a:pPr marL="0" indent="0" algn="ctr">
+              <a:lnSpc>
+                <a:spcPct val="200000"/>
+              </a:lnSpc>
               <a:buNone/>
             </a:pPr>
-            <a:endParaRPr lang="en-US" dirty="0"/>
-          </a:p>
-          <a:p>
-            <a:pPr marL="0" indent="0">
-              <a:buNone/>
-            </a:pPr>
-            <a:r>
-              <a:rPr lang="en-US" sz="2800" dirty="0">
+            <a:r>
+              <a:rPr lang="en-US" sz="2400" dirty="0">
                 <a:latin typeface="Palatino Linotype" panose="02040502050505030304" pitchFamily="18" charset="0"/>
               </a:rPr>
-              <a:t>Machine learning is the field of study that gives computers the ability to learn without being explicitly programmed.</a:t>
-            </a:r>
-          </a:p>
-          <a:p>
-            <a:pPr marL="0" indent="0">
-              <a:buNone/>
-            </a:pPr>
-            <a:r>
-              <a:rPr lang="en-US" sz="2800" dirty="0">
+              <a:t>The Practicum AI curriculum is characterized by a </a:t>
+            </a:r>
+            <a:r>
+              <a:rPr lang="en-US" sz="2400" dirty="0">
+                <a:solidFill>
+                  <a:schemeClr val="accent5">
+                    <a:lumMod val="75000"/>
+                  </a:schemeClr>
+                </a:solidFill>
                 <a:latin typeface="Palatino Linotype" panose="02040502050505030304" pitchFamily="18" charset="0"/>
               </a:rPr>
-              <a:t>						-- Arthur Samuel (1959)</a:t>
-            </a:r>
-          </a:p>
-          <a:p>
-            <a:pPr marL="0" indent="0">
-              <a:buFont typeface="Arial" panose="020B0604020202020204" pitchFamily="34" charset="0"/>
-              <a:buNone/>
-            </a:pPr>
-            <a:endParaRPr lang="en-US" dirty="0">
-              <a:latin typeface="Palatino Linotype" panose="02040502050505030304" pitchFamily="18" charset="0"/>
-            </a:endParaRPr>
-          </a:p>
-          <a:p>
-            <a:pPr marL="0" indent="0">
-              <a:buFont typeface="Arial" panose="020B0604020202020204" pitchFamily="34" charset="0"/>
-              <a:buNone/>
-            </a:pPr>
-            <a:r>
-              <a:rPr lang="en-US" dirty="0">
+              <a:t>visual</a:t>
+            </a:r>
+            <a:r>
+              <a:rPr lang="en-US" sz="2400" dirty="0">
                 <a:latin typeface="Palatino Linotype" panose="02040502050505030304" pitchFamily="18" charset="0"/>
               </a:rPr>
-              <a:t>Machine learning is the science and art of programming computers so they can learn from data.</a:t>
+              <a:t>, </a:t>
+            </a:r>
+            <a:r>
+              <a:rPr lang="en-US" sz="2400" dirty="0">
+                <a:solidFill>
+                  <a:schemeClr val="accent5">
+                    <a:lumMod val="75000"/>
+                  </a:schemeClr>
+                </a:solidFill>
+                <a:latin typeface="Palatino Linotype" panose="02040502050505030304" pitchFamily="18" charset="0"/>
+              </a:rPr>
+              <a:t>story-based</a:t>
+            </a:r>
+            <a:r>
+              <a:rPr lang="en-US" sz="2400" dirty="0">
+                <a:latin typeface="Palatino Linotype" panose="02040502050505030304" pitchFamily="18" charset="0"/>
+              </a:rPr>
+              <a:t> approach to learning with abundant </a:t>
+            </a:r>
+            <a:r>
+              <a:rPr lang="en-US" sz="2400" dirty="0">
+                <a:solidFill>
+                  <a:schemeClr val="accent5">
+                    <a:lumMod val="75000"/>
+                  </a:schemeClr>
+                </a:solidFill>
+                <a:latin typeface="Palatino Linotype" panose="02040502050505030304" pitchFamily="18" charset="0"/>
+              </a:rPr>
+              <a:t>hands-on coding</a:t>
+            </a:r>
+            <a:r>
+              <a:rPr lang="en-US" sz="2400" dirty="0">
+                <a:latin typeface="Palatino Linotype" panose="02040502050505030304" pitchFamily="18" charset="0"/>
+              </a:rPr>
+              <a:t> experiences</a:t>
             </a:r>
           </a:p>
           <a:p>
             <a:pPr marL="0" indent="0" algn="ctr">
+              <a:lnSpc>
+                <a:spcPct val="200000"/>
+              </a:lnSpc>
               <a:buNone/>
             </a:pPr>
-            <a:endParaRPr lang="en-US" dirty="0">
-              <a:latin typeface="+mj-lt"/>
+            <a:endParaRPr lang="en-US" sz="2400" dirty="0">
+              <a:latin typeface="Palatino Linotype" panose="02040502050505030304" pitchFamily="18" charset="0"/>
             </a:endParaRPr>
           </a:p>
         </p:txBody>
@@ -9247,7 +10330,7 @@
     </p:spTree>
     <p:extLst>
       <p:ext uri="{BB962C8B-B14F-4D97-AF65-F5344CB8AC3E}">
-        <p14:creationId xmlns:p14="http://schemas.microsoft.com/office/powerpoint/2010/main" val="888845023"/>
+        <p14:creationId xmlns:p14="http://schemas.microsoft.com/office/powerpoint/2010/main" val="2853843531"/>
       </p:ext>
     </p:extLst>
   </p:cSld>
@@ -9256,12 +10339,12 @@
   </p:clrMapOvr>
   <mc:AlternateContent xmlns:mc="http://schemas.openxmlformats.org/markup-compatibility/2006" xmlns:p14="http://schemas.microsoft.com/office/powerpoint/2010/main">
     <mc:Choice Requires="p14">
-      <p:transition spd="slow" p14:dur="3400">
-        <p14:reveal/>
+      <p:transition spd="med" p14:dur="700">
+        <p:fade/>
       </p:transition>
     </mc:Choice>
     <mc:Fallback xmlns="">
-      <p:transition spd="slow">
+      <p:transition spd="med">
         <p:fade/>
       </p:transition>
     </mc:Fallback>
@@ -9326,7 +10409,7 @@
                 <a:latin typeface="Palatino Linotype" panose="02040502050505030304" pitchFamily="18" charset="0"/>
                 <a:cs typeface="Segoe UI Light" panose="020B0502040204020203" pitchFamily="34" charset="0"/>
               </a:rPr>
-              <a:t>Practicum AI Overview</a:t>
+              <a:t>Our target audience is…</a:t>
             </a:r>
           </a:p>
         </p:txBody>
@@ -9369,7 +10452,7 @@
               <a:rPr lang="en-US" sz="2400" dirty="0">
                 <a:latin typeface="Palatino Linotype" panose="02040502050505030304" pitchFamily="18" charset="0"/>
               </a:rPr>
-              <a:t>Content is Entry-Level to Intermediate</a:t>
+              <a:t>Non-technical</a:t>
             </a:r>
           </a:p>
           <a:p>
@@ -9383,7 +10466,7 @@
               <a:rPr lang="en-US" sz="2400" dirty="0">
                 <a:latin typeface="Palatino Linotype" panose="02040502050505030304" pitchFamily="18" charset="0"/>
               </a:rPr>
-              <a:t>Visual (Not Formulas)</a:t>
+              <a:t>Curious about A.I.</a:t>
             </a:r>
           </a:p>
           <a:p>
@@ -9397,21 +10480,24 @@
               <a:rPr lang="en-US" sz="2400" dirty="0">
                 <a:latin typeface="Palatino Linotype" panose="02040502050505030304" pitchFamily="18" charset="0"/>
               </a:rPr>
-              <a:t>Step-Wise Learning</a:t>
-            </a:r>
-          </a:p>
-          <a:p>
-            <a:pPr marL="0" indent="0" algn="ctr">
-              <a:lnSpc>
-                <a:spcPct val="200000"/>
-              </a:lnSpc>
-              <a:buNone/>
-            </a:pPr>
+              <a:t>Committed to </a:t>
+            </a:r>
+            <a:r>
+              <a:rPr lang="en-US" sz="2400" dirty="0">
+                <a:solidFill>
+                  <a:schemeClr val="accent5">
+                    <a:lumMod val="75000"/>
+                  </a:schemeClr>
+                </a:solidFill>
+                <a:latin typeface="Palatino Linotype" panose="02040502050505030304" pitchFamily="18" charset="0"/>
+              </a:rPr>
+              <a:t>Tinker &amp; Play </a:t>
+            </a:r>
             <a:r>
               <a:rPr lang="en-US" sz="2400" dirty="0">
                 <a:latin typeface="Palatino Linotype" panose="02040502050505030304" pitchFamily="18" charset="0"/>
               </a:rPr>
-              <a:t>Applied Artificial Intelligence</a:t>
+              <a:t>learning</a:t>
             </a:r>
           </a:p>
         </p:txBody>
@@ -9419,7 +10505,7 @@
     </p:spTree>
     <p:extLst>
       <p:ext uri="{BB962C8B-B14F-4D97-AF65-F5344CB8AC3E}">
-        <p14:creationId xmlns:p14="http://schemas.microsoft.com/office/powerpoint/2010/main" val="2853843531"/>
+        <p14:creationId xmlns:p14="http://schemas.microsoft.com/office/powerpoint/2010/main" val="1109797739"/>
       </p:ext>
     </p:extLst>
   </p:cSld>
@@ -9458,151 +10544,72 @@
           <a:chExt cx="0" cy="0"/>
         </a:xfrm>
       </p:grpSpPr>
-      <p:sp>
-        <p:nvSpPr>
-          <p:cNvPr id="2" name="Title 1">
+      <p:pic>
+        <p:nvPicPr>
+          <p:cNvPr id="1026" name="Picture 2" descr="Bricolage, Jugaad, and Indianness Part 1 – Incorrigibly romantic …">
             <a:extLst>
               <a:ext uri="{FF2B5EF4-FFF2-40B4-BE49-F238E27FC236}">
-                <a16:creationId xmlns:a16="http://schemas.microsoft.com/office/drawing/2014/main" id="{28FF21C3-8FBB-4756-BF7C-FFD2E5CC2B06}"/>
+                <a16:creationId xmlns:a16="http://schemas.microsoft.com/office/drawing/2014/main" id="{279B6237-2D5A-4311-9B90-14FFF1A7F12F}"/>
               </a:ext>
             </a:extLst>
           </p:cNvPr>
-          <p:cNvSpPr>
-            <a:spLocks noGrp="1"/>
-          </p:cNvSpPr>
-          <p:nvPr>
-            <p:ph type="title"/>
-          </p:nvPr>
-        </p:nvSpPr>
-        <p:spPr>
+          <p:cNvPicPr>
+            <a:picLocks noChangeAspect="1" noChangeArrowheads="1"/>
+          </p:cNvPicPr>
+          <p:nvPr/>
+        </p:nvPicPr>
+        <p:blipFill>
+          <a:blip r:embed="rId3">
+            <a:extLst>
+              <a:ext uri="{28A0092B-C50C-407E-A947-70E740481C1C}">
+                <a14:useLocalDpi xmlns:a14="http://schemas.microsoft.com/office/drawing/2010/main" val="0"/>
+              </a:ext>
+            </a:extLst>
+          </a:blip>
+          <a:srcRect/>
+          <a:stretch>
+            <a:fillRect/>
+          </a:stretch>
+        </p:blipFill>
+        <p:spPr bwMode="auto">
           <a:xfrm>
-            <a:off x="511791" y="440190"/>
-            <a:ext cx="11061510" cy="815404"/>
+            <a:off x="2857500" y="1338262"/>
+            <a:ext cx="6477000" cy="4181475"/>
           </a:xfrm>
+          <a:prstGeom prst="rect">
+            <a:avLst/>
+          </a:prstGeom>
+          <a:noFill/>
+          <a:ln w="6350">
+            <a:solidFill>
+              <a:schemeClr val="tx1">
+                <a:lumMod val="85000"/>
+                <a:lumOff val="15000"/>
+              </a:schemeClr>
+            </a:solidFill>
+          </a:ln>
+          <a:effectLst>
+            <a:outerShdw blurRad="50800" dist="38100" dir="2700000" algn="tl" rotWithShape="0">
+              <a:prstClr val="black">
+                <a:alpha val="40000"/>
+              </a:prstClr>
+            </a:outerShdw>
+          </a:effectLst>
+          <a:extLst>
+            <a:ext uri="{909E8E84-426E-40DD-AFC4-6F175D3DCCD1}">
+              <a14:hiddenFill xmlns:a14="http://schemas.microsoft.com/office/drawing/2010/main">
+                <a:solidFill>
+                  <a:srgbClr val="FFFFFF"/>
+                </a:solidFill>
+              </a14:hiddenFill>
+            </a:ext>
+          </a:extLst>
         </p:spPr>
-        <p:txBody>
-          <a:bodyPr>
-            <a:normAutofit/>
-          </a:bodyPr>
-          <a:lstStyle/>
-          <a:p>
-            <a:pPr algn="ctr"/>
-            <a:r>
-              <a:rPr lang="en-US" sz="4000" dirty="0">
-                <a:solidFill>
-                  <a:schemeClr val="tx1">
-                    <a:lumMod val="75000"/>
-                    <a:lumOff val="25000"/>
-                  </a:schemeClr>
-                </a:solidFill>
-                <a:latin typeface="Palatino Linotype" panose="02040502050505030304" pitchFamily="18" charset="0"/>
-                <a:cs typeface="Segoe UI Light" panose="020B0502040204020203" pitchFamily="34" charset="0"/>
-              </a:rPr>
-              <a:t>Practicum AI Participants are…</a:t>
-            </a:r>
-          </a:p>
-        </p:txBody>
-      </p:sp>
-      <p:sp>
-        <p:nvSpPr>
-          <p:cNvPr id="12" name="Content Placeholder 11">
-            <a:extLst>
-              <a:ext uri="{FF2B5EF4-FFF2-40B4-BE49-F238E27FC236}">
-                <a16:creationId xmlns:a16="http://schemas.microsoft.com/office/drawing/2014/main" id="{BBE625DF-4A5E-4AA2-BC23-690FAE22DDF7}"/>
-              </a:ext>
-            </a:extLst>
-          </p:cNvPr>
-          <p:cNvSpPr>
-            <a:spLocks noGrp="1"/>
-          </p:cNvSpPr>
-          <p:nvPr>
-            <p:ph idx="1"/>
-          </p:nvPr>
-        </p:nvSpPr>
-        <p:spPr>
-          <a:xfrm>
-            <a:off x="511791" y="1833939"/>
-            <a:ext cx="11061510" cy="4351338"/>
-          </a:xfrm>
-        </p:spPr>
-        <p:txBody>
-          <a:bodyPr>
-            <a:normAutofit/>
-          </a:bodyPr>
-          <a:lstStyle/>
-          <a:p>
-            <a:pPr marL="0" indent="0" algn="ctr">
-              <a:lnSpc>
-                <a:spcPct val="200000"/>
-              </a:lnSpc>
-              <a:buNone/>
-            </a:pPr>
-            <a:r>
-              <a:rPr lang="en-US" sz="2400" dirty="0">
-                <a:latin typeface="Palatino Linotype" panose="02040502050505030304" pitchFamily="18" charset="0"/>
-              </a:rPr>
-              <a:t>Non-technical</a:t>
-            </a:r>
-          </a:p>
-          <a:p>
-            <a:pPr marL="0" indent="0" algn="ctr">
-              <a:lnSpc>
-                <a:spcPct val="200000"/>
-              </a:lnSpc>
-              <a:buNone/>
-            </a:pPr>
-            <a:r>
-              <a:rPr lang="en-US" sz="2400" dirty="0">
-                <a:latin typeface="Palatino Linotype" panose="02040502050505030304" pitchFamily="18" charset="0"/>
-              </a:rPr>
-              <a:t>Curious about A.I.</a:t>
-            </a:r>
-          </a:p>
-          <a:p>
-            <a:pPr marL="0" indent="0" algn="ctr">
-              <a:lnSpc>
-                <a:spcPct val="200000"/>
-              </a:lnSpc>
-              <a:buNone/>
-            </a:pPr>
-            <a:r>
-              <a:rPr lang="en-US" sz="2400" dirty="0">
-                <a:latin typeface="Palatino Linotype" panose="02040502050505030304" pitchFamily="18" charset="0"/>
-              </a:rPr>
-              <a:t>Comfortable with Hands-On Learning</a:t>
-            </a:r>
-          </a:p>
-          <a:p>
-            <a:pPr marL="0" indent="0" algn="ctr">
-              <a:lnSpc>
-                <a:spcPct val="200000"/>
-              </a:lnSpc>
-              <a:buNone/>
-            </a:pPr>
-            <a:r>
-              <a:rPr lang="en-US" sz="2400" dirty="0">
-                <a:latin typeface="Palatino Linotype" panose="02040502050505030304" pitchFamily="18" charset="0"/>
-              </a:rPr>
-              <a:t>Problem Solvers</a:t>
-            </a:r>
-          </a:p>
-          <a:p>
-            <a:pPr marL="0" indent="0" algn="ctr">
-              <a:lnSpc>
-                <a:spcPct val="200000"/>
-              </a:lnSpc>
-              <a:buNone/>
-            </a:pPr>
-            <a:endParaRPr lang="en-US" sz="2400" dirty="0">
-              <a:latin typeface="Palatino Linotype" panose="02040502050505030304" pitchFamily="18" charset="0"/>
-            </a:endParaRPr>
-          </a:p>
-        </p:txBody>
-      </p:sp>
+      </p:pic>
     </p:spTree>
     <p:extLst>
       <p:ext uri="{BB962C8B-B14F-4D97-AF65-F5344CB8AC3E}">
-        <p14:creationId xmlns:p14="http://schemas.microsoft.com/office/powerpoint/2010/main" val="2631007150"/>
+        <p14:creationId xmlns:p14="http://schemas.microsoft.com/office/powerpoint/2010/main" val="3892509640"/>
       </p:ext>
     </p:extLst>
   </p:cSld>
@@ -9671,6 +10678,60 @@
           </a:prstGeom>
         </p:spPr>
       </p:pic>
+      <p:sp>
+        <p:nvSpPr>
+          <p:cNvPr id="2" name="Rectangle: Rounded Corners 1">
+            <a:extLst>
+              <a:ext uri="{FF2B5EF4-FFF2-40B4-BE49-F238E27FC236}">
+                <a16:creationId xmlns:a16="http://schemas.microsoft.com/office/drawing/2014/main" id="{25FC1073-5FC1-41BD-85C3-DD87D70A3926}"/>
+              </a:ext>
+            </a:extLst>
+          </p:cNvPr>
+          <p:cNvSpPr/>
+          <p:nvPr/>
+        </p:nvSpPr>
+        <p:spPr>
+          <a:xfrm>
+            <a:off x="940422" y="2343808"/>
+            <a:ext cx="5155578" cy="1986456"/>
+          </a:xfrm>
+          <a:prstGeom prst="roundRect">
+            <a:avLst/>
+          </a:prstGeom>
+          <a:noFill/>
+          <a:ln>
+            <a:solidFill>
+              <a:schemeClr val="bg2">
+                <a:lumMod val="75000"/>
+              </a:schemeClr>
+            </a:solidFill>
+          </a:ln>
+        </p:spPr>
+        <p:style>
+          <a:lnRef idx="2">
+            <a:schemeClr val="accent1">
+              <a:shade val="50000"/>
+            </a:schemeClr>
+          </a:lnRef>
+          <a:fillRef idx="1">
+            <a:schemeClr val="accent1"/>
+          </a:fillRef>
+          <a:effectRef idx="0">
+            <a:schemeClr val="accent1"/>
+          </a:effectRef>
+          <a:fontRef idx="minor">
+            <a:schemeClr val="lt1"/>
+          </a:fontRef>
+        </p:style>
+        <p:txBody>
+          <a:bodyPr rtlCol="0" anchor="ctr"/>
+          <a:lstStyle/>
+          <a:p>
+            <a:pPr algn="ctr"/>
+            <a:endParaRPr lang="en-US"/>
+          </a:p>
+        </p:txBody>
+      </p:sp>
     </p:spTree>
     <p:extLst>
       <p:ext uri="{BB962C8B-B14F-4D97-AF65-F5344CB8AC3E}">
@@ -9715,10 +10776,10 @@
       </p:grpSpPr>
       <p:pic>
         <p:nvPicPr>
-          <p:cNvPr id="8" name="Picture 7">
+          <p:cNvPr id="3" name="Picture 2">
             <a:extLst>
               <a:ext uri="{FF2B5EF4-FFF2-40B4-BE49-F238E27FC236}">
-                <a16:creationId xmlns:a16="http://schemas.microsoft.com/office/drawing/2014/main" id="{58AF309B-2972-4842-8C51-01D5BDA533F8}"/>
+                <a16:creationId xmlns:a16="http://schemas.microsoft.com/office/drawing/2014/main" id="{C4038F04-C313-4824-A659-73216D14CF7D}"/>
               </a:ext>
             </a:extLst>
           </p:cNvPr>
@@ -9735,18 +10796,237 @@
         </p:blipFill>
         <p:spPr>
           <a:xfrm>
-            <a:off x="2527604" y="1778793"/>
-            <a:ext cx="7136791" cy="3300413"/>
+            <a:off x="1119252" y="323850"/>
+            <a:ext cx="9953495" cy="6210300"/>
           </a:xfrm>
           <a:prstGeom prst="rect">
             <a:avLst/>
           </a:prstGeom>
         </p:spPr>
       </p:pic>
+      <p:cxnSp>
+        <p:nvCxnSpPr>
+          <p:cNvPr id="4" name="Straight Connector 3">
+            <a:extLst>
+              <a:ext uri="{FF2B5EF4-FFF2-40B4-BE49-F238E27FC236}">
+                <a16:creationId xmlns:a16="http://schemas.microsoft.com/office/drawing/2014/main" id="{0F2708E5-809D-474E-8EEC-055DDED806B0}"/>
+              </a:ext>
+            </a:extLst>
+          </p:cNvPr>
+          <p:cNvCxnSpPr>
+            <a:endCxn id="3" idx="2"/>
+          </p:cNvCxnSpPr>
+          <p:nvPr/>
+        </p:nvCxnSpPr>
+        <p:spPr>
+          <a:xfrm>
+            <a:off x="6096000" y="100013"/>
+            <a:ext cx="0" cy="6434137"/>
+          </a:xfrm>
+          <a:prstGeom prst="line">
+            <a:avLst/>
+          </a:prstGeom>
+          <a:ln w="9525">
+            <a:prstDash val="lgDash"/>
+          </a:ln>
+        </p:spPr>
+        <p:style>
+          <a:lnRef idx="1">
+            <a:schemeClr val="accent1"/>
+          </a:lnRef>
+          <a:fillRef idx="0">
+            <a:schemeClr val="accent1"/>
+          </a:fillRef>
+          <a:effectRef idx="0">
+            <a:schemeClr val="accent1"/>
+          </a:effectRef>
+          <a:fontRef idx="minor">
+            <a:schemeClr val="tx1"/>
+          </a:fontRef>
+        </p:style>
+      </p:cxnSp>
+      <p:sp>
+        <p:nvSpPr>
+          <p:cNvPr id="5" name="TextBox 4">
+            <a:extLst>
+              <a:ext uri="{FF2B5EF4-FFF2-40B4-BE49-F238E27FC236}">
+                <a16:creationId xmlns:a16="http://schemas.microsoft.com/office/drawing/2014/main" id="{49DE9140-1A1A-4082-B612-87667D22C9EB}"/>
+              </a:ext>
+            </a:extLst>
+          </p:cNvPr>
+          <p:cNvSpPr txBox="1"/>
+          <p:nvPr/>
+        </p:nvSpPr>
+        <p:spPr>
+          <a:xfrm>
+            <a:off x="4117347" y="17620"/>
+            <a:ext cx="1570045" cy="400110"/>
+          </a:xfrm>
+          <a:prstGeom prst="rect">
+            <a:avLst/>
+          </a:prstGeom>
+          <a:noFill/>
+        </p:spPr>
+        <p:txBody>
+          <a:bodyPr wrap="none" rtlCol="0">
+            <a:spAutoFit/>
+          </a:bodyPr>
+          <a:lstStyle/>
+          <a:p>
+            <a:r>
+              <a:rPr lang="en-US" sz="2000" dirty="0">
+                <a:solidFill>
+                  <a:schemeClr val="tx1">
+                    <a:lumMod val="75000"/>
+                    <a:lumOff val="25000"/>
+                  </a:schemeClr>
+                </a:solidFill>
+                <a:latin typeface="+mj-lt"/>
+              </a:rPr>
+              <a:t>Visual + Story</a:t>
+            </a:r>
+          </a:p>
+        </p:txBody>
+      </p:sp>
+      <p:sp>
+        <p:nvSpPr>
+          <p:cNvPr id="6" name="TextBox 5">
+            <a:extLst>
+              <a:ext uri="{FF2B5EF4-FFF2-40B4-BE49-F238E27FC236}">
+                <a16:creationId xmlns:a16="http://schemas.microsoft.com/office/drawing/2014/main" id="{1D7FB243-81F9-4BF4-B6AE-550097A90DEA}"/>
+              </a:ext>
+            </a:extLst>
+          </p:cNvPr>
+          <p:cNvSpPr txBox="1"/>
+          <p:nvPr/>
+        </p:nvSpPr>
+        <p:spPr>
+          <a:xfrm>
+            <a:off x="6449366" y="23572"/>
+            <a:ext cx="2381486" cy="400110"/>
+          </a:xfrm>
+          <a:prstGeom prst="rect">
+            <a:avLst/>
+          </a:prstGeom>
+          <a:noFill/>
+        </p:spPr>
+        <p:txBody>
+          <a:bodyPr wrap="none" rtlCol="0">
+            <a:spAutoFit/>
+          </a:bodyPr>
+          <a:lstStyle/>
+          <a:p>
+            <a:r>
+              <a:rPr lang="en-US" sz="2000" dirty="0">
+                <a:solidFill>
+                  <a:schemeClr val="tx1">
+                    <a:lumMod val="75000"/>
+                    <a:lumOff val="25000"/>
+                  </a:schemeClr>
+                </a:solidFill>
+                <a:latin typeface="+mj-lt"/>
+              </a:rPr>
+              <a:t>Case-Study + Project </a:t>
+            </a:r>
+          </a:p>
+        </p:txBody>
+      </p:sp>
+      <p:cxnSp>
+        <p:nvCxnSpPr>
+          <p:cNvPr id="8" name="Straight Arrow Connector 7">
+            <a:extLst>
+              <a:ext uri="{FF2B5EF4-FFF2-40B4-BE49-F238E27FC236}">
+                <a16:creationId xmlns:a16="http://schemas.microsoft.com/office/drawing/2014/main" id="{3C22AC00-516E-47FF-9085-766AEA891B02}"/>
+              </a:ext>
+            </a:extLst>
+          </p:cNvPr>
+          <p:cNvCxnSpPr/>
+          <p:nvPr/>
+        </p:nvCxnSpPr>
+        <p:spPr>
+          <a:xfrm flipH="1">
+            <a:off x="2211388" y="217675"/>
+            <a:ext cx="1785937" cy="0"/>
+          </a:xfrm>
+          <a:prstGeom prst="straightConnector1">
+            <a:avLst/>
+          </a:prstGeom>
+          <a:ln>
+            <a:solidFill>
+              <a:schemeClr val="tx1">
+                <a:lumMod val="65000"/>
+                <a:lumOff val="35000"/>
+              </a:schemeClr>
+            </a:solidFill>
+            <a:tailEnd type="arrow"/>
+          </a:ln>
+        </p:spPr>
+        <p:style>
+          <a:lnRef idx="1">
+            <a:schemeClr val="accent1"/>
+          </a:lnRef>
+          <a:fillRef idx="0">
+            <a:schemeClr val="accent1"/>
+          </a:fillRef>
+          <a:effectRef idx="0">
+            <a:schemeClr val="accent1"/>
+          </a:effectRef>
+          <a:fontRef idx="minor">
+            <a:schemeClr val="tx1"/>
+          </a:fontRef>
+        </p:style>
+      </p:cxnSp>
+      <p:cxnSp>
+        <p:nvCxnSpPr>
+          <p:cNvPr id="10" name="Straight Arrow Connector 9">
+            <a:extLst>
+              <a:ext uri="{FF2B5EF4-FFF2-40B4-BE49-F238E27FC236}">
+                <a16:creationId xmlns:a16="http://schemas.microsoft.com/office/drawing/2014/main" id="{20AFA1C2-EAB8-4C3F-B161-C5C1D295F3AA}"/>
+              </a:ext>
+            </a:extLst>
+          </p:cNvPr>
+          <p:cNvCxnSpPr>
+            <a:stCxn id="6" idx="3"/>
+          </p:cNvCxnSpPr>
+          <p:nvPr/>
+        </p:nvCxnSpPr>
+        <p:spPr>
+          <a:xfrm flipV="1">
+            <a:off x="8830852" y="217675"/>
+            <a:ext cx="1441861" cy="5952"/>
+          </a:xfrm>
+          <a:prstGeom prst="straightConnector1">
+            <a:avLst/>
+          </a:prstGeom>
+          <a:ln>
+            <a:solidFill>
+              <a:schemeClr val="tx1">
+                <a:lumMod val="65000"/>
+                <a:lumOff val="35000"/>
+              </a:schemeClr>
+            </a:solidFill>
+            <a:tailEnd type="arrow"/>
+          </a:ln>
+        </p:spPr>
+        <p:style>
+          <a:lnRef idx="1">
+            <a:schemeClr val="accent1"/>
+          </a:lnRef>
+          <a:fillRef idx="0">
+            <a:schemeClr val="accent1"/>
+          </a:fillRef>
+          <a:effectRef idx="0">
+            <a:schemeClr val="accent1"/>
+          </a:effectRef>
+          <a:fontRef idx="minor">
+            <a:schemeClr val="tx1"/>
+          </a:fontRef>
+        </p:style>
+      </p:cxnSp>
     </p:spTree>
     <p:extLst>
       <p:ext uri="{BB962C8B-B14F-4D97-AF65-F5344CB8AC3E}">
-        <p14:creationId xmlns:p14="http://schemas.microsoft.com/office/powerpoint/2010/main" val="302038558"/>
+        <p14:creationId xmlns:p14="http://schemas.microsoft.com/office/powerpoint/2010/main" val="3988138138"/>
       </p:ext>
     </p:extLst>
   </p:cSld>

</xml_diff>